<commit_message>
Some research in results and updating PowerPoint presentation
</commit_message>
<xml_diff>
--- a/Улучшение качества изображений.pptx
+++ b/Улучшение качества изображений.pptx
@@ -5,10 +5,10 @@
     <p:sldMasterId id="2147483660" r:id="rId4"/>
   </p:sldMasterIdLst>
   <p:notesMasterIdLst>
-    <p:notesMasterId r:id="rId11"/>
+    <p:notesMasterId r:id="rId14"/>
   </p:notesMasterIdLst>
   <p:handoutMasterIdLst>
-    <p:handoutMasterId r:id="rId12"/>
+    <p:handoutMasterId r:id="rId15"/>
   </p:handoutMasterIdLst>
   <p:sldIdLst>
     <p:sldId id="257" r:id="rId5"/>
@@ -17,6 +17,9 @@
     <p:sldId id="274" r:id="rId8"/>
     <p:sldId id="275" r:id="rId9"/>
     <p:sldId id="276" r:id="rId10"/>
+    <p:sldId id="278" r:id="rId11"/>
+    <p:sldId id="279" r:id="rId12"/>
+    <p:sldId id="280" r:id="rId13"/>
   </p:sldIdLst>
   <p:sldSz cx="12188825" cy="6858000"/>
   <p:notesSz cx="6858000" cy="9144000"/>
@@ -6929,6 +6932,1997 @@
     <p:extLst>
       <p:ext uri="{BB962C8B-B14F-4D97-AF65-F5344CB8AC3E}">
         <p14:creationId xmlns:p14="http://schemas.microsoft.com/office/powerpoint/2010/main" val="206789094"/>
+      </p:ext>
+    </p:extLst>
+  </p:cSld>
+  <p:clrMapOvr>
+    <a:masterClrMapping/>
+  </p:clrMapOvr>
+  <mc:AlternateContent xmlns:mc="http://schemas.openxmlformats.org/markup-compatibility/2006" xmlns:p14="http://schemas.microsoft.com/office/powerpoint/2010/main">
+    <mc:Choice Requires="p14">
+      <p:transition spd="med" p14:dur="700">
+        <p:fade/>
+      </p:transition>
+    </mc:Choice>
+    <mc:Fallback xmlns="">
+      <p:transition spd="med">
+        <p:fade/>
+      </p:transition>
+    </mc:Fallback>
+  </mc:AlternateContent>
+</p:sld>
+</file>
+
+<file path=ppt/slides/slide7.xml><?xml version="1.0" encoding="utf-8"?>
+<p:sld xmlns:a="http://schemas.openxmlformats.org/drawingml/2006/main" xmlns:r="http://schemas.openxmlformats.org/officeDocument/2006/relationships" xmlns:p="http://schemas.openxmlformats.org/presentationml/2006/main">
+  <p:cSld>
+    <p:spTree>
+      <p:nvGrpSpPr>
+        <p:cNvPr id="1" name=""/>
+        <p:cNvGrpSpPr/>
+        <p:nvPr/>
+      </p:nvGrpSpPr>
+      <p:grpSpPr>
+        <a:xfrm>
+          <a:off x="0" y="0"/>
+          <a:ext cx="0" cy="0"/>
+          <a:chOff x="0" y="0"/>
+          <a:chExt cx="0" cy="0"/>
+        </a:xfrm>
+      </p:grpSpPr>
+      <p:sp>
+        <p:nvSpPr>
+          <p:cNvPr id="3" name="Подзаголовок 2">
+            <a:extLst>
+              <a:ext uri="{FF2B5EF4-FFF2-40B4-BE49-F238E27FC236}">
+                <a16:creationId xmlns:a16="http://schemas.microsoft.com/office/drawing/2014/main" id="{E92BA08A-6BE6-4489-9B4A-C01DB2981FFC}"/>
+              </a:ext>
+            </a:extLst>
+          </p:cNvPr>
+          <p:cNvSpPr>
+            <a:spLocks noGrp="1"/>
+          </p:cNvSpPr>
+          <p:nvPr>
+            <p:ph type="subTitle" idx="1"/>
+          </p:nvPr>
+        </p:nvSpPr>
+        <p:spPr>
+          <a:xfrm>
+            <a:off x="909836" y="1556792"/>
+            <a:ext cx="10297144" cy="4736654"/>
+          </a:xfrm>
+        </p:spPr>
+        <p:txBody>
+          <a:bodyPr/>
+          <a:lstStyle/>
+          <a:p>
+            <a:r>
+              <a:rPr lang="ru-RU" cap="none" dirty="0">
+                <a:solidFill>
+                  <a:srgbClr val="009999"/>
+                </a:solidFill>
+              </a:rPr>
+              <a:t>Цель:</a:t>
+            </a:r>
+          </a:p>
+          <a:p>
+            <a:pPr marL="514350" indent="-514350">
+              <a:buFont typeface="+mj-lt"/>
+              <a:buAutoNum type="arabicPeriod"/>
+            </a:pPr>
+            <a:r>
+              <a:rPr lang="ru-RU" cap="none" dirty="0">
+                <a:solidFill>
+                  <a:srgbClr val="009999"/>
+                </a:solidFill>
+              </a:rPr>
+              <a:t>Получить размеченный датасет от заказчика;</a:t>
+            </a:r>
+            <a:endParaRPr lang="ru-RU" cap="none" dirty="0">
+              <a:solidFill>
+                <a:srgbClr val="FF0000"/>
+              </a:solidFill>
+            </a:endParaRPr>
+          </a:p>
+          <a:p>
+            <a:pPr marL="514350" indent="-514350">
+              <a:buFont typeface="+mj-lt"/>
+              <a:buAutoNum type="arabicPeriod"/>
+            </a:pPr>
+            <a:r>
+              <a:rPr lang="ru-RU" cap="none" dirty="0">
+                <a:solidFill>
+                  <a:srgbClr val="009999"/>
+                </a:solidFill>
+              </a:rPr>
+              <a:t>Собрать свой датасет из открытых источников.</a:t>
+            </a:r>
+          </a:p>
+          <a:p>
+            <a:endParaRPr lang="ru-RU" cap="none" dirty="0">
+              <a:solidFill>
+                <a:srgbClr val="009999"/>
+              </a:solidFill>
+            </a:endParaRPr>
+          </a:p>
+          <a:p>
+            <a:r>
+              <a:rPr lang="ru-RU" cap="none" dirty="0">
+                <a:solidFill>
+                  <a:srgbClr val="009999"/>
+                </a:solidFill>
+              </a:rPr>
+              <a:t>Результат:</a:t>
+            </a:r>
+          </a:p>
+          <a:p>
+            <a:pPr marL="514350" indent="-514350">
+              <a:buFont typeface="+mj-lt"/>
+              <a:buAutoNum type="arabicPeriod"/>
+            </a:pPr>
+            <a:r>
+              <a:rPr lang="ru-RU" cap="none" dirty="0">
+                <a:solidFill>
+                  <a:srgbClr val="009999"/>
+                </a:solidFill>
+              </a:rPr>
+              <a:t>Заказчик не предоставил датасет из-за бюрократических проволочек и сложности анонимизации данных;</a:t>
+            </a:r>
+          </a:p>
+          <a:p>
+            <a:pPr marL="514350" indent="-514350">
+              <a:buFont typeface="+mj-lt"/>
+              <a:buAutoNum type="arabicPeriod"/>
+            </a:pPr>
+            <a:r>
+              <a:rPr lang="ru-RU" cap="none" dirty="0">
+                <a:solidFill>
+                  <a:srgbClr val="009999"/>
+                </a:solidFill>
+              </a:rPr>
+              <a:t>Скачан датасет </a:t>
+            </a:r>
+            <a:r>
+              <a:rPr lang="en-US" cap="none" dirty="0">
+                <a:solidFill>
+                  <a:srgbClr val="009999"/>
+                </a:solidFill>
+                <a:hlinkClick r:id="rId2"/>
+              </a:rPr>
+              <a:t>CelebA</a:t>
+            </a:r>
+            <a:r>
+              <a:rPr lang="ru-RU" cap="none" dirty="0">
+                <a:solidFill>
+                  <a:srgbClr val="009999"/>
+                </a:solidFill>
+              </a:rPr>
+              <a:t> и </a:t>
+            </a:r>
+            <a:r>
+              <a:rPr lang="en-US" cap="none" dirty="0">
+                <a:solidFill>
+                  <a:srgbClr val="009999"/>
+                </a:solidFill>
+                <a:hlinkClick r:id="rId3"/>
+              </a:rPr>
+              <a:t>Labeled Faces in the Wild</a:t>
+            </a:r>
+            <a:r>
+              <a:rPr lang="ru-RU" cap="none" dirty="0">
+                <a:solidFill>
+                  <a:srgbClr val="009999"/>
+                </a:solidFill>
+              </a:rPr>
+              <a:t> для обучения моделей увеличения разрешения и валидации модели распознавания.</a:t>
+            </a:r>
+          </a:p>
+          <a:p>
+            <a:endParaRPr lang="ru-RU" cap="none" dirty="0">
+              <a:solidFill>
+                <a:srgbClr val="009999"/>
+              </a:solidFill>
+            </a:endParaRPr>
+          </a:p>
+        </p:txBody>
+      </p:sp>
+      <p:graphicFrame>
+        <p:nvGraphicFramePr>
+          <p:cNvPr id="4" name="Таблица 3">
+            <a:extLst>
+              <a:ext uri="{FF2B5EF4-FFF2-40B4-BE49-F238E27FC236}">
+                <a16:creationId xmlns:a16="http://schemas.microsoft.com/office/drawing/2014/main" id="{729675FB-74FA-41EC-A846-279ACF300D61}"/>
+              </a:ext>
+            </a:extLst>
+          </p:cNvPr>
+          <p:cNvGraphicFramePr>
+            <a:graphicFrameLocks noGrp="1"/>
+          </p:cNvGraphicFramePr>
+          <p:nvPr>
+            <p:extLst>
+              <p:ext uri="{D42A27DB-BD31-4B8C-83A1-F6EECF244321}">
+                <p14:modId xmlns:p14="http://schemas.microsoft.com/office/powerpoint/2010/main" val="936047773"/>
+              </p:ext>
+            </p:extLst>
+          </p:nvPr>
+        </p:nvGraphicFramePr>
+        <p:xfrm>
+          <a:off x="2031470" y="564554"/>
+          <a:ext cx="8125884" cy="895487"/>
+        </p:xfrm>
+        <a:graphic>
+          <a:graphicData uri="http://schemas.openxmlformats.org/drawingml/2006/table">
+            <a:tbl>
+              <a:tblPr bandRow="1">
+                <a:tableStyleId>{5C22544A-7EE6-4342-B048-85BDC9FD1C3A}</a:tableStyleId>
+              </a:tblPr>
+              <a:tblGrid>
+                <a:gridCol w="4062942">
+                  <a:extLst>
+                    <a:ext uri="{9D8B030D-6E8A-4147-A177-3AD203B41FA5}">
+                      <a16:colId xmlns:a16="http://schemas.microsoft.com/office/drawing/2014/main" val="1717258048"/>
+                    </a:ext>
+                  </a:extLst>
+                </a:gridCol>
+                <a:gridCol w="4062942">
+                  <a:extLst>
+                    <a:ext uri="{9D8B030D-6E8A-4147-A177-3AD203B41FA5}">
+                      <a16:colId xmlns:a16="http://schemas.microsoft.com/office/drawing/2014/main" val="3902171362"/>
+                    </a:ext>
+                  </a:extLst>
+                </a:gridCol>
+              </a:tblGrid>
+              <a:tr h="895487">
+                <a:tc>
+                  <a:txBody>
+                    <a:bodyPr/>
+                    <a:lstStyle/>
+                    <a:p>
+                      <a:pPr algn="ctr"/>
+                      <a:r>
+                        <a:rPr lang="ru-RU" dirty="0"/>
+                        <a:t>Собрать данные</a:t>
+                      </a:r>
+                    </a:p>
+                  </a:txBody>
+                  <a:tcPr anchor="ctr"/>
+                </a:tc>
+                <a:tc>
+                  <a:txBody>
+                    <a:bodyPr/>
+                    <a:lstStyle/>
+                    <a:p>
+                      <a:pPr algn="ctr"/>
+                      <a:r>
+                        <a:rPr lang="ru-RU" dirty="0"/>
+                        <a:t>07.03.19 – 21.03.19</a:t>
+                      </a:r>
+                    </a:p>
+                  </a:txBody>
+                  <a:tcPr anchor="ctr"/>
+                </a:tc>
+                <a:extLst>
+                  <a:ext uri="{0D108BD9-81ED-4DB2-BD59-A6C34878D82A}">
+                    <a16:rowId xmlns:a16="http://schemas.microsoft.com/office/drawing/2014/main" val="3728529990"/>
+                  </a:ext>
+                </a:extLst>
+              </a:tr>
+            </a:tbl>
+          </a:graphicData>
+        </a:graphic>
+      </p:graphicFrame>
+      <p:sp>
+        <p:nvSpPr>
+          <p:cNvPr id="5" name="TextBox 4">
+            <a:extLst>
+              <a:ext uri="{FF2B5EF4-FFF2-40B4-BE49-F238E27FC236}">
+                <a16:creationId xmlns:a16="http://schemas.microsoft.com/office/drawing/2014/main" id="{369487FC-9A03-4638-8F2E-ABEB14C81F88}"/>
+              </a:ext>
+            </a:extLst>
+          </p:cNvPr>
+          <p:cNvSpPr txBox="1"/>
+          <p:nvPr/>
+        </p:nvSpPr>
+        <p:spPr>
+          <a:xfrm>
+            <a:off x="10800972" y="1916832"/>
+            <a:ext cx="478016" cy="523220"/>
+          </a:xfrm>
+          <a:prstGeom prst="rect">
+            <a:avLst/>
+          </a:prstGeom>
+          <a:noFill/>
+        </p:spPr>
+        <p:txBody>
+          <a:bodyPr wrap="none" rtlCol="0">
+            <a:spAutoFit/>
+          </a:bodyPr>
+          <a:lstStyle/>
+          <a:p>
+            <a:r>
+              <a:rPr lang="ru-RU" sz="2800" dirty="0">
+                <a:solidFill>
+                  <a:srgbClr val="FF0000"/>
+                </a:solidFill>
+              </a:rPr>
+              <a:t>✗</a:t>
+            </a:r>
+            <a:endParaRPr lang="ru-RU" sz="2800" dirty="0"/>
+          </a:p>
+        </p:txBody>
+      </p:sp>
+      <p:sp>
+        <p:nvSpPr>
+          <p:cNvPr id="6" name="TextBox 5">
+            <a:extLst>
+              <a:ext uri="{FF2B5EF4-FFF2-40B4-BE49-F238E27FC236}">
+                <a16:creationId xmlns:a16="http://schemas.microsoft.com/office/drawing/2014/main" id="{82CE4EB2-C8C3-4B72-B4F9-4DDD23732B35}"/>
+              </a:ext>
+            </a:extLst>
+          </p:cNvPr>
+          <p:cNvSpPr txBox="1"/>
+          <p:nvPr/>
+        </p:nvSpPr>
+        <p:spPr>
+          <a:xfrm>
+            <a:off x="10812995" y="2348880"/>
+            <a:ext cx="453970" cy="523220"/>
+          </a:xfrm>
+          <a:prstGeom prst="rect">
+            <a:avLst/>
+          </a:prstGeom>
+          <a:noFill/>
+        </p:spPr>
+        <p:txBody>
+          <a:bodyPr wrap="none" rtlCol="0">
+            <a:spAutoFit/>
+          </a:bodyPr>
+          <a:lstStyle/>
+          <a:p>
+            <a:r>
+              <a:rPr lang="ru-RU" sz="2800" dirty="0">
+                <a:solidFill>
+                  <a:srgbClr val="00B050"/>
+                </a:solidFill>
+              </a:rPr>
+              <a:t>✓</a:t>
+            </a:r>
+            <a:endParaRPr lang="ru-RU" sz="2800" dirty="0"/>
+          </a:p>
+        </p:txBody>
+      </p:sp>
+    </p:spTree>
+    <p:extLst>
+      <p:ext uri="{BB962C8B-B14F-4D97-AF65-F5344CB8AC3E}">
+        <p14:creationId xmlns:p14="http://schemas.microsoft.com/office/powerpoint/2010/main" val="554947505"/>
+      </p:ext>
+    </p:extLst>
+  </p:cSld>
+  <p:clrMapOvr>
+    <a:masterClrMapping/>
+  </p:clrMapOvr>
+  <mc:AlternateContent xmlns:mc="http://schemas.openxmlformats.org/markup-compatibility/2006" xmlns:p14="http://schemas.microsoft.com/office/powerpoint/2010/main">
+    <mc:Choice Requires="p14">
+      <p:transition spd="med" p14:dur="700">
+        <p:fade/>
+      </p:transition>
+    </mc:Choice>
+    <mc:Fallback xmlns="">
+      <p:transition spd="med">
+        <p:fade/>
+      </p:transition>
+    </mc:Fallback>
+  </mc:AlternateContent>
+</p:sld>
+</file>
+
+<file path=ppt/slides/slide8.xml><?xml version="1.0" encoding="utf-8"?>
+<p:sld xmlns:a="http://schemas.openxmlformats.org/drawingml/2006/main" xmlns:r="http://schemas.openxmlformats.org/officeDocument/2006/relationships" xmlns:p="http://schemas.openxmlformats.org/presentationml/2006/main">
+  <p:cSld>
+    <p:spTree>
+      <p:nvGrpSpPr>
+        <p:cNvPr id="1" name=""/>
+        <p:cNvGrpSpPr/>
+        <p:nvPr/>
+      </p:nvGrpSpPr>
+      <p:grpSpPr>
+        <a:xfrm>
+          <a:off x="0" y="0"/>
+          <a:ext cx="0" cy="0"/>
+          <a:chOff x="0" y="0"/>
+          <a:chExt cx="0" cy="0"/>
+        </a:xfrm>
+      </p:grpSpPr>
+      <p:sp>
+        <p:nvSpPr>
+          <p:cNvPr id="3" name="Подзаголовок 2">
+            <a:extLst>
+              <a:ext uri="{FF2B5EF4-FFF2-40B4-BE49-F238E27FC236}">
+                <a16:creationId xmlns:a16="http://schemas.microsoft.com/office/drawing/2014/main" id="{E92BA08A-6BE6-4489-9B4A-C01DB2981FFC}"/>
+              </a:ext>
+            </a:extLst>
+          </p:cNvPr>
+          <p:cNvSpPr>
+            <a:spLocks noGrp="1"/>
+          </p:cNvSpPr>
+          <p:nvPr>
+            <p:ph type="subTitle" idx="1"/>
+          </p:nvPr>
+        </p:nvSpPr>
+        <p:spPr>
+          <a:xfrm>
+            <a:off x="921860" y="2204864"/>
+            <a:ext cx="10297144" cy="3168352"/>
+          </a:xfrm>
+        </p:spPr>
+        <p:txBody>
+          <a:bodyPr>
+            <a:normAutofit/>
+          </a:bodyPr>
+          <a:lstStyle/>
+          <a:p>
+            <a:r>
+              <a:rPr lang="ru-RU" cap="none" dirty="0"/>
+              <a:t>Цель:</a:t>
+            </a:r>
+          </a:p>
+          <a:p>
+            <a:pPr marL="514350" indent="-514350">
+              <a:buFont typeface="+mj-lt"/>
+              <a:buAutoNum type="arabicPeriod"/>
+            </a:pPr>
+            <a:r>
+              <a:rPr lang="ru-RU" cap="none" dirty="0"/>
+              <a:t>Реализовать (или найти реализацию) модель, решающую проблему </a:t>
+            </a:r>
+            <a:r>
+              <a:rPr lang="en-US" cap="none" dirty="0"/>
+              <a:t>super-resolution</a:t>
+            </a:r>
+            <a:r>
+              <a:rPr lang="ru-RU" cap="none" dirty="0"/>
+              <a:t>;</a:t>
+            </a:r>
+          </a:p>
+          <a:p>
+            <a:pPr marL="514350" indent="-514350">
+              <a:buFont typeface="+mj-lt"/>
+              <a:buAutoNum type="arabicPeriod"/>
+            </a:pPr>
+            <a:r>
+              <a:rPr lang="ru-RU" cap="none" dirty="0"/>
+              <a:t>Получить от заказчика модель распознавания лиц;</a:t>
+            </a:r>
+          </a:p>
+          <a:p>
+            <a:pPr marL="514350" indent="-514350">
+              <a:buFont typeface="+mj-lt"/>
+              <a:buAutoNum type="arabicPeriod"/>
+            </a:pPr>
+            <a:r>
+              <a:rPr lang="ru-RU" cap="none" dirty="0"/>
+              <a:t>Произвести проверку гипотезы об улучшении распознавания после предварительного увеличения разрешения поступающих изображений.</a:t>
+            </a:r>
+          </a:p>
+          <a:p>
+            <a:endParaRPr lang="ru-RU" cap="none" dirty="0"/>
+          </a:p>
+        </p:txBody>
+      </p:sp>
+      <p:graphicFrame>
+        <p:nvGraphicFramePr>
+          <p:cNvPr id="4" name="Таблица 3">
+            <a:extLst>
+              <a:ext uri="{FF2B5EF4-FFF2-40B4-BE49-F238E27FC236}">
+                <a16:creationId xmlns:a16="http://schemas.microsoft.com/office/drawing/2014/main" id="{729675FB-74FA-41EC-A846-279ACF300D61}"/>
+              </a:ext>
+            </a:extLst>
+          </p:cNvPr>
+          <p:cNvGraphicFramePr>
+            <a:graphicFrameLocks noGrp="1"/>
+          </p:cNvGraphicFramePr>
+          <p:nvPr>
+            <p:extLst>
+              <p:ext uri="{D42A27DB-BD31-4B8C-83A1-F6EECF244321}">
+                <p14:modId xmlns:p14="http://schemas.microsoft.com/office/powerpoint/2010/main" val="3000185942"/>
+              </p:ext>
+            </p:extLst>
+          </p:nvPr>
+        </p:nvGraphicFramePr>
+        <p:xfrm>
+          <a:off x="2031470" y="564554"/>
+          <a:ext cx="8125884" cy="895487"/>
+        </p:xfrm>
+        <a:graphic>
+          <a:graphicData uri="http://schemas.openxmlformats.org/drawingml/2006/table">
+            <a:tbl>
+              <a:tblPr bandRow="1">
+                <a:tableStyleId>{5C22544A-7EE6-4342-B048-85BDC9FD1C3A}</a:tableStyleId>
+              </a:tblPr>
+              <a:tblGrid>
+                <a:gridCol w="4062942">
+                  <a:extLst>
+                    <a:ext uri="{9D8B030D-6E8A-4147-A177-3AD203B41FA5}">
+                      <a16:colId xmlns:a16="http://schemas.microsoft.com/office/drawing/2014/main" val="1717258048"/>
+                    </a:ext>
+                  </a:extLst>
+                </a:gridCol>
+                <a:gridCol w="4062942">
+                  <a:extLst>
+                    <a:ext uri="{9D8B030D-6E8A-4147-A177-3AD203B41FA5}">
+                      <a16:colId xmlns:a16="http://schemas.microsoft.com/office/drawing/2014/main" val="3902171362"/>
+                    </a:ext>
+                  </a:extLst>
+                </a:gridCol>
+              </a:tblGrid>
+              <a:tr h="895487">
+                <a:tc>
+                  <a:txBody>
+                    <a:bodyPr/>
+                    <a:lstStyle/>
+                    <a:p>
+                      <a:pPr marL="0" marR="0" lvl="0" indent="0" algn="ctr" defTabSz="1218987" rtl="0" eaLnBrk="1" fontAlgn="auto" latinLnBrk="0" hangingPunct="1">
+                        <a:lnSpc>
+                          <a:spcPct val="100000"/>
+                        </a:lnSpc>
+                        <a:spcBef>
+                          <a:spcPts val="0"/>
+                        </a:spcBef>
+                        <a:spcAft>
+                          <a:spcPts val="0"/>
+                        </a:spcAft>
+                        <a:buClrTx/>
+                        <a:buSzTx/>
+                        <a:buFontTx/>
+                        <a:buNone/>
+                        <a:tabLst/>
+                        <a:defRPr/>
+                      </a:pPr>
+                      <a:r>
+                        <a:rPr lang="ru-RU" dirty="0"/>
+                        <a:t>Сделать </a:t>
+                      </a:r>
+                      <a:r>
+                        <a:rPr lang="en-US" dirty="0"/>
+                        <a:t>baseline </a:t>
+                      </a:r>
+                      <a:r>
+                        <a:rPr lang="ru-RU" dirty="0"/>
+                        <a:t>решение</a:t>
+                      </a:r>
+                    </a:p>
+                  </a:txBody>
+                  <a:tcPr anchor="ctr"/>
+                </a:tc>
+                <a:tc>
+                  <a:txBody>
+                    <a:bodyPr/>
+                    <a:lstStyle/>
+                    <a:p>
+                      <a:pPr algn="ctr"/>
+                      <a:r>
+                        <a:rPr lang="ru-RU" dirty="0"/>
+                        <a:t>22.03.19 – 04.04.19</a:t>
+                      </a:r>
+                    </a:p>
+                  </a:txBody>
+                  <a:tcPr anchor="ctr"/>
+                </a:tc>
+                <a:extLst>
+                  <a:ext uri="{0D108BD9-81ED-4DB2-BD59-A6C34878D82A}">
+                    <a16:rowId xmlns:a16="http://schemas.microsoft.com/office/drawing/2014/main" val="3728529990"/>
+                  </a:ext>
+                </a:extLst>
+              </a:tr>
+            </a:tbl>
+          </a:graphicData>
+        </a:graphic>
+      </p:graphicFrame>
+      <p:sp>
+        <p:nvSpPr>
+          <p:cNvPr id="9" name="TextBox 8">
+            <a:extLst>
+              <a:ext uri="{FF2B5EF4-FFF2-40B4-BE49-F238E27FC236}">
+                <a16:creationId xmlns:a16="http://schemas.microsoft.com/office/drawing/2014/main" id="{96931D61-EDCC-4BEE-BA8C-16ED8831008B}"/>
+              </a:ext>
+            </a:extLst>
+          </p:cNvPr>
+          <p:cNvSpPr txBox="1"/>
+          <p:nvPr/>
+        </p:nvSpPr>
+        <p:spPr>
+          <a:xfrm>
+            <a:off x="10811021" y="3332631"/>
+            <a:ext cx="453970" cy="523220"/>
+          </a:xfrm>
+          <a:prstGeom prst="rect">
+            <a:avLst/>
+          </a:prstGeom>
+          <a:noFill/>
+        </p:spPr>
+        <p:txBody>
+          <a:bodyPr wrap="none" rtlCol="0">
+            <a:spAutoFit/>
+          </a:bodyPr>
+          <a:lstStyle/>
+          <a:p>
+            <a:r>
+              <a:rPr lang="ru-RU" sz="2800" dirty="0">
+                <a:solidFill>
+                  <a:srgbClr val="00B050"/>
+                </a:solidFill>
+              </a:rPr>
+              <a:t>✓</a:t>
+            </a:r>
+            <a:endParaRPr lang="ru-RU" sz="2800" dirty="0"/>
+          </a:p>
+        </p:txBody>
+      </p:sp>
+      <p:sp>
+        <p:nvSpPr>
+          <p:cNvPr id="10" name="TextBox 9">
+            <a:extLst>
+              <a:ext uri="{FF2B5EF4-FFF2-40B4-BE49-F238E27FC236}">
+                <a16:creationId xmlns:a16="http://schemas.microsoft.com/office/drawing/2014/main" id="{AF219617-C411-4E8D-A618-4B03584D993B}"/>
+              </a:ext>
+            </a:extLst>
+          </p:cNvPr>
+          <p:cNvSpPr txBox="1"/>
+          <p:nvPr/>
+        </p:nvSpPr>
+        <p:spPr>
+          <a:xfrm>
+            <a:off x="10811021" y="3682410"/>
+            <a:ext cx="453970" cy="523220"/>
+          </a:xfrm>
+          <a:prstGeom prst="rect">
+            <a:avLst/>
+          </a:prstGeom>
+          <a:noFill/>
+        </p:spPr>
+        <p:txBody>
+          <a:bodyPr wrap="none" rtlCol="0">
+            <a:spAutoFit/>
+          </a:bodyPr>
+          <a:lstStyle/>
+          <a:p>
+            <a:r>
+              <a:rPr lang="ru-RU" sz="2800" dirty="0">
+                <a:solidFill>
+                  <a:srgbClr val="00B050"/>
+                </a:solidFill>
+              </a:rPr>
+              <a:t>✓</a:t>
+            </a:r>
+            <a:endParaRPr lang="ru-RU" sz="2800" dirty="0"/>
+          </a:p>
+        </p:txBody>
+      </p:sp>
+      <p:sp>
+        <p:nvSpPr>
+          <p:cNvPr id="11" name="TextBox 10">
+            <a:extLst>
+              <a:ext uri="{FF2B5EF4-FFF2-40B4-BE49-F238E27FC236}">
+                <a16:creationId xmlns:a16="http://schemas.microsoft.com/office/drawing/2014/main" id="{FA344215-AEA5-4717-8D33-EF24225DF3F7}"/>
+              </a:ext>
+            </a:extLst>
+          </p:cNvPr>
+          <p:cNvSpPr txBox="1"/>
+          <p:nvPr/>
+        </p:nvSpPr>
+        <p:spPr>
+          <a:xfrm>
+            <a:off x="10812995" y="2492896"/>
+            <a:ext cx="453970" cy="523220"/>
+          </a:xfrm>
+          <a:prstGeom prst="rect">
+            <a:avLst/>
+          </a:prstGeom>
+          <a:noFill/>
+        </p:spPr>
+        <p:txBody>
+          <a:bodyPr wrap="square" rtlCol="0">
+            <a:spAutoFit/>
+          </a:bodyPr>
+          <a:lstStyle/>
+          <a:p>
+            <a:r>
+              <a:rPr lang="ru-RU" sz="2800" dirty="0">
+                <a:solidFill>
+                  <a:srgbClr val="00B050"/>
+                </a:solidFill>
+              </a:rPr>
+              <a:t>✓</a:t>
+            </a:r>
+            <a:endParaRPr lang="ru-RU" sz="2800" dirty="0"/>
+          </a:p>
+        </p:txBody>
+      </p:sp>
+    </p:spTree>
+    <p:extLst>
+      <p:ext uri="{BB962C8B-B14F-4D97-AF65-F5344CB8AC3E}">
+        <p14:creationId xmlns:p14="http://schemas.microsoft.com/office/powerpoint/2010/main" val="437972236"/>
+      </p:ext>
+    </p:extLst>
+  </p:cSld>
+  <p:clrMapOvr>
+    <a:masterClrMapping/>
+  </p:clrMapOvr>
+  <mc:AlternateContent xmlns:mc="http://schemas.openxmlformats.org/markup-compatibility/2006" xmlns:p14="http://schemas.microsoft.com/office/powerpoint/2010/main">
+    <mc:Choice Requires="p14">
+      <p:transition spd="med" p14:dur="700">
+        <p:fade/>
+      </p:transition>
+    </mc:Choice>
+    <mc:Fallback xmlns="">
+      <p:transition spd="med">
+        <p:fade/>
+      </p:transition>
+    </mc:Fallback>
+  </mc:AlternateContent>
+</p:sld>
+</file>
+
+<file path=ppt/slides/slide9.xml><?xml version="1.0" encoding="utf-8"?>
+<p:sld xmlns:a="http://schemas.openxmlformats.org/drawingml/2006/main" xmlns:r="http://schemas.openxmlformats.org/officeDocument/2006/relationships" xmlns:p="http://schemas.openxmlformats.org/presentationml/2006/main">
+  <p:cSld>
+    <p:spTree>
+      <p:nvGrpSpPr>
+        <p:cNvPr id="1" name=""/>
+        <p:cNvGrpSpPr/>
+        <p:nvPr/>
+      </p:nvGrpSpPr>
+      <p:grpSpPr>
+        <a:xfrm>
+          <a:off x="0" y="0"/>
+          <a:ext cx="0" cy="0"/>
+          <a:chOff x="0" y="0"/>
+          <a:chExt cx="0" cy="0"/>
+        </a:xfrm>
+      </p:grpSpPr>
+      <p:sp>
+        <p:nvSpPr>
+          <p:cNvPr id="3" name="Подзаголовок 2">
+            <a:extLst>
+              <a:ext uri="{FF2B5EF4-FFF2-40B4-BE49-F238E27FC236}">
+                <a16:creationId xmlns:a16="http://schemas.microsoft.com/office/drawing/2014/main" id="{E92BA08A-6BE6-4489-9B4A-C01DB2981FFC}"/>
+              </a:ext>
+            </a:extLst>
+          </p:cNvPr>
+          <p:cNvSpPr>
+            <a:spLocks noGrp="1"/>
+          </p:cNvSpPr>
+          <p:nvPr>
+            <p:ph type="subTitle" idx="1"/>
+          </p:nvPr>
+        </p:nvSpPr>
+        <p:spPr>
+          <a:xfrm>
+            <a:off x="945840" y="119391"/>
+            <a:ext cx="10297144" cy="2444766"/>
+          </a:xfrm>
+        </p:spPr>
+        <p:txBody>
+          <a:bodyPr>
+            <a:normAutofit/>
+          </a:bodyPr>
+          <a:lstStyle/>
+          <a:p>
+            <a:r>
+              <a:rPr lang="ru-RU" sz="1800" cap="none" dirty="0"/>
+              <a:t>Результат:</a:t>
+            </a:r>
+          </a:p>
+          <a:p>
+            <a:pPr marL="457200" indent="-457200">
+              <a:buFont typeface="+mj-lt"/>
+              <a:buAutoNum type="arabicPeriod"/>
+            </a:pPr>
+            <a:r>
+              <a:rPr lang="ru-RU" sz="1800" cap="none" dirty="0"/>
+              <a:t>Использовано решение </a:t>
+            </a:r>
+            <a:r>
+              <a:rPr lang="en-US" sz="1800" cap="none" dirty="0">
+                <a:hlinkClick r:id="rId2"/>
+              </a:rPr>
+              <a:t>DCSCN</a:t>
+            </a:r>
+            <a:r>
+              <a:rPr lang="ru-RU" sz="1800" cap="none" dirty="0"/>
+              <a:t> по улучшению качества изображений;</a:t>
+            </a:r>
+          </a:p>
+          <a:p>
+            <a:pPr marL="457200" indent="-457200">
+              <a:buFont typeface="+mj-lt"/>
+              <a:buAutoNum type="arabicPeriod"/>
+            </a:pPr>
+            <a:r>
+              <a:rPr lang="ru-RU" sz="1800" cap="none" dirty="0"/>
+              <a:t>Получена модель</a:t>
+            </a:r>
+            <a:r>
+              <a:rPr lang="en-US" sz="1800" cap="none" dirty="0"/>
+              <a:t> </a:t>
+            </a:r>
+            <a:r>
+              <a:rPr lang="ru-RU" sz="1800" cap="none" dirty="0"/>
+              <a:t>распознавания, использующая </a:t>
+            </a:r>
+            <a:r>
+              <a:rPr lang="en-US" sz="1800" cap="none" dirty="0">
+                <a:hlinkClick r:id="rId3"/>
+              </a:rPr>
+              <a:t>MTCNN</a:t>
+            </a:r>
+            <a:r>
+              <a:rPr lang="en-US" sz="1800" cap="none" dirty="0"/>
+              <a:t> </a:t>
+            </a:r>
+            <a:r>
+              <a:rPr lang="ru-RU" sz="1800" cap="none" dirty="0"/>
+              <a:t>в качестве определения дескрипторов лица, которая получает на вход 2 изображения, находит лица на них и определяет, принадлежат ли они одному и тому же человеку;</a:t>
+            </a:r>
+          </a:p>
+          <a:p>
+            <a:pPr marL="457200" indent="-457200">
+              <a:buFont typeface="+mj-lt"/>
+              <a:buAutoNum type="arabicPeriod"/>
+            </a:pPr>
+            <a:r>
+              <a:rPr lang="ru-RU" sz="1800" cap="none" dirty="0"/>
+              <a:t>Взяли 300 пар фотографий людей, прогнали их через </a:t>
+            </a:r>
+            <a:r>
+              <a:rPr lang="en-US" sz="1800" cap="none" dirty="0">
+                <a:hlinkClick r:id="rId2"/>
+              </a:rPr>
+              <a:t>DCSCN</a:t>
+            </a:r>
+            <a:r>
+              <a:rPr lang="ru-RU" sz="1800" cap="none" dirty="0"/>
+              <a:t> и получили увеличение разрешения в 2 раза. </a:t>
+            </a:r>
+            <a:br>
+              <a:rPr lang="ru-RU" sz="1800" cap="none" dirty="0"/>
+            </a:br>
+            <a:r>
+              <a:rPr lang="ru-RU" sz="1800" cap="none" dirty="0"/>
+              <a:t>Сравнили точность распознавания до и после, результат: 82% против 85%.</a:t>
+            </a:r>
+          </a:p>
+        </p:txBody>
+      </p:sp>
+      <p:pic>
+        <p:nvPicPr>
+          <p:cNvPr id="7" name="Рисунок 6">
+            <a:extLst>
+              <a:ext uri="{FF2B5EF4-FFF2-40B4-BE49-F238E27FC236}">
+                <a16:creationId xmlns:a16="http://schemas.microsoft.com/office/drawing/2014/main" id="{23A240C9-B8BF-4735-8152-79D906DBBF61}"/>
+              </a:ext>
+            </a:extLst>
+          </p:cNvPr>
+          <p:cNvPicPr>
+            <a:picLocks noChangeAspect="1"/>
+          </p:cNvPicPr>
+          <p:nvPr/>
+        </p:nvPicPr>
+        <p:blipFill>
+          <a:blip r:embed="rId4">
+            <a:extLst>
+              <a:ext uri="{28A0092B-C50C-407E-A947-70E740481C1C}">
+                <a14:useLocalDpi xmlns:a14="http://schemas.microsoft.com/office/drawing/2010/main" val="0"/>
+              </a:ext>
+            </a:extLst>
+          </a:blip>
+          <a:stretch>
+            <a:fillRect/>
+          </a:stretch>
+        </p:blipFill>
+        <p:spPr>
+          <a:xfrm>
+            <a:off x="189756" y="2852936"/>
+            <a:ext cx="1512168" cy="1512168"/>
+          </a:xfrm>
+          <a:prstGeom prst="rect">
+            <a:avLst/>
+          </a:prstGeom>
+        </p:spPr>
+      </p:pic>
+      <p:pic>
+        <p:nvPicPr>
+          <p:cNvPr id="9" name="Рисунок 8">
+            <a:extLst>
+              <a:ext uri="{FF2B5EF4-FFF2-40B4-BE49-F238E27FC236}">
+                <a16:creationId xmlns:a16="http://schemas.microsoft.com/office/drawing/2014/main" id="{79433BCC-967E-4856-9196-FE9B60FF655E}"/>
+              </a:ext>
+            </a:extLst>
+          </p:cNvPr>
+          <p:cNvPicPr>
+            <a:picLocks noChangeAspect="1"/>
+          </p:cNvPicPr>
+          <p:nvPr/>
+        </p:nvPicPr>
+        <p:blipFill>
+          <a:blip r:embed="rId5">
+            <a:extLst>
+              <a:ext uri="{28A0092B-C50C-407E-A947-70E740481C1C}">
+                <a14:useLocalDpi xmlns:a14="http://schemas.microsoft.com/office/drawing/2010/main" val="0"/>
+              </a:ext>
+            </a:extLst>
+          </a:blip>
+          <a:stretch>
+            <a:fillRect/>
+          </a:stretch>
+        </p:blipFill>
+        <p:spPr>
+          <a:xfrm>
+            <a:off x="2140255" y="2852936"/>
+            <a:ext cx="1512168" cy="1512168"/>
+          </a:xfrm>
+          <a:prstGeom prst="rect">
+            <a:avLst/>
+          </a:prstGeom>
+        </p:spPr>
+      </p:pic>
+      <p:cxnSp>
+        <p:nvCxnSpPr>
+          <p:cNvPr id="11" name="Прямая со стрелкой 10">
+            <a:extLst>
+              <a:ext uri="{FF2B5EF4-FFF2-40B4-BE49-F238E27FC236}">
+                <a16:creationId xmlns:a16="http://schemas.microsoft.com/office/drawing/2014/main" id="{0F701249-980B-4BAF-8655-035F9AB489B2}"/>
+              </a:ext>
+            </a:extLst>
+          </p:cNvPr>
+          <p:cNvCxnSpPr>
+            <a:cxnSpLocks/>
+            <a:stCxn id="7" idx="3"/>
+            <a:endCxn id="9" idx="1"/>
+          </p:cNvCxnSpPr>
+          <p:nvPr/>
+        </p:nvCxnSpPr>
+        <p:spPr>
+          <a:xfrm>
+            <a:off x="1701924" y="3609020"/>
+            <a:ext cx="438331" cy="0"/>
+          </a:xfrm>
+          <a:prstGeom prst="straightConnector1">
+            <a:avLst/>
+          </a:prstGeom>
+          <a:ln w="25400">
+            <a:tailEnd type="triangle"/>
+          </a:ln>
+        </p:spPr>
+        <p:style>
+          <a:lnRef idx="1">
+            <a:schemeClr val="accent1"/>
+          </a:lnRef>
+          <a:fillRef idx="0">
+            <a:schemeClr val="accent1"/>
+          </a:fillRef>
+          <a:effectRef idx="0">
+            <a:schemeClr val="accent1"/>
+          </a:effectRef>
+          <a:fontRef idx="minor">
+            <a:schemeClr val="tx1"/>
+          </a:fontRef>
+        </p:style>
+      </p:cxnSp>
+      <p:pic>
+        <p:nvPicPr>
+          <p:cNvPr id="18" name="Рисунок 17">
+            <a:extLst>
+              <a:ext uri="{FF2B5EF4-FFF2-40B4-BE49-F238E27FC236}">
+                <a16:creationId xmlns:a16="http://schemas.microsoft.com/office/drawing/2014/main" id="{22DE1D9F-ED4D-4252-8B4F-6563725A96B1}"/>
+              </a:ext>
+            </a:extLst>
+          </p:cNvPr>
+          <p:cNvPicPr>
+            <a:picLocks noChangeAspect="1"/>
+          </p:cNvPicPr>
+          <p:nvPr/>
+        </p:nvPicPr>
+        <p:blipFill>
+          <a:blip r:embed="rId6">
+            <a:extLst>
+              <a:ext uri="{28A0092B-C50C-407E-A947-70E740481C1C}">
+                <a14:useLocalDpi xmlns:a14="http://schemas.microsoft.com/office/drawing/2010/main" val="0"/>
+              </a:ext>
+            </a:extLst>
+          </a:blip>
+          <a:stretch>
+            <a:fillRect/>
+          </a:stretch>
+        </p:blipFill>
+        <p:spPr>
+          <a:xfrm>
+            <a:off x="189756" y="4817282"/>
+            <a:ext cx="1512168" cy="1512168"/>
+          </a:xfrm>
+          <a:prstGeom prst="rect">
+            <a:avLst/>
+          </a:prstGeom>
+        </p:spPr>
+      </p:pic>
+      <p:pic>
+        <p:nvPicPr>
+          <p:cNvPr id="20" name="Рисунок 19">
+            <a:extLst>
+              <a:ext uri="{FF2B5EF4-FFF2-40B4-BE49-F238E27FC236}">
+                <a16:creationId xmlns:a16="http://schemas.microsoft.com/office/drawing/2014/main" id="{F69EF949-C969-4BD6-9F5F-87E3B064A166}"/>
+              </a:ext>
+            </a:extLst>
+          </p:cNvPr>
+          <p:cNvPicPr>
+            <a:picLocks noChangeAspect="1"/>
+          </p:cNvPicPr>
+          <p:nvPr/>
+        </p:nvPicPr>
+        <p:blipFill>
+          <a:blip r:embed="rId7">
+            <a:extLst>
+              <a:ext uri="{28A0092B-C50C-407E-A947-70E740481C1C}">
+                <a14:useLocalDpi xmlns:a14="http://schemas.microsoft.com/office/drawing/2010/main" val="0"/>
+              </a:ext>
+            </a:extLst>
+          </a:blip>
+          <a:stretch>
+            <a:fillRect/>
+          </a:stretch>
+        </p:blipFill>
+        <p:spPr>
+          <a:xfrm>
+            <a:off x="2108450" y="4817282"/>
+            <a:ext cx="1512168" cy="1512168"/>
+          </a:xfrm>
+          <a:prstGeom prst="rect">
+            <a:avLst/>
+          </a:prstGeom>
+        </p:spPr>
+      </p:pic>
+      <p:cxnSp>
+        <p:nvCxnSpPr>
+          <p:cNvPr id="23" name="Прямая со стрелкой 22">
+            <a:extLst>
+              <a:ext uri="{FF2B5EF4-FFF2-40B4-BE49-F238E27FC236}">
+                <a16:creationId xmlns:a16="http://schemas.microsoft.com/office/drawing/2014/main" id="{852C2F7C-D171-4E2C-83E7-48D6CDA7BDBD}"/>
+              </a:ext>
+            </a:extLst>
+          </p:cNvPr>
+          <p:cNvCxnSpPr>
+            <a:cxnSpLocks/>
+            <a:stCxn id="18" idx="3"/>
+            <a:endCxn id="20" idx="1"/>
+          </p:cNvCxnSpPr>
+          <p:nvPr/>
+        </p:nvCxnSpPr>
+        <p:spPr>
+          <a:xfrm>
+            <a:off x="1701924" y="5573366"/>
+            <a:ext cx="406526" cy="0"/>
+          </a:xfrm>
+          <a:prstGeom prst="straightConnector1">
+            <a:avLst/>
+          </a:prstGeom>
+          <a:ln w="25400">
+            <a:tailEnd type="triangle"/>
+          </a:ln>
+        </p:spPr>
+        <p:style>
+          <a:lnRef idx="1">
+            <a:schemeClr val="accent1"/>
+          </a:lnRef>
+          <a:fillRef idx="0">
+            <a:schemeClr val="accent1"/>
+          </a:fillRef>
+          <a:effectRef idx="0">
+            <a:schemeClr val="accent1"/>
+          </a:effectRef>
+          <a:fontRef idx="minor">
+            <a:schemeClr val="tx1"/>
+          </a:fontRef>
+        </p:style>
+      </p:cxnSp>
+      <p:sp>
+        <p:nvSpPr>
+          <p:cNvPr id="26" name="TextBox 25">
+            <a:extLst>
+              <a:ext uri="{FF2B5EF4-FFF2-40B4-BE49-F238E27FC236}">
+                <a16:creationId xmlns:a16="http://schemas.microsoft.com/office/drawing/2014/main" id="{5510DB3B-FE9A-40BA-88FA-B337FB007EAE}"/>
+              </a:ext>
+            </a:extLst>
+          </p:cNvPr>
+          <p:cNvSpPr txBox="1"/>
+          <p:nvPr/>
+        </p:nvSpPr>
+        <p:spPr>
+          <a:xfrm>
+            <a:off x="189756" y="4322768"/>
+            <a:ext cx="1424044" cy="523220"/>
+          </a:xfrm>
+          <a:prstGeom prst="rect">
+            <a:avLst/>
+          </a:prstGeom>
+          <a:noFill/>
+        </p:spPr>
+        <p:txBody>
+          <a:bodyPr wrap="none" rtlCol="0">
+            <a:spAutoFit/>
+          </a:bodyPr>
+          <a:lstStyle/>
+          <a:p>
+            <a:pPr algn="ctr"/>
+            <a:r>
+              <a:rPr lang="en-US" sz="2800" dirty="0"/>
+              <a:t>scale=x1</a:t>
+            </a:r>
+            <a:endParaRPr lang="ru-RU" sz="2800" dirty="0"/>
+          </a:p>
+        </p:txBody>
+      </p:sp>
+      <p:pic>
+        <p:nvPicPr>
+          <p:cNvPr id="48" name="Рисунок 47">
+            <a:extLst>
+              <a:ext uri="{FF2B5EF4-FFF2-40B4-BE49-F238E27FC236}">
+                <a16:creationId xmlns:a16="http://schemas.microsoft.com/office/drawing/2014/main" id="{5B375FC6-7BD3-43C0-9B93-AF8AA0943422}"/>
+              </a:ext>
+            </a:extLst>
+          </p:cNvPr>
+          <p:cNvPicPr>
+            <a:picLocks noChangeAspect="1"/>
+          </p:cNvPicPr>
+          <p:nvPr/>
+        </p:nvPicPr>
+        <p:blipFill>
+          <a:blip r:embed="rId4">
+            <a:extLst>
+              <a:ext uri="{28A0092B-C50C-407E-A947-70E740481C1C}">
+                <a14:useLocalDpi xmlns:a14="http://schemas.microsoft.com/office/drawing/2010/main" val="0"/>
+              </a:ext>
+            </a:extLst>
+          </a:blip>
+          <a:stretch>
+            <a:fillRect/>
+          </a:stretch>
+        </p:blipFill>
+        <p:spPr>
+          <a:xfrm>
+            <a:off x="10482843" y="2852936"/>
+            <a:ext cx="1512168" cy="1512168"/>
+          </a:xfrm>
+          <a:prstGeom prst="rect">
+            <a:avLst/>
+          </a:prstGeom>
+        </p:spPr>
+      </p:pic>
+      <p:pic>
+        <p:nvPicPr>
+          <p:cNvPr id="49" name="Рисунок 48">
+            <a:extLst>
+              <a:ext uri="{FF2B5EF4-FFF2-40B4-BE49-F238E27FC236}">
+                <a16:creationId xmlns:a16="http://schemas.microsoft.com/office/drawing/2014/main" id="{1FACB723-B33A-4307-AC60-3037534556BC}"/>
+              </a:ext>
+            </a:extLst>
+          </p:cNvPr>
+          <p:cNvPicPr>
+            <a:picLocks noChangeAspect="1"/>
+          </p:cNvPicPr>
+          <p:nvPr/>
+        </p:nvPicPr>
+        <p:blipFill>
+          <a:blip r:embed="rId5">
+            <a:extLst>
+              <a:ext uri="{28A0092B-C50C-407E-A947-70E740481C1C}">
+                <a14:useLocalDpi xmlns:a14="http://schemas.microsoft.com/office/drawing/2010/main" val="0"/>
+              </a:ext>
+            </a:extLst>
+          </a:blip>
+          <a:stretch>
+            <a:fillRect/>
+          </a:stretch>
+        </p:blipFill>
+        <p:spPr>
+          <a:xfrm>
+            <a:off x="8574231" y="2850298"/>
+            <a:ext cx="1512168" cy="1512168"/>
+          </a:xfrm>
+          <a:prstGeom prst="rect">
+            <a:avLst/>
+          </a:prstGeom>
+        </p:spPr>
+      </p:pic>
+      <p:cxnSp>
+        <p:nvCxnSpPr>
+          <p:cNvPr id="50" name="Прямая со стрелкой 49">
+            <a:extLst>
+              <a:ext uri="{FF2B5EF4-FFF2-40B4-BE49-F238E27FC236}">
+                <a16:creationId xmlns:a16="http://schemas.microsoft.com/office/drawing/2014/main" id="{503CDDF9-7B44-49AB-9229-7A7E26A2C350}"/>
+              </a:ext>
+            </a:extLst>
+          </p:cNvPr>
+          <p:cNvCxnSpPr>
+            <a:cxnSpLocks/>
+            <a:stCxn id="48" idx="1"/>
+            <a:endCxn id="49" idx="3"/>
+          </p:cNvCxnSpPr>
+          <p:nvPr/>
+        </p:nvCxnSpPr>
+        <p:spPr>
+          <a:xfrm flipH="1" flipV="1">
+            <a:off x="10086399" y="3606382"/>
+            <a:ext cx="396444" cy="2638"/>
+          </a:xfrm>
+          <a:prstGeom prst="straightConnector1">
+            <a:avLst/>
+          </a:prstGeom>
+          <a:ln w="25400">
+            <a:tailEnd type="triangle"/>
+          </a:ln>
+        </p:spPr>
+        <p:style>
+          <a:lnRef idx="1">
+            <a:schemeClr val="accent1"/>
+          </a:lnRef>
+          <a:fillRef idx="0">
+            <a:schemeClr val="accent1"/>
+          </a:fillRef>
+          <a:effectRef idx="0">
+            <a:schemeClr val="accent1"/>
+          </a:effectRef>
+          <a:fontRef idx="minor">
+            <a:schemeClr val="tx1"/>
+          </a:fontRef>
+        </p:style>
+      </p:cxnSp>
+      <p:pic>
+        <p:nvPicPr>
+          <p:cNvPr id="51" name="Рисунок 50">
+            <a:extLst>
+              <a:ext uri="{FF2B5EF4-FFF2-40B4-BE49-F238E27FC236}">
+                <a16:creationId xmlns:a16="http://schemas.microsoft.com/office/drawing/2014/main" id="{8479C965-902F-46E8-9800-37611FF0F3EC}"/>
+              </a:ext>
+            </a:extLst>
+          </p:cNvPr>
+          <p:cNvPicPr>
+            <a:picLocks noChangeAspect="1"/>
+          </p:cNvPicPr>
+          <p:nvPr/>
+        </p:nvPicPr>
+        <p:blipFill>
+          <a:blip r:embed="rId6">
+            <a:extLst>
+              <a:ext uri="{28A0092B-C50C-407E-A947-70E740481C1C}">
+                <a14:useLocalDpi xmlns:a14="http://schemas.microsoft.com/office/drawing/2010/main" val="0"/>
+              </a:ext>
+            </a:extLst>
+          </a:blip>
+          <a:stretch>
+            <a:fillRect/>
+          </a:stretch>
+        </p:blipFill>
+        <p:spPr>
+          <a:xfrm>
+            <a:off x="10482843" y="4811696"/>
+            <a:ext cx="1512168" cy="1512168"/>
+          </a:xfrm>
+          <a:prstGeom prst="rect">
+            <a:avLst/>
+          </a:prstGeom>
+        </p:spPr>
+      </p:pic>
+      <p:pic>
+        <p:nvPicPr>
+          <p:cNvPr id="52" name="Рисунок 51">
+            <a:extLst>
+              <a:ext uri="{FF2B5EF4-FFF2-40B4-BE49-F238E27FC236}">
+                <a16:creationId xmlns:a16="http://schemas.microsoft.com/office/drawing/2014/main" id="{979860C5-7A5B-44B2-AEB0-49116A95E52D}"/>
+              </a:ext>
+            </a:extLst>
+          </p:cNvPr>
+          <p:cNvPicPr>
+            <a:picLocks noChangeAspect="1"/>
+          </p:cNvPicPr>
+          <p:nvPr/>
+        </p:nvPicPr>
+        <p:blipFill>
+          <a:blip r:embed="rId7">
+            <a:extLst>
+              <a:ext uri="{28A0092B-C50C-407E-A947-70E740481C1C}">
+                <a14:useLocalDpi xmlns:a14="http://schemas.microsoft.com/office/drawing/2010/main" val="0"/>
+              </a:ext>
+            </a:extLst>
+          </a:blip>
+          <a:stretch>
+            <a:fillRect/>
+          </a:stretch>
+        </p:blipFill>
+        <p:spPr>
+          <a:xfrm>
+            <a:off x="8583434" y="4811696"/>
+            <a:ext cx="1512168" cy="1512168"/>
+          </a:xfrm>
+          <a:prstGeom prst="rect">
+            <a:avLst/>
+          </a:prstGeom>
+        </p:spPr>
+      </p:pic>
+      <p:sp>
+        <p:nvSpPr>
+          <p:cNvPr id="55" name="TextBox 54">
+            <a:extLst>
+              <a:ext uri="{FF2B5EF4-FFF2-40B4-BE49-F238E27FC236}">
+                <a16:creationId xmlns:a16="http://schemas.microsoft.com/office/drawing/2014/main" id="{DE20B017-5E67-432E-A2E6-D67EC9D3A932}"/>
+              </a:ext>
+            </a:extLst>
+          </p:cNvPr>
+          <p:cNvSpPr txBox="1"/>
+          <p:nvPr/>
+        </p:nvSpPr>
+        <p:spPr>
+          <a:xfrm>
+            <a:off x="10526905" y="4326981"/>
+            <a:ext cx="1424044" cy="523220"/>
+          </a:xfrm>
+          <a:prstGeom prst="rect">
+            <a:avLst/>
+          </a:prstGeom>
+          <a:noFill/>
+        </p:spPr>
+        <p:txBody>
+          <a:bodyPr wrap="none" rtlCol="0">
+            <a:spAutoFit/>
+          </a:bodyPr>
+          <a:lstStyle/>
+          <a:p>
+            <a:pPr algn="ctr"/>
+            <a:r>
+              <a:rPr lang="en-US" sz="2800" dirty="0"/>
+              <a:t>scale=x</a:t>
+            </a:r>
+            <a:r>
+              <a:rPr lang="ru-RU" sz="2800" dirty="0"/>
+              <a:t>2</a:t>
+            </a:r>
+          </a:p>
+        </p:txBody>
+      </p:sp>
+      <p:cxnSp>
+        <p:nvCxnSpPr>
+          <p:cNvPr id="66" name="Прямая со стрелкой 65">
+            <a:extLst>
+              <a:ext uri="{FF2B5EF4-FFF2-40B4-BE49-F238E27FC236}">
+                <a16:creationId xmlns:a16="http://schemas.microsoft.com/office/drawing/2014/main" id="{559D50D8-9F33-45E1-84F4-F7E660083596}"/>
+              </a:ext>
+            </a:extLst>
+          </p:cNvPr>
+          <p:cNvCxnSpPr>
+            <a:cxnSpLocks/>
+            <a:stCxn id="51" idx="1"/>
+            <a:endCxn id="52" idx="3"/>
+          </p:cNvCxnSpPr>
+          <p:nvPr/>
+        </p:nvCxnSpPr>
+        <p:spPr>
+          <a:xfrm flipH="1">
+            <a:off x="10095602" y="5567780"/>
+            <a:ext cx="387241" cy="0"/>
+          </a:xfrm>
+          <a:prstGeom prst="straightConnector1">
+            <a:avLst/>
+          </a:prstGeom>
+          <a:ln w="25400">
+            <a:tailEnd type="triangle"/>
+          </a:ln>
+        </p:spPr>
+        <p:style>
+          <a:lnRef idx="1">
+            <a:schemeClr val="accent1"/>
+          </a:lnRef>
+          <a:fillRef idx="0">
+            <a:schemeClr val="accent1"/>
+          </a:fillRef>
+          <a:effectRef idx="0">
+            <a:schemeClr val="accent1"/>
+          </a:effectRef>
+          <a:fontRef idx="minor">
+            <a:schemeClr val="tx1"/>
+          </a:fontRef>
+        </p:style>
+      </p:cxnSp>
+      <p:sp>
+        <p:nvSpPr>
+          <p:cNvPr id="81" name="Прямоугольник 80">
+            <a:extLst>
+              <a:ext uri="{FF2B5EF4-FFF2-40B4-BE49-F238E27FC236}">
+                <a16:creationId xmlns:a16="http://schemas.microsoft.com/office/drawing/2014/main" id="{349211E1-CDA7-4736-909C-597076541CB5}"/>
+              </a:ext>
+            </a:extLst>
+          </p:cNvPr>
+          <p:cNvSpPr/>
+          <p:nvPr/>
+        </p:nvSpPr>
+        <p:spPr>
+          <a:xfrm>
+            <a:off x="4793109" y="4841667"/>
+            <a:ext cx="2592288" cy="914400"/>
+          </a:xfrm>
+          <a:prstGeom prst="rect">
+            <a:avLst/>
+          </a:prstGeom>
+          <a:noFill/>
+        </p:spPr>
+        <p:style>
+          <a:lnRef idx="2">
+            <a:schemeClr val="accent1"/>
+          </a:lnRef>
+          <a:fillRef idx="1">
+            <a:schemeClr val="lt1"/>
+          </a:fillRef>
+          <a:effectRef idx="0">
+            <a:schemeClr val="accent1"/>
+          </a:effectRef>
+          <a:fontRef idx="minor">
+            <a:schemeClr val="dk1"/>
+          </a:fontRef>
+        </p:style>
+        <p:txBody>
+          <a:bodyPr rtlCol="0" anchor="ctr"/>
+          <a:lstStyle/>
+          <a:p>
+            <a:pPr algn="ctr"/>
+            <a:r>
+              <a:rPr lang="ru-RU" sz="2800" dirty="0" err="1">
+                <a:solidFill>
+                  <a:srgbClr val="009999"/>
+                </a:solidFill>
+              </a:rPr>
+              <a:t>Распознавалка</a:t>
+            </a:r>
+            <a:endParaRPr lang="ru-RU" sz="2800" dirty="0">
+              <a:solidFill>
+                <a:srgbClr val="009999"/>
+              </a:solidFill>
+            </a:endParaRPr>
+          </a:p>
+        </p:txBody>
+      </p:sp>
+      <p:cxnSp>
+        <p:nvCxnSpPr>
+          <p:cNvPr id="93" name="Прямая со стрелкой 92">
+            <a:extLst>
+              <a:ext uri="{FF2B5EF4-FFF2-40B4-BE49-F238E27FC236}">
+                <a16:creationId xmlns:a16="http://schemas.microsoft.com/office/drawing/2014/main" id="{348ACFD8-2A22-4992-A845-E3F38D07B56C}"/>
+              </a:ext>
+            </a:extLst>
+          </p:cNvPr>
+          <p:cNvCxnSpPr>
+            <a:cxnSpLocks/>
+          </p:cNvCxnSpPr>
+          <p:nvPr/>
+        </p:nvCxnSpPr>
+        <p:spPr>
+          <a:xfrm>
+            <a:off x="5132786" y="5756067"/>
+            <a:ext cx="0" cy="337229"/>
+          </a:xfrm>
+          <a:prstGeom prst="straightConnector1">
+            <a:avLst/>
+          </a:prstGeom>
+          <a:ln w="25400">
+            <a:tailEnd type="triangle"/>
+          </a:ln>
+        </p:spPr>
+        <p:style>
+          <a:lnRef idx="1">
+            <a:schemeClr val="accent1"/>
+          </a:lnRef>
+          <a:fillRef idx="0">
+            <a:schemeClr val="accent1"/>
+          </a:fillRef>
+          <a:effectRef idx="0">
+            <a:schemeClr val="accent1"/>
+          </a:effectRef>
+          <a:fontRef idx="minor">
+            <a:schemeClr val="tx1"/>
+          </a:fontRef>
+        </p:style>
+      </p:cxnSp>
+      <p:cxnSp>
+        <p:nvCxnSpPr>
+          <p:cNvPr id="95" name="Прямая со стрелкой 94">
+            <a:extLst>
+              <a:ext uri="{FF2B5EF4-FFF2-40B4-BE49-F238E27FC236}">
+                <a16:creationId xmlns:a16="http://schemas.microsoft.com/office/drawing/2014/main" id="{8A68F71C-2469-4291-8852-8B7EAD698BCF}"/>
+              </a:ext>
+            </a:extLst>
+          </p:cNvPr>
+          <p:cNvCxnSpPr>
+            <a:cxnSpLocks/>
+          </p:cNvCxnSpPr>
+          <p:nvPr/>
+        </p:nvCxnSpPr>
+        <p:spPr>
+          <a:xfrm>
+            <a:off x="7102524" y="5760083"/>
+            <a:ext cx="0" cy="337229"/>
+          </a:xfrm>
+          <a:prstGeom prst="straightConnector1">
+            <a:avLst/>
+          </a:prstGeom>
+          <a:ln w="25400">
+            <a:tailEnd type="triangle"/>
+          </a:ln>
+        </p:spPr>
+        <p:style>
+          <a:lnRef idx="1">
+            <a:schemeClr val="accent1"/>
+          </a:lnRef>
+          <a:fillRef idx="0">
+            <a:schemeClr val="accent1"/>
+          </a:fillRef>
+          <a:effectRef idx="0">
+            <a:schemeClr val="accent1"/>
+          </a:effectRef>
+          <a:fontRef idx="minor">
+            <a:schemeClr val="tx1"/>
+          </a:fontRef>
+        </p:style>
+      </p:cxnSp>
+      <p:sp>
+        <p:nvSpPr>
+          <p:cNvPr id="96" name="TextBox 95">
+            <a:extLst>
+              <a:ext uri="{FF2B5EF4-FFF2-40B4-BE49-F238E27FC236}">
+                <a16:creationId xmlns:a16="http://schemas.microsoft.com/office/drawing/2014/main" id="{24FCDE61-BE2E-44B6-91E3-BCF767E31F30}"/>
+              </a:ext>
+            </a:extLst>
+          </p:cNvPr>
+          <p:cNvSpPr txBox="1"/>
+          <p:nvPr/>
+        </p:nvSpPr>
+        <p:spPr>
+          <a:xfrm>
+            <a:off x="4729721" y="6062254"/>
+            <a:ext cx="806631" cy="523220"/>
+          </a:xfrm>
+          <a:prstGeom prst="rect">
+            <a:avLst/>
+          </a:prstGeom>
+          <a:noFill/>
+        </p:spPr>
+        <p:txBody>
+          <a:bodyPr wrap="none" rtlCol="0">
+            <a:spAutoFit/>
+          </a:bodyPr>
+          <a:lstStyle/>
+          <a:p>
+            <a:pPr algn="ctr"/>
+            <a:r>
+              <a:rPr lang="en-US" sz="2800" dirty="0"/>
+              <a:t>82%</a:t>
+            </a:r>
+            <a:endParaRPr lang="ru-RU" sz="2800" dirty="0"/>
+          </a:p>
+        </p:txBody>
+      </p:sp>
+      <p:sp>
+        <p:nvSpPr>
+          <p:cNvPr id="97" name="TextBox 96">
+            <a:extLst>
+              <a:ext uri="{FF2B5EF4-FFF2-40B4-BE49-F238E27FC236}">
+                <a16:creationId xmlns:a16="http://schemas.microsoft.com/office/drawing/2014/main" id="{6EE31195-9BE6-47AA-9D5E-61FC807E061B}"/>
+              </a:ext>
+            </a:extLst>
+          </p:cNvPr>
+          <p:cNvSpPr txBox="1"/>
+          <p:nvPr/>
+        </p:nvSpPr>
+        <p:spPr>
+          <a:xfrm>
+            <a:off x="6699208" y="6093296"/>
+            <a:ext cx="806632" cy="523220"/>
+          </a:xfrm>
+          <a:prstGeom prst="rect">
+            <a:avLst/>
+          </a:prstGeom>
+          <a:noFill/>
+        </p:spPr>
+        <p:txBody>
+          <a:bodyPr wrap="none" rtlCol="0">
+            <a:spAutoFit/>
+          </a:bodyPr>
+          <a:lstStyle/>
+          <a:p>
+            <a:pPr algn="ctr"/>
+            <a:r>
+              <a:rPr lang="en-US" sz="2800" dirty="0"/>
+              <a:t>85%</a:t>
+            </a:r>
+            <a:endParaRPr lang="ru-RU" sz="2800" dirty="0"/>
+          </a:p>
+        </p:txBody>
+      </p:sp>
+      <p:sp>
+        <p:nvSpPr>
+          <p:cNvPr id="98" name="Прямоугольник 97">
+            <a:extLst>
+              <a:ext uri="{FF2B5EF4-FFF2-40B4-BE49-F238E27FC236}">
+                <a16:creationId xmlns:a16="http://schemas.microsoft.com/office/drawing/2014/main" id="{7E148D10-8F5A-4104-B674-58C84F6B3A1E}"/>
+              </a:ext>
+            </a:extLst>
+          </p:cNvPr>
+          <p:cNvSpPr/>
+          <p:nvPr/>
+        </p:nvSpPr>
+        <p:spPr>
+          <a:xfrm>
+            <a:off x="3917431" y="3265663"/>
+            <a:ext cx="1751355" cy="681438"/>
+          </a:xfrm>
+          <a:prstGeom prst="rect">
+            <a:avLst/>
+          </a:prstGeom>
+        </p:spPr>
+        <p:style>
+          <a:lnRef idx="2">
+            <a:schemeClr val="accent1">
+              <a:shade val="50000"/>
+            </a:schemeClr>
+          </a:lnRef>
+          <a:fillRef idx="1">
+            <a:schemeClr val="accent1"/>
+          </a:fillRef>
+          <a:effectRef idx="0">
+            <a:schemeClr val="accent1"/>
+          </a:effectRef>
+          <a:fontRef idx="minor">
+            <a:schemeClr val="lt1"/>
+          </a:fontRef>
+        </p:style>
+        <p:txBody>
+          <a:bodyPr rtlCol="0" anchor="ctr"/>
+          <a:lstStyle/>
+          <a:p>
+            <a:pPr algn="ctr"/>
+            <a:r>
+              <a:rPr lang="ru-RU" sz="2000" dirty="0"/>
+              <a:t>Дескрипторы для </a:t>
+            </a:r>
+            <a:r>
+              <a:rPr lang="en-US" sz="2000" dirty="0"/>
+              <a:t>x1</a:t>
+            </a:r>
+            <a:endParaRPr lang="ru-RU" sz="2000" dirty="0"/>
+          </a:p>
+        </p:txBody>
+      </p:sp>
+      <p:sp>
+        <p:nvSpPr>
+          <p:cNvPr id="99" name="Прямоугольник 98">
+            <a:extLst>
+              <a:ext uri="{FF2B5EF4-FFF2-40B4-BE49-F238E27FC236}">
+                <a16:creationId xmlns:a16="http://schemas.microsoft.com/office/drawing/2014/main" id="{0B793CE5-B535-4B41-B58E-5ECA6A1BD599}"/>
+              </a:ext>
+            </a:extLst>
+          </p:cNvPr>
+          <p:cNvSpPr/>
+          <p:nvPr/>
+        </p:nvSpPr>
+        <p:spPr>
+          <a:xfrm>
+            <a:off x="6509719" y="3265663"/>
+            <a:ext cx="1751355" cy="681438"/>
+          </a:xfrm>
+          <a:prstGeom prst="rect">
+            <a:avLst/>
+          </a:prstGeom>
+        </p:spPr>
+        <p:style>
+          <a:lnRef idx="2">
+            <a:schemeClr val="accent1">
+              <a:shade val="50000"/>
+            </a:schemeClr>
+          </a:lnRef>
+          <a:fillRef idx="1">
+            <a:schemeClr val="accent1"/>
+          </a:fillRef>
+          <a:effectRef idx="0">
+            <a:schemeClr val="accent1"/>
+          </a:effectRef>
+          <a:fontRef idx="minor">
+            <a:schemeClr val="lt1"/>
+          </a:fontRef>
+        </p:style>
+        <p:txBody>
+          <a:bodyPr rtlCol="0" anchor="ctr"/>
+          <a:lstStyle/>
+          <a:p>
+            <a:pPr algn="ctr"/>
+            <a:r>
+              <a:rPr lang="ru-RU" sz="2000" dirty="0"/>
+              <a:t>Дескрипторы</a:t>
+            </a:r>
+            <a:r>
+              <a:rPr lang="en-US" sz="2000" dirty="0"/>
+              <a:t> </a:t>
+            </a:r>
+            <a:r>
+              <a:rPr lang="ru-RU" sz="2000" dirty="0"/>
+              <a:t>для </a:t>
+            </a:r>
+            <a:r>
+              <a:rPr lang="en-US" sz="2000" dirty="0"/>
+              <a:t>x</a:t>
+            </a:r>
+            <a:r>
+              <a:rPr lang="ru-RU" sz="2000" dirty="0"/>
+              <a:t>2</a:t>
+            </a:r>
+          </a:p>
+        </p:txBody>
+      </p:sp>
+      <p:cxnSp>
+        <p:nvCxnSpPr>
+          <p:cNvPr id="101" name="Прямая со стрелкой 100">
+            <a:extLst>
+              <a:ext uri="{FF2B5EF4-FFF2-40B4-BE49-F238E27FC236}">
+                <a16:creationId xmlns:a16="http://schemas.microsoft.com/office/drawing/2014/main" id="{D8372FBF-9CE8-44BB-A63E-7C1E1E1AE568}"/>
+              </a:ext>
+            </a:extLst>
+          </p:cNvPr>
+          <p:cNvCxnSpPr>
+            <a:cxnSpLocks/>
+            <a:stCxn id="9" idx="3"/>
+            <a:endCxn id="98" idx="1"/>
+          </p:cNvCxnSpPr>
+          <p:nvPr/>
+        </p:nvCxnSpPr>
+        <p:spPr>
+          <a:xfrm flipV="1">
+            <a:off x="3652423" y="3606382"/>
+            <a:ext cx="265008" cy="2638"/>
+          </a:xfrm>
+          <a:prstGeom prst="straightConnector1">
+            <a:avLst/>
+          </a:prstGeom>
+          <a:ln w="25400">
+            <a:tailEnd type="triangle"/>
+          </a:ln>
+        </p:spPr>
+        <p:style>
+          <a:lnRef idx="1">
+            <a:schemeClr val="accent1"/>
+          </a:lnRef>
+          <a:fillRef idx="0">
+            <a:schemeClr val="accent1"/>
+          </a:fillRef>
+          <a:effectRef idx="0">
+            <a:schemeClr val="accent1"/>
+          </a:effectRef>
+          <a:fontRef idx="minor">
+            <a:schemeClr val="tx1"/>
+          </a:fontRef>
+        </p:style>
+      </p:cxnSp>
+      <p:cxnSp>
+        <p:nvCxnSpPr>
+          <p:cNvPr id="104" name="Прямая со стрелкой 103">
+            <a:extLst>
+              <a:ext uri="{FF2B5EF4-FFF2-40B4-BE49-F238E27FC236}">
+                <a16:creationId xmlns:a16="http://schemas.microsoft.com/office/drawing/2014/main" id="{A33E9207-A546-4B52-8922-A270E04A88CE}"/>
+              </a:ext>
+            </a:extLst>
+          </p:cNvPr>
+          <p:cNvCxnSpPr>
+            <a:cxnSpLocks/>
+            <a:stCxn id="20" idx="3"/>
+            <a:endCxn id="98" idx="1"/>
+          </p:cNvCxnSpPr>
+          <p:nvPr/>
+        </p:nvCxnSpPr>
+        <p:spPr>
+          <a:xfrm flipV="1">
+            <a:off x="3620618" y="3606382"/>
+            <a:ext cx="296813" cy="1966984"/>
+          </a:xfrm>
+          <a:prstGeom prst="straightConnector1">
+            <a:avLst/>
+          </a:prstGeom>
+          <a:ln w="25400">
+            <a:tailEnd type="triangle"/>
+          </a:ln>
+        </p:spPr>
+        <p:style>
+          <a:lnRef idx="1">
+            <a:schemeClr val="accent1"/>
+          </a:lnRef>
+          <a:fillRef idx="0">
+            <a:schemeClr val="accent1"/>
+          </a:fillRef>
+          <a:effectRef idx="0">
+            <a:schemeClr val="accent1"/>
+          </a:effectRef>
+          <a:fontRef idx="minor">
+            <a:schemeClr val="tx1"/>
+          </a:fontRef>
+        </p:style>
+      </p:cxnSp>
+      <p:cxnSp>
+        <p:nvCxnSpPr>
+          <p:cNvPr id="107" name="Прямая со стрелкой 106">
+            <a:extLst>
+              <a:ext uri="{FF2B5EF4-FFF2-40B4-BE49-F238E27FC236}">
+                <a16:creationId xmlns:a16="http://schemas.microsoft.com/office/drawing/2014/main" id="{68CD6D40-6B1B-495C-B218-5898A3BFE418}"/>
+              </a:ext>
+            </a:extLst>
+          </p:cNvPr>
+          <p:cNvCxnSpPr>
+            <a:cxnSpLocks/>
+            <a:stCxn id="49" idx="1"/>
+            <a:endCxn id="99" idx="3"/>
+          </p:cNvCxnSpPr>
+          <p:nvPr/>
+        </p:nvCxnSpPr>
+        <p:spPr>
+          <a:xfrm flipH="1">
+            <a:off x="8261074" y="3606382"/>
+            <a:ext cx="313157" cy="0"/>
+          </a:xfrm>
+          <a:prstGeom prst="straightConnector1">
+            <a:avLst/>
+          </a:prstGeom>
+          <a:ln w="25400">
+            <a:tailEnd type="triangle"/>
+          </a:ln>
+        </p:spPr>
+        <p:style>
+          <a:lnRef idx="1">
+            <a:schemeClr val="accent1"/>
+          </a:lnRef>
+          <a:fillRef idx="0">
+            <a:schemeClr val="accent1"/>
+          </a:fillRef>
+          <a:effectRef idx="0">
+            <a:schemeClr val="accent1"/>
+          </a:effectRef>
+          <a:fontRef idx="minor">
+            <a:schemeClr val="tx1"/>
+          </a:fontRef>
+        </p:style>
+      </p:cxnSp>
+      <p:cxnSp>
+        <p:nvCxnSpPr>
+          <p:cNvPr id="110" name="Прямая со стрелкой 109">
+            <a:extLst>
+              <a:ext uri="{FF2B5EF4-FFF2-40B4-BE49-F238E27FC236}">
+                <a16:creationId xmlns:a16="http://schemas.microsoft.com/office/drawing/2014/main" id="{89896EF5-F69E-412F-99B1-0FEC5A68F645}"/>
+              </a:ext>
+            </a:extLst>
+          </p:cNvPr>
+          <p:cNvCxnSpPr>
+            <a:cxnSpLocks/>
+            <a:stCxn id="52" idx="1"/>
+            <a:endCxn id="99" idx="3"/>
+          </p:cNvCxnSpPr>
+          <p:nvPr/>
+        </p:nvCxnSpPr>
+        <p:spPr>
+          <a:xfrm flipH="1" flipV="1">
+            <a:off x="8261074" y="3606382"/>
+            <a:ext cx="322360" cy="1961398"/>
+          </a:xfrm>
+          <a:prstGeom prst="straightConnector1">
+            <a:avLst/>
+          </a:prstGeom>
+          <a:ln w="25400">
+            <a:tailEnd type="triangle"/>
+          </a:ln>
+        </p:spPr>
+        <p:style>
+          <a:lnRef idx="1">
+            <a:schemeClr val="accent1"/>
+          </a:lnRef>
+          <a:fillRef idx="0">
+            <a:schemeClr val="accent1"/>
+          </a:fillRef>
+          <a:effectRef idx="0">
+            <a:schemeClr val="accent1"/>
+          </a:effectRef>
+          <a:fontRef idx="minor">
+            <a:schemeClr val="tx1"/>
+          </a:fontRef>
+        </p:style>
+      </p:cxnSp>
+      <p:cxnSp>
+        <p:nvCxnSpPr>
+          <p:cNvPr id="113" name="Прямая со стрелкой 112">
+            <a:extLst>
+              <a:ext uri="{FF2B5EF4-FFF2-40B4-BE49-F238E27FC236}">
+                <a16:creationId xmlns:a16="http://schemas.microsoft.com/office/drawing/2014/main" id="{9029CE9F-B7D4-4E06-9509-3EF0773FAD7B}"/>
+              </a:ext>
+            </a:extLst>
+          </p:cNvPr>
+          <p:cNvCxnSpPr>
+            <a:cxnSpLocks/>
+            <a:stCxn id="99" idx="2"/>
+          </p:cNvCxnSpPr>
+          <p:nvPr/>
+        </p:nvCxnSpPr>
+        <p:spPr>
+          <a:xfrm flipH="1">
+            <a:off x="7062063" y="3947101"/>
+            <a:ext cx="323334" cy="898887"/>
+          </a:xfrm>
+          <a:prstGeom prst="straightConnector1">
+            <a:avLst/>
+          </a:prstGeom>
+          <a:ln w="25400">
+            <a:tailEnd type="triangle"/>
+          </a:ln>
+        </p:spPr>
+        <p:style>
+          <a:lnRef idx="1">
+            <a:schemeClr val="accent1"/>
+          </a:lnRef>
+          <a:fillRef idx="0">
+            <a:schemeClr val="accent1"/>
+          </a:fillRef>
+          <a:effectRef idx="0">
+            <a:schemeClr val="accent1"/>
+          </a:effectRef>
+          <a:fontRef idx="minor">
+            <a:schemeClr val="tx1"/>
+          </a:fontRef>
+        </p:style>
+      </p:cxnSp>
+      <p:cxnSp>
+        <p:nvCxnSpPr>
+          <p:cNvPr id="116" name="Прямая со стрелкой 115">
+            <a:extLst>
+              <a:ext uri="{FF2B5EF4-FFF2-40B4-BE49-F238E27FC236}">
+                <a16:creationId xmlns:a16="http://schemas.microsoft.com/office/drawing/2014/main" id="{CD38F4CA-6EB6-44A5-AA56-7D812811C947}"/>
+              </a:ext>
+            </a:extLst>
+          </p:cNvPr>
+          <p:cNvCxnSpPr>
+            <a:cxnSpLocks/>
+            <a:stCxn id="98" idx="2"/>
+          </p:cNvCxnSpPr>
+          <p:nvPr/>
+        </p:nvCxnSpPr>
+        <p:spPr>
+          <a:xfrm>
+            <a:off x="4793109" y="3947101"/>
+            <a:ext cx="296813" cy="898887"/>
+          </a:xfrm>
+          <a:prstGeom prst="straightConnector1">
+            <a:avLst/>
+          </a:prstGeom>
+          <a:ln w="25400">
+            <a:tailEnd type="triangle"/>
+          </a:ln>
+        </p:spPr>
+        <p:style>
+          <a:lnRef idx="1">
+            <a:schemeClr val="accent1"/>
+          </a:lnRef>
+          <a:fillRef idx="0">
+            <a:schemeClr val="accent1"/>
+          </a:fillRef>
+          <a:effectRef idx="0">
+            <a:schemeClr val="accent1"/>
+          </a:effectRef>
+          <a:fontRef idx="minor">
+            <a:schemeClr val="tx1"/>
+          </a:fontRef>
+        </p:style>
+      </p:cxnSp>
+    </p:spTree>
+    <p:extLst>
+      <p:ext uri="{BB962C8B-B14F-4D97-AF65-F5344CB8AC3E}">
+        <p14:creationId xmlns:p14="http://schemas.microsoft.com/office/powerpoint/2010/main" val="3239989286"/>
       </p:ext>
     </p:extLst>
   </p:cSld>
@@ -7901,6 +9895,142 @@
 </file>
 
 <file path=customXml/item1.xml><?xml version="1.0" encoding="utf-8"?>
+<p:properties xmlns:p="http://schemas.microsoft.com/office/2006/metadata/properties" xmlns:xsi="http://www.w3.org/2001/XMLSchema-instance" xmlns:pc="http://schemas.microsoft.com/office/infopath/2007/PartnerControls">
+  <documentManagement>
+    <LocPublishedLinkedAssetsLookup xmlns="4873beb7-5857-4685-be1f-d57550cc96cc" xsi:nil="true"/>
+    <ApprovalStatus xmlns="4873beb7-5857-4685-be1f-d57550cc96cc">InProgress</ApprovalStatus>
+    <MarketSpecific xmlns="4873beb7-5857-4685-be1f-d57550cc96cc">false</MarketSpecific>
+    <LocComments xmlns="4873beb7-5857-4685-be1f-d57550cc96cc" xsi:nil="true"/>
+    <LocLastLocAttemptVersionTypeLookup xmlns="4873beb7-5857-4685-be1f-d57550cc96cc" xsi:nil="true"/>
+    <DirectSourceMarket xmlns="4873beb7-5857-4685-be1f-d57550cc96cc" xsi:nil="true"/>
+    <ThumbnailAssetId xmlns="4873beb7-5857-4685-be1f-d57550cc96cc" xsi:nil="true"/>
+    <PrimaryImageGen xmlns="4873beb7-5857-4685-be1f-d57550cc96cc">false</PrimaryImageGen>
+    <LocNewPublishedVersionLookup xmlns="4873beb7-5857-4685-be1f-d57550cc96cc" xsi:nil="true"/>
+    <LegacyData xmlns="4873beb7-5857-4685-be1f-d57550cc96cc" xsi:nil="true"/>
+    <LocRecommendedHandoff xmlns="4873beb7-5857-4685-be1f-d57550cc96cc" xsi:nil="true"/>
+    <BusinessGroup xmlns="4873beb7-5857-4685-be1f-d57550cc96cc" xsi:nil="true"/>
+    <BlockPublish xmlns="4873beb7-5857-4685-be1f-d57550cc96cc">false</BlockPublish>
+    <TPFriendlyName xmlns="4873beb7-5857-4685-be1f-d57550cc96cc" xsi:nil="true"/>
+    <LocOverallPublishStatusLookup xmlns="4873beb7-5857-4685-be1f-d57550cc96cc" xsi:nil="true"/>
+    <NumericId xmlns="4873beb7-5857-4685-be1f-d57550cc96cc" xsi:nil="true"/>
+    <APEditor xmlns="4873beb7-5857-4685-be1f-d57550cc96cc">
+      <UserInfo>
+        <DisplayName/>
+        <AccountId xsi:nil="true"/>
+        <AccountType/>
+      </UserInfo>
+    </APEditor>
+    <SourceTitle xmlns="4873beb7-5857-4685-be1f-d57550cc96cc" xsi:nil="true"/>
+    <OpenTemplate xmlns="4873beb7-5857-4685-be1f-d57550cc96cc">true</OpenTemplate>
+    <LocOverallLocStatusLookup xmlns="4873beb7-5857-4685-be1f-d57550cc96cc" xsi:nil="true"/>
+    <UALocComments xmlns="4873beb7-5857-4685-be1f-d57550cc96cc" xsi:nil="true"/>
+    <ParentAssetId xmlns="4873beb7-5857-4685-be1f-d57550cc96cc" xsi:nil="true"/>
+    <IntlLangReviewDate xmlns="4873beb7-5857-4685-be1f-d57550cc96cc" xsi:nil="true"/>
+    <FeatureTagsTaxHTField0 xmlns="4873beb7-5857-4685-be1f-d57550cc96cc">
+      <Terms xmlns="http://schemas.microsoft.com/office/infopath/2007/PartnerControls"/>
+    </FeatureTagsTaxHTField0>
+    <PublishStatusLookup xmlns="4873beb7-5857-4685-be1f-d57550cc96cc">
+      <Value>1345093</Value>
+    </PublishStatusLookup>
+    <Providers xmlns="4873beb7-5857-4685-be1f-d57550cc96cc" xsi:nil="true"/>
+    <MachineTranslated xmlns="4873beb7-5857-4685-be1f-d57550cc96cc">false</MachineTranslated>
+    <OriginalSourceMarket xmlns="4873beb7-5857-4685-be1f-d57550cc96cc" xsi:nil="true"/>
+    <APDescription xmlns="4873beb7-5857-4685-be1f-d57550cc96cc">This simple template design works for technology and  businesses, but it's versatile enough to use in other contexts.  It features multiple slide layouts designed for widescreen (16x9 resolution) and includes a sample SmartArt list and chart that are easily editable.</APDescription>
+    <ClipArtFilename xmlns="4873beb7-5857-4685-be1f-d57550cc96cc" xsi:nil="true"/>
+    <ContentItem xmlns="4873beb7-5857-4685-be1f-d57550cc96cc" xsi:nil="true"/>
+    <TPInstallLocation xmlns="4873beb7-5857-4685-be1f-d57550cc96cc" xsi:nil="true"/>
+    <PublishTargets xmlns="4873beb7-5857-4685-be1f-d57550cc96cc">OfficeOnlineVNext</PublishTargets>
+    <TimesCloned xmlns="4873beb7-5857-4685-be1f-d57550cc96cc" xsi:nil="true"/>
+    <AssetStart xmlns="4873beb7-5857-4685-be1f-d57550cc96cc">2011-11-26T00:30:00+00:00</AssetStart>
+    <Provider xmlns="4873beb7-5857-4685-be1f-d57550cc96cc" xsi:nil="true"/>
+    <AcquiredFrom xmlns="4873beb7-5857-4685-be1f-d57550cc96cc">Internal MS</AcquiredFrom>
+    <FriendlyTitle xmlns="4873beb7-5857-4685-be1f-d57550cc96cc" xsi:nil="true"/>
+    <LastHandOff xmlns="4873beb7-5857-4685-be1f-d57550cc96cc" xsi:nil="true"/>
+    <TPClientViewer xmlns="4873beb7-5857-4685-be1f-d57550cc96cc" xsi:nil="true"/>
+    <TemplateStatus xmlns="4873beb7-5857-4685-be1f-d57550cc96cc">Complete</TemplateStatus>
+    <Downloads xmlns="4873beb7-5857-4685-be1f-d57550cc96cc">0</Downloads>
+    <OOCacheId xmlns="4873beb7-5857-4685-be1f-d57550cc96cc" xsi:nil="true"/>
+    <IsDeleted xmlns="4873beb7-5857-4685-be1f-d57550cc96cc">false</IsDeleted>
+    <LocPublishedDependentAssetsLookup xmlns="4873beb7-5857-4685-be1f-d57550cc96cc" xsi:nil="true"/>
+    <TPExecutable xmlns="4873beb7-5857-4685-be1f-d57550cc96cc" xsi:nil="true"/>
+    <EditorialTags xmlns="4873beb7-5857-4685-be1f-d57550cc96cc" xsi:nil="true"/>
+    <SubmitterId xmlns="4873beb7-5857-4685-be1f-d57550cc96cc" xsi:nil="true"/>
+    <ApprovalLog xmlns="4873beb7-5857-4685-be1f-d57550cc96cc" xsi:nil="true"/>
+    <AssetType xmlns="4873beb7-5857-4685-be1f-d57550cc96cc">TP</AssetType>
+    <BugNumber xmlns="4873beb7-5857-4685-be1f-d57550cc96cc" xsi:nil="true"/>
+    <CSXSubmissionDate xmlns="4873beb7-5857-4685-be1f-d57550cc96cc" xsi:nil="true"/>
+    <CSXUpdate xmlns="4873beb7-5857-4685-be1f-d57550cc96cc">false</CSXUpdate>
+    <Milestone xmlns="4873beb7-5857-4685-be1f-d57550cc96cc" xsi:nil="true"/>
+    <RecommendationsModifier xmlns="4873beb7-5857-4685-be1f-d57550cc96cc" xsi:nil="true"/>
+    <OriginAsset xmlns="4873beb7-5857-4685-be1f-d57550cc96cc" xsi:nil="true"/>
+    <TPComponent xmlns="4873beb7-5857-4685-be1f-d57550cc96cc" xsi:nil="true"/>
+    <AssetId xmlns="4873beb7-5857-4685-be1f-d57550cc96cc">TP102787989</AssetId>
+    <IntlLocPriority xmlns="4873beb7-5857-4685-be1f-d57550cc96cc" xsi:nil="true"/>
+    <PolicheckWords xmlns="4873beb7-5857-4685-be1f-d57550cc96cc" xsi:nil="true"/>
+    <TPLaunchHelpLink xmlns="4873beb7-5857-4685-be1f-d57550cc96cc" xsi:nil="true"/>
+    <TPApplication xmlns="4873beb7-5857-4685-be1f-d57550cc96cc" xsi:nil="true"/>
+    <CrawlForDependencies xmlns="4873beb7-5857-4685-be1f-d57550cc96cc">false</CrawlForDependencies>
+    <HandoffToMSDN xmlns="4873beb7-5857-4685-be1f-d57550cc96cc" xsi:nil="true"/>
+    <PlannedPubDate xmlns="4873beb7-5857-4685-be1f-d57550cc96cc" xsi:nil="true"/>
+    <IntlLangReviewer xmlns="4873beb7-5857-4685-be1f-d57550cc96cc" xsi:nil="true"/>
+    <TrustLevel xmlns="4873beb7-5857-4685-be1f-d57550cc96cc">1 Microsoft Managed Content</TrustLevel>
+    <LocLastLocAttemptVersionLookup xmlns="4873beb7-5857-4685-be1f-d57550cc96cc">694266</LocLastLocAttemptVersionLookup>
+    <LocProcessedForHandoffsLookup xmlns="4873beb7-5857-4685-be1f-d57550cc96cc" xsi:nil="true"/>
+    <IsSearchable xmlns="4873beb7-5857-4685-be1f-d57550cc96cc">true</IsSearchable>
+    <TemplateTemplateType xmlns="4873beb7-5857-4685-be1f-d57550cc96cc">PowerPoint Presentation Template</TemplateTemplateType>
+    <CampaignTagsTaxHTField0 xmlns="4873beb7-5857-4685-be1f-d57550cc96cc">
+      <Terms xmlns="http://schemas.microsoft.com/office/infopath/2007/PartnerControls"/>
+    </CampaignTagsTaxHTField0>
+    <TPNamespace xmlns="4873beb7-5857-4685-be1f-d57550cc96cc" xsi:nil="true"/>
+    <LocOverallPreviewStatusLookup xmlns="4873beb7-5857-4685-be1f-d57550cc96cc" xsi:nil="true"/>
+    <TaxCatchAll xmlns="4873beb7-5857-4685-be1f-d57550cc96cc"/>
+    <Markets xmlns="4873beb7-5857-4685-be1f-d57550cc96cc"/>
+    <UAProjectedTotalWords xmlns="4873beb7-5857-4685-be1f-d57550cc96cc" xsi:nil="true"/>
+    <IntlLangReview xmlns="4873beb7-5857-4685-be1f-d57550cc96cc" xsi:nil="true"/>
+    <OutputCachingOn xmlns="4873beb7-5857-4685-be1f-d57550cc96cc">false</OutputCachingOn>
+    <AverageRating xmlns="4873beb7-5857-4685-be1f-d57550cc96cc" xsi:nil="true"/>
+    <APAuthor xmlns="4873beb7-5857-4685-be1f-d57550cc96cc">
+      <UserInfo>
+        <DisplayName>REDMOND\kristaa</DisplayName>
+        <AccountId>136</AccountId>
+        <AccountType/>
+      </UserInfo>
+    </APAuthor>
+    <LocManualTestRequired xmlns="4873beb7-5857-4685-be1f-d57550cc96cc">false</LocManualTestRequired>
+    <TPCommandLine xmlns="4873beb7-5857-4685-be1f-d57550cc96cc" xsi:nil="true"/>
+    <TPAppVersion xmlns="4873beb7-5857-4685-be1f-d57550cc96cc" xsi:nil="true"/>
+    <EditorialStatus xmlns="4873beb7-5857-4685-be1f-d57550cc96cc">Complete</EditorialStatus>
+    <LastModifiedDateTime xmlns="4873beb7-5857-4685-be1f-d57550cc96cc" xsi:nil="true"/>
+    <ScenarioTagsTaxHTField0 xmlns="4873beb7-5857-4685-be1f-d57550cc96cc">
+      <Terms xmlns="http://schemas.microsoft.com/office/infopath/2007/PartnerControls"/>
+    </ScenarioTagsTaxHTField0>
+    <LocProcessedForMarketsLookup xmlns="4873beb7-5857-4685-be1f-d57550cc96cc" xsi:nil="true"/>
+    <TPLaunchHelpLinkType xmlns="4873beb7-5857-4685-be1f-d57550cc96cc">Template</TPLaunchHelpLinkType>
+    <OriginalRelease xmlns="4873beb7-5857-4685-be1f-d57550cc96cc">15</OriginalRelease>
+    <LocalizationTagsTaxHTField0 xmlns="4873beb7-5857-4685-be1f-d57550cc96cc">
+      <Terms xmlns="http://schemas.microsoft.com/office/infopath/2007/PartnerControls"/>
+    </LocalizationTagsTaxHTField0>
+    <UACurrentWords xmlns="4873beb7-5857-4685-be1f-d57550cc96cc" xsi:nil="true"/>
+    <ArtSampleDocs xmlns="4873beb7-5857-4685-be1f-d57550cc96cc" xsi:nil="true"/>
+    <UALocRecommendation xmlns="4873beb7-5857-4685-be1f-d57550cc96cc">Localize</UALocRecommendation>
+    <Manager xmlns="4873beb7-5857-4685-be1f-d57550cc96cc" xsi:nil="true"/>
+    <LocOverallHandbackStatusLookup xmlns="4873beb7-5857-4685-be1f-d57550cc96cc" xsi:nil="true"/>
+    <ShowIn xmlns="4873beb7-5857-4685-be1f-d57550cc96cc">Show everywhere</ShowIn>
+    <UANotes xmlns="4873beb7-5857-4685-be1f-d57550cc96cc" xsi:nil="true"/>
+    <InternalTagsTaxHTField0 xmlns="4873beb7-5857-4685-be1f-d57550cc96cc">
+      <Terms xmlns="http://schemas.microsoft.com/office/infopath/2007/PartnerControls"/>
+    </InternalTagsTaxHTField0>
+    <CSXHash xmlns="4873beb7-5857-4685-be1f-d57550cc96cc" xsi:nil="true"/>
+    <VoteCount xmlns="4873beb7-5857-4685-be1f-d57550cc96cc" xsi:nil="true"/>
+    <AssetExpire xmlns="4873beb7-5857-4685-be1f-d57550cc96cc">2029-05-12T07:00:00+00:00</AssetExpire>
+    <DSATActionTaken xmlns="4873beb7-5857-4685-be1f-d57550cc96cc" xsi:nil="true"/>
+    <CSXSubmissionMarket xmlns="4873beb7-5857-4685-be1f-d57550cc96cc" xsi:nil="true"/>
+    <LocMarketGroupTiers2 xmlns="4873beb7-5857-4685-be1f-d57550cc96cc" xsi:nil="true"/>
+  </documentManagement>
+</p:properties>
+</file>
+
+<file path=customXml/item2.xml><?xml version="1.0" encoding="utf-8"?>
 <?mso-contentType ?>
 <FormTemplates xmlns="http://schemas.microsoft.com/sharepoint/v3/contenttype/forms">
   <Display>DocumentLibraryForm</Display>
@@ -7909,7 +10039,7 @@
 </FormTemplates>
 </file>
 
-<file path=customXml/item2.xml><?xml version="1.0" encoding="utf-8"?>
+<file path=customXml/item3.xml><?xml version="1.0" encoding="utf-8"?>
 <ct:contentTypeSchema xmlns:ct="http://schemas.microsoft.com/office/2006/metadata/contentType" xmlns:ma="http://schemas.microsoft.com/office/2006/metadata/properties/metaAttributes" ct:_="" ma:_="" ma:contentTypeName="TemplateFile" ma:contentTypeID="0x0101006EDDDB5EE6D98C44930B742096920B300400F5B6D36B3EF94B4E9A635CDF2A18F5B8" ma:contentTypeVersion="72" ma:contentTypeDescription="Create a new document." ma:contentTypeScope="" ma:versionID="a23e56308344d904b51738559c3d67c9">
   <xsd:schema xmlns:xsd="http://www.w3.org/2001/XMLSchema" xmlns:xs="http://www.w3.org/2001/XMLSchema" xmlns:p="http://schemas.microsoft.com/office/2006/metadata/properties" xmlns:ns2="4873beb7-5857-4685-be1f-d57550cc96cc" targetNamespace="http://schemas.microsoft.com/office/2006/metadata/properties" ma:root="true" ma:fieldsID="cd0908cc4600e77bf5da051303e00c8d" ns2:_="">
     <xsd:import namespace="4873beb7-5857-4685-be1f-d57550cc96cc"/>
@@ -8949,143 +11079,23 @@
 </ct:contentTypeSchema>
 </file>
 
-<file path=customXml/item3.xml><?xml version="1.0" encoding="utf-8"?>
-<p:properties xmlns:p="http://schemas.microsoft.com/office/2006/metadata/properties" xmlns:xsi="http://www.w3.org/2001/XMLSchema-instance" xmlns:pc="http://schemas.microsoft.com/office/infopath/2007/PartnerControls">
-  <documentManagement>
-    <LocPublishedLinkedAssetsLookup xmlns="4873beb7-5857-4685-be1f-d57550cc96cc" xsi:nil="true"/>
-    <ApprovalStatus xmlns="4873beb7-5857-4685-be1f-d57550cc96cc">InProgress</ApprovalStatus>
-    <MarketSpecific xmlns="4873beb7-5857-4685-be1f-d57550cc96cc">false</MarketSpecific>
-    <LocComments xmlns="4873beb7-5857-4685-be1f-d57550cc96cc" xsi:nil="true"/>
-    <LocLastLocAttemptVersionTypeLookup xmlns="4873beb7-5857-4685-be1f-d57550cc96cc" xsi:nil="true"/>
-    <DirectSourceMarket xmlns="4873beb7-5857-4685-be1f-d57550cc96cc" xsi:nil="true"/>
-    <ThumbnailAssetId xmlns="4873beb7-5857-4685-be1f-d57550cc96cc" xsi:nil="true"/>
-    <PrimaryImageGen xmlns="4873beb7-5857-4685-be1f-d57550cc96cc">false</PrimaryImageGen>
-    <LocNewPublishedVersionLookup xmlns="4873beb7-5857-4685-be1f-d57550cc96cc" xsi:nil="true"/>
-    <LegacyData xmlns="4873beb7-5857-4685-be1f-d57550cc96cc" xsi:nil="true"/>
-    <LocRecommendedHandoff xmlns="4873beb7-5857-4685-be1f-d57550cc96cc" xsi:nil="true"/>
-    <BusinessGroup xmlns="4873beb7-5857-4685-be1f-d57550cc96cc" xsi:nil="true"/>
-    <BlockPublish xmlns="4873beb7-5857-4685-be1f-d57550cc96cc">false</BlockPublish>
-    <TPFriendlyName xmlns="4873beb7-5857-4685-be1f-d57550cc96cc" xsi:nil="true"/>
-    <LocOverallPublishStatusLookup xmlns="4873beb7-5857-4685-be1f-d57550cc96cc" xsi:nil="true"/>
-    <NumericId xmlns="4873beb7-5857-4685-be1f-d57550cc96cc" xsi:nil="true"/>
-    <APEditor xmlns="4873beb7-5857-4685-be1f-d57550cc96cc">
-      <UserInfo>
-        <DisplayName/>
-        <AccountId xsi:nil="true"/>
-        <AccountType/>
-      </UserInfo>
-    </APEditor>
-    <SourceTitle xmlns="4873beb7-5857-4685-be1f-d57550cc96cc" xsi:nil="true"/>
-    <OpenTemplate xmlns="4873beb7-5857-4685-be1f-d57550cc96cc">true</OpenTemplate>
-    <LocOverallLocStatusLookup xmlns="4873beb7-5857-4685-be1f-d57550cc96cc" xsi:nil="true"/>
-    <UALocComments xmlns="4873beb7-5857-4685-be1f-d57550cc96cc" xsi:nil="true"/>
-    <ParentAssetId xmlns="4873beb7-5857-4685-be1f-d57550cc96cc" xsi:nil="true"/>
-    <IntlLangReviewDate xmlns="4873beb7-5857-4685-be1f-d57550cc96cc" xsi:nil="true"/>
-    <FeatureTagsTaxHTField0 xmlns="4873beb7-5857-4685-be1f-d57550cc96cc">
-      <Terms xmlns="http://schemas.microsoft.com/office/infopath/2007/PartnerControls"/>
-    </FeatureTagsTaxHTField0>
-    <PublishStatusLookup xmlns="4873beb7-5857-4685-be1f-d57550cc96cc">
-      <Value>1345093</Value>
-    </PublishStatusLookup>
-    <Providers xmlns="4873beb7-5857-4685-be1f-d57550cc96cc" xsi:nil="true"/>
-    <MachineTranslated xmlns="4873beb7-5857-4685-be1f-d57550cc96cc">false</MachineTranslated>
-    <OriginalSourceMarket xmlns="4873beb7-5857-4685-be1f-d57550cc96cc" xsi:nil="true"/>
-    <APDescription xmlns="4873beb7-5857-4685-be1f-d57550cc96cc">This simple template design works for technology and  businesses, but it's versatile enough to use in other contexts.  It features multiple slide layouts designed for widescreen (16x9 resolution) and includes a sample SmartArt list and chart that are easily editable.</APDescription>
-    <ClipArtFilename xmlns="4873beb7-5857-4685-be1f-d57550cc96cc" xsi:nil="true"/>
-    <ContentItem xmlns="4873beb7-5857-4685-be1f-d57550cc96cc" xsi:nil="true"/>
-    <TPInstallLocation xmlns="4873beb7-5857-4685-be1f-d57550cc96cc" xsi:nil="true"/>
-    <PublishTargets xmlns="4873beb7-5857-4685-be1f-d57550cc96cc">OfficeOnlineVNext</PublishTargets>
-    <TimesCloned xmlns="4873beb7-5857-4685-be1f-d57550cc96cc" xsi:nil="true"/>
-    <AssetStart xmlns="4873beb7-5857-4685-be1f-d57550cc96cc">2011-11-26T00:30:00+00:00</AssetStart>
-    <Provider xmlns="4873beb7-5857-4685-be1f-d57550cc96cc" xsi:nil="true"/>
-    <AcquiredFrom xmlns="4873beb7-5857-4685-be1f-d57550cc96cc">Internal MS</AcquiredFrom>
-    <FriendlyTitle xmlns="4873beb7-5857-4685-be1f-d57550cc96cc" xsi:nil="true"/>
-    <LastHandOff xmlns="4873beb7-5857-4685-be1f-d57550cc96cc" xsi:nil="true"/>
-    <TPClientViewer xmlns="4873beb7-5857-4685-be1f-d57550cc96cc" xsi:nil="true"/>
-    <TemplateStatus xmlns="4873beb7-5857-4685-be1f-d57550cc96cc">Complete</TemplateStatus>
-    <Downloads xmlns="4873beb7-5857-4685-be1f-d57550cc96cc">0</Downloads>
-    <OOCacheId xmlns="4873beb7-5857-4685-be1f-d57550cc96cc" xsi:nil="true"/>
-    <IsDeleted xmlns="4873beb7-5857-4685-be1f-d57550cc96cc">false</IsDeleted>
-    <LocPublishedDependentAssetsLookup xmlns="4873beb7-5857-4685-be1f-d57550cc96cc" xsi:nil="true"/>
-    <TPExecutable xmlns="4873beb7-5857-4685-be1f-d57550cc96cc" xsi:nil="true"/>
-    <EditorialTags xmlns="4873beb7-5857-4685-be1f-d57550cc96cc" xsi:nil="true"/>
-    <SubmitterId xmlns="4873beb7-5857-4685-be1f-d57550cc96cc" xsi:nil="true"/>
-    <ApprovalLog xmlns="4873beb7-5857-4685-be1f-d57550cc96cc" xsi:nil="true"/>
-    <AssetType xmlns="4873beb7-5857-4685-be1f-d57550cc96cc">TP</AssetType>
-    <BugNumber xmlns="4873beb7-5857-4685-be1f-d57550cc96cc" xsi:nil="true"/>
-    <CSXSubmissionDate xmlns="4873beb7-5857-4685-be1f-d57550cc96cc" xsi:nil="true"/>
-    <CSXUpdate xmlns="4873beb7-5857-4685-be1f-d57550cc96cc">false</CSXUpdate>
-    <Milestone xmlns="4873beb7-5857-4685-be1f-d57550cc96cc" xsi:nil="true"/>
-    <RecommendationsModifier xmlns="4873beb7-5857-4685-be1f-d57550cc96cc" xsi:nil="true"/>
-    <OriginAsset xmlns="4873beb7-5857-4685-be1f-d57550cc96cc" xsi:nil="true"/>
-    <TPComponent xmlns="4873beb7-5857-4685-be1f-d57550cc96cc" xsi:nil="true"/>
-    <AssetId xmlns="4873beb7-5857-4685-be1f-d57550cc96cc">TP102787989</AssetId>
-    <IntlLocPriority xmlns="4873beb7-5857-4685-be1f-d57550cc96cc" xsi:nil="true"/>
-    <PolicheckWords xmlns="4873beb7-5857-4685-be1f-d57550cc96cc" xsi:nil="true"/>
-    <TPLaunchHelpLink xmlns="4873beb7-5857-4685-be1f-d57550cc96cc" xsi:nil="true"/>
-    <TPApplication xmlns="4873beb7-5857-4685-be1f-d57550cc96cc" xsi:nil="true"/>
-    <CrawlForDependencies xmlns="4873beb7-5857-4685-be1f-d57550cc96cc">false</CrawlForDependencies>
-    <HandoffToMSDN xmlns="4873beb7-5857-4685-be1f-d57550cc96cc" xsi:nil="true"/>
-    <PlannedPubDate xmlns="4873beb7-5857-4685-be1f-d57550cc96cc" xsi:nil="true"/>
-    <IntlLangReviewer xmlns="4873beb7-5857-4685-be1f-d57550cc96cc" xsi:nil="true"/>
-    <TrustLevel xmlns="4873beb7-5857-4685-be1f-d57550cc96cc">1 Microsoft Managed Content</TrustLevel>
-    <LocLastLocAttemptVersionLookup xmlns="4873beb7-5857-4685-be1f-d57550cc96cc">694266</LocLastLocAttemptVersionLookup>
-    <LocProcessedForHandoffsLookup xmlns="4873beb7-5857-4685-be1f-d57550cc96cc" xsi:nil="true"/>
-    <IsSearchable xmlns="4873beb7-5857-4685-be1f-d57550cc96cc">true</IsSearchable>
-    <TemplateTemplateType xmlns="4873beb7-5857-4685-be1f-d57550cc96cc">PowerPoint Presentation Template</TemplateTemplateType>
-    <CampaignTagsTaxHTField0 xmlns="4873beb7-5857-4685-be1f-d57550cc96cc">
-      <Terms xmlns="http://schemas.microsoft.com/office/infopath/2007/PartnerControls"/>
-    </CampaignTagsTaxHTField0>
-    <TPNamespace xmlns="4873beb7-5857-4685-be1f-d57550cc96cc" xsi:nil="true"/>
-    <LocOverallPreviewStatusLookup xmlns="4873beb7-5857-4685-be1f-d57550cc96cc" xsi:nil="true"/>
-    <TaxCatchAll xmlns="4873beb7-5857-4685-be1f-d57550cc96cc"/>
-    <Markets xmlns="4873beb7-5857-4685-be1f-d57550cc96cc"/>
-    <UAProjectedTotalWords xmlns="4873beb7-5857-4685-be1f-d57550cc96cc" xsi:nil="true"/>
-    <IntlLangReview xmlns="4873beb7-5857-4685-be1f-d57550cc96cc" xsi:nil="true"/>
-    <OutputCachingOn xmlns="4873beb7-5857-4685-be1f-d57550cc96cc">false</OutputCachingOn>
-    <AverageRating xmlns="4873beb7-5857-4685-be1f-d57550cc96cc" xsi:nil="true"/>
-    <APAuthor xmlns="4873beb7-5857-4685-be1f-d57550cc96cc">
-      <UserInfo>
-        <DisplayName>REDMOND\kristaa</DisplayName>
-        <AccountId>136</AccountId>
-        <AccountType/>
-      </UserInfo>
-    </APAuthor>
-    <LocManualTestRequired xmlns="4873beb7-5857-4685-be1f-d57550cc96cc">false</LocManualTestRequired>
-    <TPCommandLine xmlns="4873beb7-5857-4685-be1f-d57550cc96cc" xsi:nil="true"/>
-    <TPAppVersion xmlns="4873beb7-5857-4685-be1f-d57550cc96cc" xsi:nil="true"/>
-    <EditorialStatus xmlns="4873beb7-5857-4685-be1f-d57550cc96cc">Complete</EditorialStatus>
-    <LastModifiedDateTime xmlns="4873beb7-5857-4685-be1f-d57550cc96cc" xsi:nil="true"/>
-    <ScenarioTagsTaxHTField0 xmlns="4873beb7-5857-4685-be1f-d57550cc96cc">
-      <Terms xmlns="http://schemas.microsoft.com/office/infopath/2007/PartnerControls"/>
-    </ScenarioTagsTaxHTField0>
-    <LocProcessedForMarketsLookup xmlns="4873beb7-5857-4685-be1f-d57550cc96cc" xsi:nil="true"/>
-    <TPLaunchHelpLinkType xmlns="4873beb7-5857-4685-be1f-d57550cc96cc">Template</TPLaunchHelpLinkType>
-    <OriginalRelease xmlns="4873beb7-5857-4685-be1f-d57550cc96cc">15</OriginalRelease>
-    <LocalizationTagsTaxHTField0 xmlns="4873beb7-5857-4685-be1f-d57550cc96cc">
-      <Terms xmlns="http://schemas.microsoft.com/office/infopath/2007/PartnerControls"/>
-    </LocalizationTagsTaxHTField0>
-    <UACurrentWords xmlns="4873beb7-5857-4685-be1f-d57550cc96cc" xsi:nil="true"/>
-    <ArtSampleDocs xmlns="4873beb7-5857-4685-be1f-d57550cc96cc" xsi:nil="true"/>
-    <UALocRecommendation xmlns="4873beb7-5857-4685-be1f-d57550cc96cc">Localize</UALocRecommendation>
-    <Manager xmlns="4873beb7-5857-4685-be1f-d57550cc96cc" xsi:nil="true"/>
-    <LocOverallHandbackStatusLookup xmlns="4873beb7-5857-4685-be1f-d57550cc96cc" xsi:nil="true"/>
-    <ShowIn xmlns="4873beb7-5857-4685-be1f-d57550cc96cc">Show everywhere</ShowIn>
-    <UANotes xmlns="4873beb7-5857-4685-be1f-d57550cc96cc" xsi:nil="true"/>
-    <InternalTagsTaxHTField0 xmlns="4873beb7-5857-4685-be1f-d57550cc96cc">
-      <Terms xmlns="http://schemas.microsoft.com/office/infopath/2007/PartnerControls"/>
-    </InternalTagsTaxHTField0>
-    <CSXHash xmlns="4873beb7-5857-4685-be1f-d57550cc96cc" xsi:nil="true"/>
-    <VoteCount xmlns="4873beb7-5857-4685-be1f-d57550cc96cc" xsi:nil="true"/>
-    <AssetExpire xmlns="4873beb7-5857-4685-be1f-d57550cc96cc">2029-05-12T07:00:00+00:00</AssetExpire>
-    <DSATActionTaken xmlns="4873beb7-5857-4685-be1f-d57550cc96cc" xsi:nil="true"/>
-    <CSXSubmissionMarket xmlns="4873beb7-5857-4685-be1f-d57550cc96cc" xsi:nil="true"/>
-    <LocMarketGroupTiers2 xmlns="4873beb7-5857-4685-be1f-d57550cc96cc" xsi:nil="true"/>
-  </documentManagement>
-</p:properties>
+<file path=customXml/itemProps1.xml><?xml version="1.0" encoding="utf-8"?>
+<ds:datastoreItem xmlns:ds="http://schemas.openxmlformats.org/officeDocument/2006/customXml" ds:itemID="{60C67BEE-D13F-4BD2-98A5-34D8A0977F68}">
+  <ds:schemaRefs>
+    <ds:schemaRef ds:uri="http://schemas.microsoft.com/office/infopath/2007/PartnerControls"/>
+    <ds:schemaRef ds:uri="http://schemas.microsoft.com/office/2006/documentManagement/types"/>
+    <ds:schemaRef ds:uri="4873beb7-5857-4685-be1f-d57550cc96cc"/>
+    <ds:schemaRef ds:uri="http://purl.org/dc/dcmitype/"/>
+    <ds:schemaRef ds:uri="http://www.w3.org/XML/1998/namespace"/>
+    <ds:schemaRef ds:uri="http://schemas.openxmlformats.org/package/2006/metadata/core-properties"/>
+    <ds:schemaRef ds:uri="http://purl.org/dc/elements/1.1/"/>
+    <ds:schemaRef ds:uri="http://schemas.microsoft.com/office/2006/metadata/properties"/>
+    <ds:schemaRef ds:uri="http://purl.org/dc/terms/"/>
+  </ds:schemaRefs>
+</ds:datastoreItem>
 </file>
 
-<file path=customXml/itemProps1.xml><?xml version="1.0" encoding="utf-8"?>
+<file path=customXml/itemProps2.xml><?xml version="1.0" encoding="utf-8"?>
 <ds:datastoreItem xmlns:ds="http://schemas.openxmlformats.org/officeDocument/2006/customXml" ds:itemID="{3836F65B-1B07-41EE-A0E8-BC6EF3855225}">
   <ds:schemaRefs>
     <ds:schemaRef ds:uri="http://schemas.microsoft.com/sharepoint/v3/contenttype/forms"/>
@@ -9093,7 +11103,7 @@
 </ds:datastoreItem>
 </file>
 
-<file path=customXml/itemProps2.xml><?xml version="1.0" encoding="utf-8"?>
+<file path=customXml/itemProps3.xml><?xml version="1.0" encoding="utf-8"?>
 <ds:datastoreItem xmlns:ds="http://schemas.openxmlformats.org/officeDocument/2006/customXml" ds:itemID="{A09BF4D4-EF60-4196-BFC3-9462D607978C}">
   <ds:schemaRefs>
     <ds:schemaRef ds:uri="http://schemas.microsoft.com/office/2006/metadata/contentType"/>
@@ -9109,20 +11119,4 @@
     <ds:schemaRef ds:uri="http://schemas.microsoft.com/internal/obd"/>
   </ds:schemaRefs>
 </ds:datastoreItem>
-</file>
-
-<file path=customXml/itemProps3.xml><?xml version="1.0" encoding="utf-8"?>
-<ds:datastoreItem xmlns:ds="http://schemas.openxmlformats.org/officeDocument/2006/customXml" ds:itemID="{60C67BEE-D13F-4BD2-98A5-34D8A0977F68}">
-  <ds:schemaRefs>
-    <ds:schemaRef ds:uri="http://purl.org/dc/dcmitype/"/>
-    <ds:schemaRef ds:uri="http://purl.org/dc/elements/1.1/"/>
-    <ds:schemaRef ds:uri="http://schemas.microsoft.com/office/2006/metadata/properties"/>
-    <ds:schemaRef ds:uri="4873beb7-5857-4685-be1f-d57550cc96cc"/>
-    <ds:schemaRef ds:uri="http://schemas.microsoft.com/office/2006/documentManagement/types"/>
-    <ds:schemaRef ds:uri="http://schemas.microsoft.com/office/infopath/2007/PartnerControls"/>
-    <ds:schemaRef ds:uri="http://schemas.openxmlformats.org/package/2006/metadata/core-properties"/>
-    <ds:schemaRef ds:uri="http://www.w3.org/XML/1998/namespace"/>
-    <ds:schemaRef ds:uri="http://purl.org/dc/terms/"/>
-  </ds:schemaRefs>
-</ds:datastoreItem>
 </file>
</xml_diff>

<commit_message>
Added EDSR and MDSR, their code is in colab
</commit_message>
<xml_diff>
--- a/Улучшение качества изображений.pptx
+++ b/Улучшение качества изображений.pptx
@@ -5,10 +5,10 @@
     <p:sldMasterId id="2147483660" r:id="rId4"/>
   </p:sldMasterIdLst>
   <p:notesMasterIdLst>
-    <p:notesMasterId r:id="rId14"/>
+    <p:notesMasterId r:id="rId16"/>
   </p:notesMasterIdLst>
   <p:handoutMasterIdLst>
-    <p:handoutMasterId r:id="rId15"/>
+    <p:handoutMasterId r:id="rId17"/>
   </p:handoutMasterIdLst>
   <p:sldIdLst>
     <p:sldId id="257" r:id="rId5"/>
@@ -20,12 +20,14 @@
     <p:sldId id="278" r:id="rId11"/>
     <p:sldId id="279" r:id="rId12"/>
     <p:sldId id="280" r:id="rId13"/>
+    <p:sldId id="284" r:id="rId14"/>
+    <p:sldId id="285" r:id="rId15"/>
   </p:sldIdLst>
   <p:sldSz cx="12188825" cy="6858000"/>
   <p:notesSz cx="6858000" cy="9144000"/>
   <p:defaultTextStyle>
     <a:defPPr rtl="0">
-      <a:defRPr lang="ru-ru"/>
+      <a:defRPr lang="ru-RU"/>
     </a:defPPr>
     <a:lvl1pPr marL="0" algn="l" defTabSz="1218987" rtl="0" eaLnBrk="1" latinLnBrk="0" hangingPunct="1">
       <a:defRPr sz="2400" kern="1200">
@@ -5269,6 +5271,1658 @@
 </p:sld>
 </file>
 
+<file path=ppt/slides/slide10.xml><?xml version="1.0" encoding="utf-8"?>
+<p:sld xmlns:a="http://schemas.openxmlformats.org/drawingml/2006/main" xmlns:r="http://schemas.openxmlformats.org/officeDocument/2006/relationships" xmlns:p="http://schemas.openxmlformats.org/presentationml/2006/main">
+  <p:cSld>
+    <p:spTree>
+      <p:nvGrpSpPr>
+        <p:cNvPr id="1" name=""/>
+        <p:cNvGrpSpPr/>
+        <p:nvPr/>
+      </p:nvGrpSpPr>
+      <p:grpSpPr>
+        <a:xfrm>
+          <a:off x="0" y="0"/>
+          <a:ext cx="0" cy="0"/>
+          <a:chOff x="0" y="0"/>
+          <a:chExt cx="0" cy="0"/>
+        </a:xfrm>
+      </p:grpSpPr>
+      <p:sp>
+        <p:nvSpPr>
+          <p:cNvPr id="3" name="Подзаголовок 2">
+            <a:extLst>
+              <a:ext uri="{FF2B5EF4-FFF2-40B4-BE49-F238E27FC236}">
+                <a16:creationId xmlns:a16="http://schemas.microsoft.com/office/drawing/2014/main" id="{E92BA08A-6BE6-4489-9B4A-C01DB2981FFC}"/>
+              </a:ext>
+            </a:extLst>
+          </p:cNvPr>
+          <p:cNvSpPr>
+            <a:spLocks noGrp="1"/>
+          </p:cNvSpPr>
+          <p:nvPr>
+            <p:ph type="subTitle" idx="1"/>
+          </p:nvPr>
+        </p:nvSpPr>
+        <p:spPr>
+          <a:xfrm>
+            <a:off x="837828" y="2465512"/>
+            <a:ext cx="10297144" cy="4392488"/>
+          </a:xfrm>
+        </p:spPr>
+        <p:txBody>
+          <a:bodyPr>
+            <a:normAutofit/>
+          </a:bodyPr>
+          <a:lstStyle/>
+          <a:p>
+            <a:r>
+              <a:rPr lang="ru-RU" cap="none" dirty="0"/>
+              <a:t>Цель:</a:t>
+            </a:r>
+          </a:p>
+          <a:p>
+            <a:pPr marL="514350" indent="-514350">
+              <a:buFont typeface="+mj-lt"/>
+              <a:buAutoNum type="arabicPeriod"/>
+            </a:pPr>
+            <a:r>
+              <a:rPr lang="ru-RU" cap="none" dirty="0"/>
+              <a:t>Реализовать (или найти реализацию) моделей для сравнения получаемых результатов;</a:t>
+            </a:r>
+          </a:p>
+          <a:p>
+            <a:pPr marL="514350" indent="-514350">
+              <a:buFont typeface="+mj-lt"/>
+              <a:buAutoNum type="arabicPeriod"/>
+            </a:pPr>
+            <a:r>
+              <a:rPr lang="ru-RU" cap="none" dirty="0"/>
+              <a:t>Сравнить результаты распознавалки после изменения разрешения моделями;</a:t>
+            </a:r>
+          </a:p>
+          <a:p>
+            <a:pPr marL="514350" indent="-514350">
+              <a:buFont typeface="+mj-lt"/>
+              <a:buAutoNum type="arabicPeriod"/>
+            </a:pPr>
+            <a:r>
+              <a:rPr lang="ru-RU" cap="none" dirty="0"/>
+              <a:t>Подтвердить или опровергнуть гипотезу об улучшении распознавания после предварительного увеличения разрешения поступающих изображений</a:t>
+            </a:r>
+            <a:r>
+              <a:rPr lang="en-US" cap="none" dirty="0"/>
+              <a:t>.</a:t>
+            </a:r>
+            <a:endParaRPr lang="ru-RU" cap="none" dirty="0"/>
+          </a:p>
+          <a:p>
+            <a:endParaRPr lang="ru-RU" cap="none" dirty="0"/>
+          </a:p>
+        </p:txBody>
+      </p:sp>
+      <p:graphicFrame>
+        <p:nvGraphicFramePr>
+          <p:cNvPr id="4" name="Таблица 3">
+            <a:extLst>
+              <a:ext uri="{FF2B5EF4-FFF2-40B4-BE49-F238E27FC236}">
+                <a16:creationId xmlns:a16="http://schemas.microsoft.com/office/drawing/2014/main" id="{729675FB-74FA-41EC-A846-279ACF300D61}"/>
+              </a:ext>
+            </a:extLst>
+          </p:cNvPr>
+          <p:cNvGraphicFramePr>
+            <a:graphicFrameLocks noGrp="1"/>
+          </p:cNvGraphicFramePr>
+          <p:nvPr>
+            <p:extLst>
+              <p:ext uri="{D42A27DB-BD31-4B8C-83A1-F6EECF244321}">
+                <p14:modId xmlns:p14="http://schemas.microsoft.com/office/powerpoint/2010/main" val="3023449964"/>
+              </p:ext>
+            </p:extLst>
+          </p:nvPr>
+        </p:nvGraphicFramePr>
+        <p:xfrm>
+          <a:off x="2031470" y="260648"/>
+          <a:ext cx="8125884" cy="1188720"/>
+        </p:xfrm>
+        <a:graphic>
+          <a:graphicData uri="http://schemas.openxmlformats.org/drawingml/2006/table">
+            <a:tbl>
+              <a:tblPr bandRow="1">
+                <a:tableStyleId>{5C22544A-7EE6-4342-B048-85BDC9FD1C3A}</a:tableStyleId>
+              </a:tblPr>
+              <a:tblGrid>
+                <a:gridCol w="4062942">
+                  <a:extLst>
+                    <a:ext uri="{9D8B030D-6E8A-4147-A177-3AD203B41FA5}">
+                      <a16:colId xmlns:a16="http://schemas.microsoft.com/office/drawing/2014/main" val="1717258048"/>
+                    </a:ext>
+                  </a:extLst>
+                </a:gridCol>
+                <a:gridCol w="4062942">
+                  <a:extLst>
+                    <a:ext uri="{9D8B030D-6E8A-4147-A177-3AD203B41FA5}">
+                      <a16:colId xmlns:a16="http://schemas.microsoft.com/office/drawing/2014/main" val="3902171362"/>
+                    </a:ext>
+                  </a:extLst>
+                </a:gridCol>
+              </a:tblGrid>
+              <a:tr h="895487">
+                <a:tc>
+                  <a:txBody>
+                    <a:bodyPr/>
+                    <a:lstStyle/>
+                    <a:p>
+                      <a:pPr algn="ctr"/>
+                      <a:r>
+                        <a:rPr lang="ru-RU" dirty="0"/>
+                        <a:t>Реализация и/или использование существующих решений</a:t>
+                      </a:r>
+                    </a:p>
+                  </a:txBody>
+                  <a:tcPr anchor="ctr"/>
+                </a:tc>
+                <a:tc>
+                  <a:txBody>
+                    <a:bodyPr/>
+                    <a:lstStyle/>
+                    <a:p>
+                      <a:pPr algn="ctr"/>
+                      <a:r>
+                        <a:rPr lang="ru-RU" dirty="0"/>
+                        <a:t>05.04.19 – 02.05.19</a:t>
+                      </a:r>
+                    </a:p>
+                  </a:txBody>
+                  <a:tcPr anchor="ctr"/>
+                </a:tc>
+                <a:extLst>
+                  <a:ext uri="{0D108BD9-81ED-4DB2-BD59-A6C34878D82A}">
+                    <a16:rowId xmlns:a16="http://schemas.microsoft.com/office/drawing/2014/main" val="3728529990"/>
+                  </a:ext>
+                </a:extLst>
+              </a:tr>
+            </a:tbl>
+          </a:graphicData>
+        </a:graphic>
+      </p:graphicFrame>
+      <p:sp>
+        <p:nvSpPr>
+          <p:cNvPr id="9" name="TextBox 8">
+            <a:extLst>
+              <a:ext uri="{FF2B5EF4-FFF2-40B4-BE49-F238E27FC236}">
+                <a16:creationId xmlns:a16="http://schemas.microsoft.com/office/drawing/2014/main" id="{96931D61-EDCC-4BEE-BA8C-16ED8831008B}"/>
+              </a:ext>
+            </a:extLst>
+          </p:cNvPr>
+          <p:cNvSpPr txBox="1"/>
+          <p:nvPr/>
+        </p:nvSpPr>
+        <p:spPr>
+          <a:xfrm>
+            <a:off x="10965997" y="3559452"/>
+            <a:ext cx="453970" cy="523220"/>
+          </a:xfrm>
+          <a:prstGeom prst="rect">
+            <a:avLst/>
+          </a:prstGeom>
+          <a:noFill/>
+        </p:spPr>
+        <p:txBody>
+          <a:bodyPr wrap="none" rtlCol="0">
+            <a:spAutoFit/>
+          </a:bodyPr>
+          <a:lstStyle/>
+          <a:p>
+            <a:r>
+              <a:rPr lang="ru-RU" sz="2800" dirty="0">
+                <a:solidFill>
+                  <a:srgbClr val="00B050"/>
+                </a:solidFill>
+              </a:rPr>
+              <a:t>✓</a:t>
+            </a:r>
+            <a:endParaRPr lang="ru-RU" sz="2800" dirty="0"/>
+          </a:p>
+        </p:txBody>
+      </p:sp>
+      <p:sp>
+        <p:nvSpPr>
+          <p:cNvPr id="10" name="TextBox 9">
+            <a:extLst>
+              <a:ext uri="{FF2B5EF4-FFF2-40B4-BE49-F238E27FC236}">
+                <a16:creationId xmlns:a16="http://schemas.microsoft.com/office/drawing/2014/main" id="{AF219617-C411-4E8D-A618-4B03584D993B}"/>
+              </a:ext>
+            </a:extLst>
+          </p:cNvPr>
+          <p:cNvSpPr txBox="1"/>
+          <p:nvPr/>
+        </p:nvSpPr>
+        <p:spPr>
+          <a:xfrm>
+            <a:off x="10965997" y="4365360"/>
+            <a:ext cx="478016" cy="523220"/>
+          </a:xfrm>
+          <a:prstGeom prst="rect">
+            <a:avLst/>
+          </a:prstGeom>
+          <a:noFill/>
+        </p:spPr>
+        <p:txBody>
+          <a:bodyPr wrap="none" rtlCol="0">
+            <a:spAutoFit/>
+          </a:bodyPr>
+          <a:lstStyle/>
+          <a:p>
+            <a:r>
+              <a:rPr lang="ru-RU" sz="2800" dirty="0">
+                <a:solidFill>
+                  <a:srgbClr val="FF0000"/>
+                </a:solidFill>
+              </a:rPr>
+              <a:t>✗</a:t>
+            </a:r>
+            <a:endParaRPr lang="ru-RU" sz="2800" dirty="0"/>
+          </a:p>
+        </p:txBody>
+      </p:sp>
+      <p:sp>
+        <p:nvSpPr>
+          <p:cNvPr id="11" name="TextBox 10">
+            <a:extLst>
+              <a:ext uri="{FF2B5EF4-FFF2-40B4-BE49-F238E27FC236}">
+                <a16:creationId xmlns:a16="http://schemas.microsoft.com/office/drawing/2014/main" id="{FA344215-AEA5-4717-8D33-EF24225DF3F7}"/>
+              </a:ext>
+            </a:extLst>
+          </p:cNvPr>
+          <p:cNvSpPr txBox="1"/>
+          <p:nvPr/>
+        </p:nvSpPr>
+        <p:spPr>
+          <a:xfrm>
+            <a:off x="10907987" y="2753544"/>
+            <a:ext cx="453970" cy="523220"/>
+          </a:xfrm>
+          <a:prstGeom prst="rect">
+            <a:avLst/>
+          </a:prstGeom>
+          <a:noFill/>
+        </p:spPr>
+        <p:txBody>
+          <a:bodyPr wrap="square" rtlCol="0">
+            <a:spAutoFit/>
+          </a:bodyPr>
+          <a:lstStyle/>
+          <a:p>
+            <a:r>
+              <a:rPr lang="ru-RU" sz="2800" dirty="0">
+                <a:solidFill>
+                  <a:srgbClr val="00B050"/>
+                </a:solidFill>
+              </a:rPr>
+              <a:t>✓</a:t>
+            </a:r>
+            <a:endParaRPr lang="ru-RU" sz="2800" dirty="0"/>
+          </a:p>
+        </p:txBody>
+      </p:sp>
+      <p:graphicFrame>
+        <p:nvGraphicFramePr>
+          <p:cNvPr id="6" name="Таблица 5">
+            <a:extLst>
+              <a:ext uri="{FF2B5EF4-FFF2-40B4-BE49-F238E27FC236}">
+                <a16:creationId xmlns:a16="http://schemas.microsoft.com/office/drawing/2014/main" id="{3789BB86-DCC6-45CB-ACED-B80F9FF0B7FA}"/>
+              </a:ext>
+            </a:extLst>
+          </p:cNvPr>
+          <p:cNvGraphicFramePr>
+            <a:graphicFrameLocks noGrp="1"/>
+          </p:cNvGraphicFramePr>
+          <p:nvPr>
+            <p:extLst>
+              <p:ext uri="{D42A27DB-BD31-4B8C-83A1-F6EECF244321}">
+                <p14:modId xmlns:p14="http://schemas.microsoft.com/office/powerpoint/2010/main" val="1002394639"/>
+              </p:ext>
+            </p:extLst>
+          </p:nvPr>
+        </p:nvGraphicFramePr>
+        <p:xfrm>
+          <a:off x="2031470" y="1453214"/>
+          <a:ext cx="8125884" cy="895487"/>
+        </p:xfrm>
+        <a:graphic>
+          <a:graphicData uri="http://schemas.openxmlformats.org/drawingml/2006/table">
+            <a:tbl>
+              <a:tblPr bandRow="1">
+                <a:tableStyleId>{5C22544A-7EE6-4342-B048-85BDC9FD1C3A}</a:tableStyleId>
+              </a:tblPr>
+              <a:tblGrid>
+                <a:gridCol w="4062942">
+                  <a:extLst>
+                    <a:ext uri="{9D8B030D-6E8A-4147-A177-3AD203B41FA5}">
+                      <a16:colId xmlns:a16="http://schemas.microsoft.com/office/drawing/2014/main" val="796707182"/>
+                    </a:ext>
+                  </a:extLst>
+                </a:gridCol>
+                <a:gridCol w="4062942">
+                  <a:extLst>
+                    <a:ext uri="{9D8B030D-6E8A-4147-A177-3AD203B41FA5}">
+                      <a16:colId xmlns:a16="http://schemas.microsoft.com/office/drawing/2014/main" val="298106310"/>
+                    </a:ext>
+                  </a:extLst>
+                </a:gridCol>
+              </a:tblGrid>
+              <a:tr h="895487">
+                <a:tc>
+                  <a:txBody>
+                    <a:bodyPr/>
+                    <a:lstStyle/>
+                    <a:p>
+                      <a:pPr algn="ctr"/>
+                      <a:r>
+                        <a:rPr lang="ru-RU" dirty="0"/>
+                        <a:t>Улучшение результата</a:t>
+                      </a:r>
+                    </a:p>
+                  </a:txBody>
+                  <a:tcPr anchor="ctr"/>
+                </a:tc>
+                <a:tc>
+                  <a:txBody>
+                    <a:bodyPr/>
+                    <a:lstStyle/>
+                    <a:p>
+                      <a:pPr algn="ctr"/>
+                      <a:r>
+                        <a:rPr lang="ru-RU" dirty="0"/>
+                        <a:t>03.</a:t>
+                      </a:r>
+                      <a:r>
+                        <a:rPr lang="en-US" dirty="0"/>
+                        <a:t>05.19 – 16.05.19</a:t>
+                      </a:r>
+                      <a:endParaRPr lang="ru-RU" dirty="0"/>
+                    </a:p>
+                  </a:txBody>
+                  <a:tcPr anchor="ctr"/>
+                </a:tc>
+                <a:extLst>
+                  <a:ext uri="{0D108BD9-81ED-4DB2-BD59-A6C34878D82A}">
+                    <a16:rowId xmlns:a16="http://schemas.microsoft.com/office/drawing/2014/main" val="178754156"/>
+                  </a:ext>
+                </a:extLst>
+              </a:tr>
+            </a:tbl>
+          </a:graphicData>
+        </a:graphic>
+      </p:graphicFrame>
+    </p:spTree>
+    <p:extLst>
+      <p:ext uri="{BB962C8B-B14F-4D97-AF65-F5344CB8AC3E}">
+        <p14:creationId xmlns:p14="http://schemas.microsoft.com/office/powerpoint/2010/main" val="2966647723"/>
+      </p:ext>
+    </p:extLst>
+  </p:cSld>
+  <p:clrMapOvr>
+    <a:masterClrMapping/>
+  </p:clrMapOvr>
+  <mc:AlternateContent xmlns:mc="http://schemas.openxmlformats.org/markup-compatibility/2006" xmlns:p14="http://schemas.microsoft.com/office/powerpoint/2010/main">
+    <mc:Choice Requires="p14">
+      <p:transition spd="med" p14:dur="700">
+        <p:fade/>
+      </p:transition>
+    </mc:Choice>
+    <mc:Fallback xmlns="">
+      <p:transition spd="med">
+        <p:fade/>
+      </p:transition>
+    </mc:Fallback>
+  </mc:AlternateContent>
+</p:sld>
+</file>
+
+<file path=ppt/slides/slide11.xml><?xml version="1.0" encoding="utf-8"?>
+<p:sld xmlns:a="http://schemas.openxmlformats.org/drawingml/2006/main" xmlns:r="http://schemas.openxmlformats.org/officeDocument/2006/relationships" xmlns:p="http://schemas.openxmlformats.org/presentationml/2006/main">
+  <p:cSld>
+    <p:spTree>
+      <p:nvGrpSpPr>
+        <p:cNvPr id="1" name=""/>
+        <p:cNvGrpSpPr/>
+        <p:nvPr/>
+      </p:nvGrpSpPr>
+      <p:grpSpPr>
+        <a:xfrm>
+          <a:off x="0" y="0"/>
+          <a:ext cx="0" cy="0"/>
+          <a:chOff x="0" y="0"/>
+          <a:chExt cx="0" cy="0"/>
+        </a:xfrm>
+      </p:grpSpPr>
+      <p:sp>
+        <p:nvSpPr>
+          <p:cNvPr id="3" name="Подзаголовок 2">
+            <a:extLst>
+              <a:ext uri="{FF2B5EF4-FFF2-40B4-BE49-F238E27FC236}">
+                <a16:creationId xmlns:a16="http://schemas.microsoft.com/office/drawing/2014/main" id="{E92BA08A-6BE6-4489-9B4A-C01DB2981FFC}"/>
+              </a:ext>
+            </a:extLst>
+          </p:cNvPr>
+          <p:cNvSpPr>
+            <a:spLocks noGrp="1"/>
+          </p:cNvSpPr>
+          <p:nvPr>
+            <p:ph type="subTitle" idx="1"/>
+          </p:nvPr>
+        </p:nvSpPr>
+        <p:spPr>
+          <a:xfrm>
+            <a:off x="945840" y="119391"/>
+            <a:ext cx="10297144" cy="1580666"/>
+          </a:xfrm>
+        </p:spPr>
+        <p:txBody>
+          <a:bodyPr>
+            <a:normAutofit/>
+          </a:bodyPr>
+          <a:lstStyle/>
+          <a:p>
+            <a:r>
+              <a:rPr lang="ru-RU" sz="1800" cap="none" dirty="0"/>
+              <a:t>Результат:</a:t>
+            </a:r>
+          </a:p>
+          <a:p>
+            <a:pPr marL="457200" indent="-457200">
+              <a:buFont typeface="+mj-lt"/>
+              <a:buAutoNum type="arabicPeriod"/>
+            </a:pPr>
+            <a:r>
+              <a:rPr lang="ru-RU" sz="1800" cap="none" dirty="0"/>
+              <a:t>Датасет был увеличен с 300 пар фотографий одного человека до 1668 пар фотографий одного человека и разных людей в пропорции 1:1;</a:t>
+            </a:r>
+          </a:p>
+          <a:p>
+            <a:pPr marL="457200" indent="-457200">
+              <a:buFont typeface="+mj-lt"/>
+              <a:buAutoNum type="arabicPeriod"/>
+            </a:pPr>
+            <a:r>
+              <a:rPr lang="ru-RU" sz="1800" cap="none" dirty="0"/>
+              <a:t>Взяли все фотографии и прогнали их через </a:t>
+            </a:r>
+            <a:r>
+              <a:rPr lang="ru-RU" sz="1800" dirty="0"/>
+              <a:t>2</a:t>
+            </a:r>
+            <a:r>
+              <a:rPr lang="ru-RU" sz="1800" cap="none" dirty="0"/>
+              <a:t> модели с разными </a:t>
+            </a:r>
+            <a:r>
+              <a:rPr lang="ru-RU" sz="1800" cap="none" dirty="0" err="1"/>
+              <a:t>скейлами</a:t>
+            </a:r>
+            <a:r>
+              <a:rPr lang="ru-RU" sz="1800" cap="none" dirty="0"/>
+              <a:t>, получили результаты от распознавалки. </a:t>
+            </a:r>
+          </a:p>
+        </p:txBody>
+      </p:sp>
+      <p:graphicFrame>
+        <p:nvGraphicFramePr>
+          <p:cNvPr id="4" name="Таблица 3"/>
+          <p:cNvGraphicFramePr>
+            <a:graphicFrameLocks noGrp="1"/>
+          </p:cNvGraphicFramePr>
+          <p:nvPr>
+            <p:extLst>
+              <p:ext uri="{D42A27DB-BD31-4B8C-83A1-F6EECF244321}">
+                <p14:modId xmlns:p14="http://schemas.microsoft.com/office/powerpoint/2010/main" val="2568935328"/>
+              </p:ext>
+            </p:extLst>
+          </p:nvPr>
+        </p:nvGraphicFramePr>
+        <p:xfrm>
+          <a:off x="1233872" y="1484784"/>
+          <a:ext cx="9721080" cy="3694435"/>
+        </p:xfrm>
+        <a:graphic>
+          <a:graphicData uri="http://schemas.openxmlformats.org/drawingml/2006/table">
+            <a:tbl>
+              <a:tblPr firstRow="1" bandRow="1">
+                <a:tableStyleId>{5C22544A-7EE6-4342-B048-85BDC9FD1C3A}</a:tableStyleId>
+              </a:tblPr>
+              <a:tblGrid>
+                <a:gridCol w="1620180">
+                  <a:extLst>
+                    <a:ext uri="{9D8B030D-6E8A-4147-A177-3AD203B41FA5}">
+                      <a16:colId xmlns:a16="http://schemas.microsoft.com/office/drawing/2014/main" val="20000"/>
+                    </a:ext>
+                  </a:extLst>
+                </a:gridCol>
+                <a:gridCol w="1620180">
+                  <a:extLst>
+                    <a:ext uri="{9D8B030D-6E8A-4147-A177-3AD203B41FA5}">
+                      <a16:colId xmlns:a16="http://schemas.microsoft.com/office/drawing/2014/main" val="20001"/>
+                    </a:ext>
+                  </a:extLst>
+                </a:gridCol>
+                <a:gridCol w="1620180">
+                  <a:extLst>
+                    <a:ext uri="{9D8B030D-6E8A-4147-A177-3AD203B41FA5}">
+                      <a16:colId xmlns:a16="http://schemas.microsoft.com/office/drawing/2014/main" val="20002"/>
+                    </a:ext>
+                  </a:extLst>
+                </a:gridCol>
+                <a:gridCol w="1620180">
+                  <a:extLst>
+                    <a:ext uri="{9D8B030D-6E8A-4147-A177-3AD203B41FA5}">
+                      <a16:colId xmlns:a16="http://schemas.microsoft.com/office/drawing/2014/main" val="20003"/>
+                    </a:ext>
+                  </a:extLst>
+                </a:gridCol>
+                <a:gridCol w="1620180">
+                  <a:extLst>
+                    <a:ext uri="{9D8B030D-6E8A-4147-A177-3AD203B41FA5}">
+                      <a16:colId xmlns:a16="http://schemas.microsoft.com/office/drawing/2014/main" val="20004"/>
+                    </a:ext>
+                  </a:extLst>
+                </a:gridCol>
+                <a:gridCol w="1620180">
+                  <a:extLst>
+                    <a:ext uri="{9D8B030D-6E8A-4147-A177-3AD203B41FA5}">
+                      <a16:colId xmlns:a16="http://schemas.microsoft.com/office/drawing/2014/main" val="20005"/>
+                    </a:ext>
+                  </a:extLst>
+                </a:gridCol>
+              </a:tblGrid>
+              <a:tr h="574295">
+                <a:tc>
+                  <a:txBody>
+                    <a:bodyPr/>
+                    <a:lstStyle/>
+                    <a:p>
+                      <a:pPr algn="ctr"/>
+                      <a:r>
+                        <a:rPr lang="ru-RU" dirty="0"/>
+                        <a:t>Модель</a:t>
+                      </a:r>
+                    </a:p>
+                  </a:txBody>
+                  <a:tcPr anchor="ctr"/>
+                </a:tc>
+                <a:tc>
+                  <a:txBody>
+                    <a:bodyPr/>
+                    <a:lstStyle/>
+                    <a:p>
+                      <a:pPr algn="ctr"/>
+                      <a:r>
+                        <a:rPr lang="en-US" dirty="0"/>
+                        <a:t>scale</a:t>
+                      </a:r>
+                      <a:endParaRPr lang="ru-RU" dirty="0"/>
+                    </a:p>
+                  </a:txBody>
+                  <a:tcPr anchor="ctr"/>
+                </a:tc>
+                <a:tc>
+                  <a:txBody>
+                    <a:bodyPr/>
+                    <a:lstStyle/>
+                    <a:p>
+                      <a:pPr algn="ctr"/>
+                      <a:r>
+                        <a:rPr lang="en-US" dirty="0"/>
+                        <a:t>accuracy</a:t>
+                      </a:r>
+                      <a:endParaRPr lang="ru-RU" dirty="0"/>
+                    </a:p>
+                  </a:txBody>
+                  <a:tcPr anchor="ctr"/>
+                </a:tc>
+                <a:tc>
+                  <a:txBody>
+                    <a:bodyPr/>
+                    <a:lstStyle/>
+                    <a:p>
+                      <a:pPr algn="ctr"/>
+                      <a:r>
+                        <a:rPr lang="en-US" dirty="0"/>
+                        <a:t>precision</a:t>
+                      </a:r>
+                      <a:endParaRPr lang="ru-RU" dirty="0"/>
+                    </a:p>
+                  </a:txBody>
+                  <a:tcPr anchor="ctr"/>
+                </a:tc>
+                <a:tc>
+                  <a:txBody>
+                    <a:bodyPr/>
+                    <a:lstStyle/>
+                    <a:p>
+                      <a:pPr algn="ctr"/>
+                      <a:r>
+                        <a:rPr lang="en-US" dirty="0"/>
+                        <a:t>recall</a:t>
+                      </a:r>
+                      <a:endParaRPr lang="ru-RU" dirty="0"/>
+                    </a:p>
+                  </a:txBody>
+                  <a:tcPr anchor="ctr"/>
+                </a:tc>
+                <a:tc>
+                  <a:txBody>
+                    <a:bodyPr/>
+                    <a:lstStyle/>
+                    <a:p>
+                      <a:pPr algn="ctr"/>
+                      <a:r>
+                        <a:rPr lang="en-US" dirty="0"/>
+                        <a:t>f1</a:t>
+                      </a:r>
+                      <a:endParaRPr lang="ru-RU" dirty="0"/>
+                    </a:p>
+                  </a:txBody>
+                  <a:tcPr anchor="ctr"/>
+                </a:tc>
+                <a:extLst>
+                  <a:ext uri="{0D108BD9-81ED-4DB2-BD59-A6C34878D82A}">
+                    <a16:rowId xmlns:a16="http://schemas.microsoft.com/office/drawing/2014/main" val="10000"/>
+                  </a:ext>
+                </a:extLst>
+              </a:tr>
+              <a:tr h="801684">
+                <a:tc>
+                  <a:txBody>
+                    <a:bodyPr/>
+                    <a:lstStyle/>
+                    <a:p>
+                      <a:pPr algn="ctr"/>
+                      <a:r>
+                        <a:rPr lang="ru-RU" dirty="0"/>
+                        <a:t>Без улучшения</a:t>
+                      </a:r>
+                    </a:p>
+                  </a:txBody>
+                  <a:tcPr anchor="ctr"/>
+                </a:tc>
+                <a:tc>
+                  <a:txBody>
+                    <a:bodyPr/>
+                    <a:lstStyle/>
+                    <a:p>
+                      <a:pPr algn="ctr"/>
+                      <a:r>
+                        <a:rPr lang="en-US" dirty="0"/>
+                        <a:t>x1</a:t>
+                      </a:r>
+                      <a:endParaRPr lang="ru-RU" dirty="0"/>
+                    </a:p>
+                  </a:txBody>
+                  <a:tcPr anchor="ctr"/>
+                </a:tc>
+                <a:tc>
+                  <a:txBody>
+                    <a:bodyPr/>
+                    <a:lstStyle/>
+                    <a:p>
+                      <a:pPr algn="ctr"/>
+                      <a:r>
+                        <a:rPr lang="en-US" dirty="0"/>
+                        <a:t>73.68 </a:t>
+                      </a:r>
+                      <a:endParaRPr lang="ru-RU" dirty="0"/>
+                    </a:p>
+                  </a:txBody>
+                  <a:tcPr anchor="ctr"/>
+                </a:tc>
+                <a:tc>
+                  <a:txBody>
+                    <a:bodyPr/>
+                    <a:lstStyle/>
+                    <a:p>
+                      <a:pPr algn="ctr"/>
+                      <a:r>
+                        <a:rPr lang="en-US" dirty="0"/>
+                        <a:t>70.72</a:t>
+                      </a:r>
+                      <a:endParaRPr lang="ru-RU" dirty="0"/>
+                    </a:p>
+                  </a:txBody>
+                  <a:tcPr anchor="ctr"/>
+                </a:tc>
+                <a:tc>
+                  <a:txBody>
+                    <a:bodyPr/>
+                    <a:lstStyle/>
+                    <a:p>
+                      <a:pPr algn="ctr"/>
+                      <a:r>
+                        <a:rPr lang="en-US" dirty="0"/>
+                        <a:t>80.82</a:t>
+                      </a:r>
+                      <a:endParaRPr lang="ru-RU" dirty="0"/>
+                    </a:p>
+                  </a:txBody>
+                  <a:tcPr anchor="ctr"/>
+                </a:tc>
+                <a:tc>
+                  <a:txBody>
+                    <a:bodyPr/>
+                    <a:lstStyle/>
+                    <a:p>
+                      <a:pPr algn="ctr"/>
+                      <a:r>
+                        <a:rPr lang="en-US" dirty="0"/>
+                        <a:t>75.43</a:t>
+                      </a:r>
+                      <a:endParaRPr lang="ru-RU" dirty="0"/>
+                    </a:p>
+                  </a:txBody>
+                  <a:tcPr anchor="ctr"/>
+                </a:tc>
+                <a:extLst>
+                  <a:ext uri="{0D108BD9-81ED-4DB2-BD59-A6C34878D82A}">
+                    <a16:rowId xmlns:a16="http://schemas.microsoft.com/office/drawing/2014/main" val="10001"/>
+                  </a:ext>
+                </a:extLst>
+              </a:tr>
+              <a:tr h="574295">
+                <a:tc>
+                  <a:txBody>
+                    <a:bodyPr/>
+                    <a:lstStyle/>
+                    <a:p>
+                      <a:pPr marL="0" marR="0" lvl="0" indent="0" algn="ctr" defTabSz="1218987" rtl="0" eaLnBrk="1" fontAlgn="auto" latinLnBrk="0" hangingPunct="1">
+                        <a:lnSpc>
+                          <a:spcPct val="100000"/>
+                        </a:lnSpc>
+                        <a:spcBef>
+                          <a:spcPts val="0"/>
+                        </a:spcBef>
+                        <a:spcAft>
+                          <a:spcPts val="0"/>
+                        </a:spcAft>
+                        <a:buClrTx/>
+                        <a:buSzTx/>
+                        <a:buFontTx/>
+                        <a:buNone/>
+                        <a:tabLst/>
+                        <a:defRPr/>
+                      </a:pPr>
+                      <a:r>
+                        <a:rPr lang="en-US" dirty="0"/>
+                        <a:t>DCSCN</a:t>
+                      </a:r>
+                      <a:endParaRPr lang="ru-RU" dirty="0"/>
+                    </a:p>
+                  </a:txBody>
+                  <a:tcPr anchor="ctr"/>
+                </a:tc>
+                <a:tc>
+                  <a:txBody>
+                    <a:bodyPr/>
+                    <a:lstStyle/>
+                    <a:p>
+                      <a:pPr algn="ctr"/>
+                      <a:r>
+                        <a:rPr lang="en-US" dirty="0"/>
+                        <a:t>x2</a:t>
+                      </a:r>
+                      <a:endParaRPr lang="ru-RU" dirty="0"/>
+                    </a:p>
+                  </a:txBody>
+                  <a:tcPr anchor="ctr"/>
+                </a:tc>
+                <a:tc>
+                  <a:txBody>
+                    <a:bodyPr/>
+                    <a:lstStyle/>
+                    <a:p>
+                      <a:pPr algn="ctr"/>
+                      <a:r>
+                        <a:rPr lang="en-US" dirty="0"/>
+                        <a:t>73.98 </a:t>
+                      </a:r>
+                      <a:r>
+                        <a:rPr lang="en-US" dirty="0">
+                          <a:solidFill>
+                            <a:srgbClr val="00B050"/>
+                          </a:solidFill>
+                        </a:rPr>
+                        <a:t>↑</a:t>
+                      </a:r>
+                      <a:endParaRPr lang="ru-RU" dirty="0">
+                        <a:solidFill>
+                          <a:srgbClr val="00B050"/>
+                        </a:solidFill>
+                      </a:endParaRPr>
+                    </a:p>
+                  </a:txBody>
+                  <a:tcPr anchor="ctr"/>
+                </a:tc>
+                <a:tc>
+                  <a:txBody>
+                    <a:bodyPr/>
+                    <a:lstStyle/>
+                    <a:p>
+                      <a:pPr algn="ctr"/>
+                      <a:r>
+                        <a:rPr lang="en-US" dirty="0"/>
+                        <a:t>72.12 </a:t>
+                      </a:r>
+                      <a:r>
+                        <a:rPr lang="en-US" dirty="0">
+                          <a:solidFill>
+                            <a:srgbClr val="00B050"/>
+                          </a:solidFill>
+                        </a:rPr>
+                        <a:t>↑</a:t>
+                      </a:r>
+                      <a:endParaRPr lang="ru-RU" dirty="0"/>
+                    </a:p>
+                  </a:txBody>
+                  <a:tcPr anchor="ctr"/>
+                </a:tc>
+                <a:tc>
+                  <a:txBody>
+                    <a:bodyPr/>
+                    <a:lstStyle/>
+                    <a:p>
+                      <a:pPr algn="ctr"/>
+                      <a:r>
+                        <a:rPr lang="en-US" dirty="0"/>
+                        <a:t>83.57 </a:t>
+                      </a:r>
+                      <a:r>
+                        <a:rPr lang="en-US" dirty="0">
+                          <a:solidFill>
+                            <a:srgbClr val="00B050"/>
+                          </a:solidFill>
+                        </a:rPr>
+                        <a:t>↑</a:t>
+                      </a:r>
+                      <a:endParaRPr lang="ru-RU" dirty="0"/>
+                    </a:p>
+                  </a:txBody>
+                  <a:tcPr anchor="ctr"/>
+                </a:tc>
+                <a:tc>
+                  <a:txBody>
+                    <a:bodyPr/>
+                    <a:lstStyle/>
+                    <a:p>
+                      <a:pPr algn="ctr"/>
+                      <a:r>
+                        <a:rPr lang="en-US" dirty="0"/>
+                        <a:t>76.26 </a:t>
+                      </a:r>
+                      <a:r>
+                        <a:rPr lang="en-US" dirty="0">
+                          <a:solidFill>
+                            <a:srgbClr val="00B050"/>
+                          </a:solidFill>
+                        </a:rPr>
+                        <a:t>↑</a:t>
+                      </a:r>
+                      <a:endParaRPr lang="ru-RU" dirty="0"/>
+                    </a:p>
+                  </a:txBody>
+                  <a:tcPr anchor="ctr"/>
+                </a:tc>
+                <a:extLst>
+                  <a:ext uri="{0D108BD9-81ED-4DB2-BD59-A6C34878D82A}">
+                    <a16:rowId xmlns:a16="http://schemas.microsoft.com/office/drawing/2014/main" val="10002"/>
+                  </a:ext>
+                </a:extLst>
+              </a:tr>
+              <a:tr h="574295">
+                <a:tc>
+                  <a:txBody>
+                    <a:bodyPr/>
+                    <a:lstStyle/>
+                    <a:p>
+                      <a:pPr marL="0" marR="0" lvl="0" indent="0" algn="ctr" defTabSz="1218987" rtl="0" eaLnBrk="1" fontAlgn="auto" latinLnBrk="0" hangingPunct="1">
+                        <a:lnSpc>
+                          <a:spcPct val="100000"/>
+                        </a:lnSpc>
+                        <a:spcBef>
+                          <a:spcPts val="0"/>
+                        </a:spcBef>
+                        <a:spcAft>
+                          <a:spcPts val="0"/>
+                        </a:spcAft>
+                        <a:buClrTx/>
+                        <a:buSzTx/>
+                        <a:buFontTx/>
+                        <a:buNone/>
+                        <a:tabLst/>
+                        <a:defRPr/>
+                      </a:pPr>
+                      <a:r>
+                        <a:rPr lang="en-US" dirty="0"/>
+                        <a:t>DCSCN</a:t>
+                      </a:r>
+                      <a:endParaRPr lang="ru-RU" dirty="0"/>
+                    </a:p>
+                  </a:txBody>
+                  <a:tcPr anchor="ctr"/>
+                </a:tc>
+                <a:tc>
+                  <a:txBody>
+                    <a:bodyPr/>
+                    <a:lstStyle/>
+                    <a:p>
+                      <a:pPr algn="ctr"/>
+                      <a:r>
+                        <a:rPr lang="en-US" dirty="0"/>
+                        <a:t>x3</a:t>
+                      </a:r>
+                      <a:endParaRPr lang="ru-RU" dirty="0"/>
+                    </a:p>
+                  </a:txBody>
+                  <a:tcPr anchor="ctr"/>
+                </a:tc>
+                <a:tc>
+                  <a:txBody>
+                    <a:bodyPr/>
+                    <a:lstStyle/>
+                    <a:p>
+                      <a:pPr algn="ctr"/>
+                      <a:r>
+                        <a:rPr lang="en-US" dirty="0"/>
+                        <a:t>72.48 </a:t>
+                      </a:r>
+                      <a:r>
+                        <a:rPr lang="en-US" dirty="0">
+                          <a:solidFill>
+                            <a:srgbClr val="FF0000"/>
+                          </a:solidFill>
+                        </a:rPr>
+                        <a:t>↓</a:t>
+                      </a:r>
+                      <a:endParaRPr lang="ru-RU" dirty="0">
+                        <a:solidFill>
+                          <a:srgbClr val="FF0000"/>
+                        </a:solidFill>
+                      </a:endParaRPr>
+                    </a:p>
+                  </a:txBody>
+                  <a:tcPr anchor="ctr"/>
+                </a:tc>
+                <a:tc>
+                  <a:txBody>
+                    <a:bodyPr/>
+                    <a:lstStyle/>
+                    <a:p>
+                      <a:pPr algn="ctr"/>
+                      <a:r>
+                        <a:rPr lang="en-US" dirty="0"/>
+                        <a:t>68.40 </a:t>
+                      </a:r>
+                      <a:r>
+                        <a:rPr lang="en-US" dirty="0">
+                          <a:solidFill>
+                            <a:srgbClr val="FF0000"/>
+                          </a:solidFill>
+                        </a:rPr>
+                        <a:t>↓</a:t>
+                      </a:r>
+                      <a:r>
+                        <a:rPr lang="en-US" dirty="0"/>
+                        <a:t> </a:t>
+                      </a:r>
+                      <a:endParaRPr lang="ru-RU" dirty="0"/>
+                    </a:p>
+                  </a:txBody>
+                  <a:tcPr anchor="ctr"/>
+                </a:tc>
+                <a:tc>
+                  <a:txBody>
+                    <a:bodyPr/>
+                    <a:lstStyle/>
+                    <a:p>
+                      <a:pPr algn="ctr"/>
+                      <a:r>
+                        <a:rPr lang="en-US" dirty="0"/>
+                        <a:t>83.57 </a:t>
+                      </a:r>
+                      <a:r>
+                        <a:rPr lang="en-US" dirty="0">
+                          <a:solidFill>
+                            <a:srgbClr val="00B050"/>
+                          </a:solidFill>
+                        </a:rPr>
+                        <a:t>↑</a:t>
+                      </a:r>
+                      <a:endParaRPr lang="ru-RU" dirty="0"/>
+                    </a:p>
+                  </a:txBody>
+                  <a:tcPr anchor="ctr"/>
+                </a:tc>
+                <a:tc>
+                  <a:txBody>
+                    <a:bodyPr/>
+                    <a:lstStyle/>
+                    <a:p>
+                      <a:pPr algn="ctr"/>
+                      <a:r>
+                        <a:rPr lang="en-US" dirty="0"/>
+                        <a:t>75.23 </a:t>
+                      </a:r>
+                      <a:r>
+                        <a:rPr lang="en-US" dirty="0">
+                          <a:solidFill>
+                            <a:srgbClr val="FF0000"/>
+                          </a:solidFill>
+                        </a:rPr>
+                        <a:t>↓</a:t>
+                      </a:r>
+                      <a:endParaRPr lang="ru-RU" dirty="0"/>
+                    </a:p>
+                  </a:txBody>
+                  <a:tcPr anchor="ctr"/>
+                </a:tc>
+                <a:extLst>
+                  <a:ext uri="{0D108BD9-81ED-4DB2-BD59-A6C34878D82A}">
+                    <a16:rowId xmlns:a16="http://schemas.microsoft.com/office/drawing/2014/main" val="10003"/>
+                  </a:ext>
+                </a:extLst>
+              </a:tr>
+              <a:tr h="574295">
+                <a:tc>
+                  <a:txBody>
+                    <a:bodyPr/>
+                    <a:lstStyle/>
+                    <a:p>
+                      <a:pPr marL="0" marR="0" lvl="0" indent="0" algn="ctr" defTabSz="1218987" rtl="0" eaLnBrk="1" fontAlgn="auto" latinLnBrk="0" hangingPunct="1">
+                        <a:lnSpc>
+                          <a:spcPct val="100000"/>
+                        </a:lnSpc>
+                        <a:spcBef>
+                          <a:spcPts val="0"/>
+                        </a:spcBef>
+                        <a:spcAft>
+                          <a:spcPts val="0"/>
+                        </a:spcAft>
+                        <a:buClrTx/>
+                        <a:buSzTx/>
+                        <a:buFontTx/>
+                        <a:buNone/>
+                        <a:tabLst/>
+                        <a:defRPr/>
+                      </a:pPr>
+                      <a:r>
+                        <a:rPr lang="en-US" dirty="0"/>
+                        <a:t>DCSCN</a:t>
+                      </a:r>
+                      <a:endParaRPr lang="ru-RU" dirty="0"/>
+                    </a:p>
+                  </a:txBody>
+                  <a:tcPr anchor="ctr"/>
+                </a:tc>
+                <a:tc>
+                  <a:txBody>
+                    <a:bodyPr/>
+                    <a:lstStyle/>
+                    <a:p>
+                      <a:pPr algn="ctr"/>
+                      <a:r>
+                        <a:rPr lang="en-US" dirty="0"/>
+                        <a:t>x4</a:t>
+                      </a:r>
+                      <a:endParaRPr lang="ru-RU" dirty="0"/>
+                    </a:p>
+                  </a:txBody>
+                  <a:tcPr anchor="ctr"/>
+                </a:tc>
+                <a:tc>
+                  <a:txBody>
+                    <a:bodyPr/>
+                    <a:lstStyle/>
+                    <a:p>
+                      <a:pPr algn="ctr"/>
+                      <a:r>
+                        <a:rPr lang="en-US" dirty="0"/>
+                        <a:t>71.94 </a:t>
+                      </a:r>
+                      <a:r>
+                        <a:rPr lang="en-US" dirty="0">
+                          <a:solidFill>
+                            <a:srgbClr val="FF0000"/>
+                          </a:solidFill>
+                        </a:rPr>
+                        <a:t>↓</a:t>
+                      </a:r>
+                      <a:endParaRPr lang="ru-RU" dirty="0"/>
+                    </a:p>
+                  </a:txBody>
+                  <a:tcPr anchor="ctr"/>
+                </a:tc>
+                <a:tc>
+                  <a:txBody>
+                    <a:bodyPr/>
+                    <a:lstStyle/>
+                    <a:p>
+                      <a:pPr algn="ctr"/>
+                      <a:r>
+                        <a:rPr lang="en-US" dirty="0"/>
+                        <a:t>67.73 </a:t>
+                      </a:r>
+                      <a:r>
+                        <a:rPr lang="en-US" dirty="0">
+                          <a:solidFill>
+                            <a:srgbClr val="FF0000"/>
+                          </a:solidFill>
+                        </a:rPr>
+                        <a:t>↓</a:t>
+                      </a:r>
+                      <a:endParaRPr lang="ru-RU" dirty="0"/>
+                    </a:p>
+                  </a:txBody>
+                  <a:tcPr anchor="ctr"/>
+                </a:tc>
+                <a:tc>
+                  <a:txBody>
+                    <a:bodyPr/>
+                    <a:lstStyle/>
+                    <a:p>
+                      <a:pPr algn="ctr"/>
+                      <a:r>
+                        <a:rPr lang="en-US" dirty="0"/>
+                        <a:t>83.81 </a:t>
+                      </a:r>
+                      <a:r>
+                        <a:rPr lang="en-US" dirty="0">
+                          <a:solidFill>
+                            <a:srgbClr val="00B050"/>
+                          </a:solidFill>
+                        </a:rPr>
+                        <a:t>↑</a:t>
+                      </a:r>
+                      <a:endParaRPr lang="ru-RU" dirty="0"/>
+                    </a:p>
+                  </a:txBody>
+                  <a:tcPr anchor="ctr"/>
+                </a:tc>
+                <a:tc>
+                  <a:txBody>
+                    <a:bodyPr/>
+                    <a:lstStyle/>
+                    <a:p>
+                      <a:pPr algn="ctr"/>
+                      <a:r>
+                        <a:rPr lang="en-US" dirty="0"/>
+                        <a:t>74.92 </a:t>
+                      </a:r>
+                      <a:r>
+                        <a:rPr lang="en-US" dirty="0">
+                          <a:solidFill>
+                            <a:srgbClr val="FF0000"/>
+                          </a:solidFill>
+                        </a:rPr>
+                        <a:t>↓</a:t>
+                      </a:r>
+                      <a:endParaRPr lang="ru-RU" dirty="0"/>
+                    </a:p>
+                  </a:txBody>
+                  <a:tcPr anchor="ctr"/>
+                </a:tc>
+                <a:extLst>
+                  <a:ext uri="{0D108BD9-81ED-4DB2-BD59-A6C34878D82A}">
+                    <a16:rowId xmlns:a16="http://schemas.microsoft.com/office/drawing/2014/main" val="10004"/>
+                  </a:ext>
+                </a:extLst>
+              </a:tr>
+              <a:tr h="574295">
+                <a:tc>
+                  <a:txBody>
+                    <a:bodyPr/>
+                    <a:lstStyle/>
+                    <a:p>
+                      <a:pPr algn="ctr"/>
+                      <a:r>
+                        <a:rPr lang="en-US" dirty="0"/>
+                        <a:t>ESRGAN</a:t>
+                      </a:r>
+                      <a:endParaRPr lang="ru-RU" dirty="0"/>
+                    </a:p>
+                  </a:txBody>
+                  <a:tcPr anchor="ctr"/>
+                </a:tc>
+                <a:tc>
+                  <a:txBody>
+                    <a:bodyPr/>
+                    <a:lstStyle/>
+                    <a:p>
+                      <a:pPr algn="ctr"/>
+                      <a:r>
+                        <a:rPr lang="en-US" dirty="0"/>
+                        <a:t>x4</a:t>
+                      </a:r>
+                      <a:endParaRPr lang="ru-RU" dirty="0"/>
+                    </a:p>
+                  </a:txBody>
+                  <a:tcPr anchor="ctr"/>
+                </a:tc>
+                <a:tc>
+                  <a:txBody>
+                    <a:bodyPr/>
+                    <a:lstStyle/>
+                    <a:p>
+                      <a:pPr algn="ctr"/>
+                      <a:r>
+                        <a:rPr lang="en-US" dirty="0"/>
+                        <a:t>72.00 </a:t>
+                      </a:r>
+                      <a:r>
+                        <a:rPr lang="en-US" dirty="0">
+                          <a:solidFill>
+                            <a:srgbClr val="FF0000"/>
+                          </a:solidFill>
+                        </a:rPr>
+                        <a:t>↓</a:t>
+                      </a:r>
+                      <a:endParaRPr lang="ru-RU" dirty="0"/>
+                    </a:p>
+                  </a:txBody>
+                  <a:tcPr anchor="ctr"/>
+                </a:tc>
+                <a:tc>
+                  <a:txBody>
+                    <a:bodyPr/>
+                    <a:lstStyle/>
+                    <a:p>
+                      <a:pPr algn="ctr"/>
+                      <a:r>
+                        <a:rPr lang="en-US" dirty="0"/>
+                        <a:t>67.59 </a:t>
+                      </a:r>
+                      <a:r>
+                        <a:rPr lang="en-US" dirty="0">
+                          <a:solidFill>
+                            <a:srgbClr val="FF0000"/>
+                          </a:solidFill>
+                        </a:rPr>
+                        <a:t>↓</a:t>
+                      </a:r>
+                      <a:endParaRPr lang="ru-RU" dirty="0"/>
+                    </a:p>
+                  </a:txBody>
+                  <a:tcPr anchor="ctr"/>
+                </a:tc>
+                <a:tc>
+                  <a:txBody>
+                    <a:bodyPr/>
+                    <a:lstStyle/>
+                    <a:p>
+                      <a:pPr algn="ctr"/>
+                      <a:r>
+                        <a:rPr lang="en-US" dirty="0"/>
+                        <a:t>84.53 </a:t>
+                      </a:r>
+                      <a:r>
+                        <a:rPr lang="en-US" dirty="0">
+                          <a:solidFill>
+                            <a:srgbClr val="00B050"/>
+                          </a:solidFill>
+                        </a:rPr>
+                        <a:t>↑</a:t>
+                      </a:r>
+                      <a:endParaRPr lang="ru-RU" dirty="0"/>
+                    </a:p>
+                  </a:txBody>
+                  <a:tcPr anchor="ctr"/>
+                </a:tc>
+                <a:tc>
+                  <a:txBody>
+                    <a:bodyPr/>
+                    <a:lstStyle/>
+                    <a:p>
+                      <a:pPr algn="ctr"/>
+                      <a:r>
+                        <a:rPr lang="en-US" dirty="0"/>
+                        <a:t>75.12 </a:t>
+                      </a:r>
+                      <a:r>
+                        <a:rPr lang="en-US" dirty="0">
+                          <a:solidFill>
+                            <a:srgbClr val="FF0000"/>
+                          </a:solidFill>
+                        </a:rPr>
+                        <a:t>↓</a:t>
+                      </a:r>
+                      <a:endParaRPr lang="ru-RU" dirty="0"/>
+                    </a:p>
+                  </a:txBody>
+                  <a:tcPr anchor="ctr"/>
+                </a:tc>
+                <a:extLst>
+                  <a:ext uri="{0D108BD9-81ED-4DB2-BD59-A6C34878D82A}">
+                    <a16:rowId xmlns:a16="http://schemas.microsoft.com/office/drawing/2014/main" val="10006"/>
+                  </a:ext>
+                </a:extLst>
+              </a:tr>
+            </a:tbl>
+          </a:graphicData>
+        </a:graphic>
+      </p:graphicFrame>
+      <p:sp>
+        <p:nvSpPr>
+          <p:cNvPr id="5" name="Подзаголовок 2">
+            <a:extLst>
+              <a:ext uri="{FF2B5EF4-FFF2-40B4-BE49-F238E27FC236}">
+                <a16:creationId xmlns:a16="http://schemas.microsoft.com/office/drawing/2014/main" id="{CA50B5C6-D1E3-4C79-B53A-CB9EBC0EE297}"/>
+              </a:ext>
+            </a:extLst>
+          </p:cNvPr>
+          <p:cNvSpPr txBox="1">
+            <a:spLocks/>
+          </p:cNvSpPr>
+          <p:nvPr/>
+        </p:nvSpPr>
+        <p:spPr>
+          <a:xfrm>
+            <a:off x="951098" y="5179219"/>
+            <a:ext cx="10297144" cy="2589530"/>
+          </a:xfrm>
+          <a:prstGeom prst="rect">
+            <a:avLst/>
+          </a:prstGeom>
+        </p:spPr>
+        <p:txBody>
+          <a:bodyPr vert="horz" lIns="121899" tIns="60949" rIns="121899" bIns="60949" rtlCol="0">
+            <a:normAutofit/>
+          </a:bodyPr>
+          <a:lstStyle>
+            <a:lvl1pPr marL="0" indent="0" algn="l" defTabSz="1218987" rtl="0" eaLnBrk="1" latinLnBrk="0" hangingPunct="1">
+              <a:lnSpc>
+                <a:spcPct val="90000"/>
+              </a:lnSpc>
+              <a:spcBef>
+                <a:spcPts val="0"/>
+              </a:spcBef>
+              <a:buClr>
+                <a:schemeClr val="accent1"/>
+              </a:buClr>
+              <a:buSzPct val="100000"/>
+              <a:buFont typeface="Arial" pitchFamily="34" charset="0"/>
+              <a:buNone/>
+              <a:defRPr sz="2800" kern="1200" cap="all" spc="200" baseline="0">
+                <a:solidFill>
+                  <a:schemeClr val="accent1"/>
+                </a:solidFill>
+                <a:latin typeface="+mn-lt"/>
+                <a:ea typeface="+mn-ea"/>
+                <a:cs typeface="+mn-cs"/>
+              </a:defRPr>
+            </a:lvl1pPr>
+            <a:lvl2pPr marL="609493" indent="0" algn="ctr" defTabSz="1218987" rtl="0" eaLnBrk="1" latinLnBrk="0" hangingPunct="1">
+              <a:lnSpc>
+                <a:spcPct val="90000"/>
+              </a:lnSpc>
+              <a:spcBef>
+                <a:spcPts val="800"/>
+              </a:spcBef>
+              <a:buClr>
+                <a:schemeClr val="accent1"/>
+              </a:buClr>
+              <a:buSzPct val="80000"/>
+              <a:buFont typeface="Arial" pitchFamily="34" charset="0"/>
+              <a:buNone/>
+              <a:defRPr sz="2400" kern="1200">
+                <a:solidFill>
+                  <a:schemeClr val="tx1">
+                    <a:tint val="75000"/>
+                  </a:schemeClr>
+                </a:solidFill>
+                <a:latin typeface="+mn-lt"/>
+                <a:ea typeface="+mn-ea"/>
+                <a:cs typeface="+mn-cs"/>
+              </a:defRPr>
+            </a:lvl2pPr>
+            <a:lvl3pPr marL="1218987" indent="0" algn="ctr" defTabSz="1218987" rtl="0" eaLnBrk="1" latinLnBrk="0" hangingPunct="1">
+              <a:lnSpc>
+                <a:spcPct val="90000"/>
+              </a:lnSpc>
+              <a:spcBef>
+                <a:spcPts val="800"/>
+              </a:spcBef>
+              <a:buClr>
+                <a:schemeClr val="accent1"/>
+              </a:buClr>
+              <a:buSzPct val="80000"/>
+              <a:buFont typeface="Arial" pitchFamily="34" charset="0"/>
+              <a:buNone/>
+              <a:defRPr sz="2000" kern="1200">
+                <a:solidFill>
+                  <a:schemeClr val="tx1">
+                    <a:tint val="75000"/>
+                  </a:schemeClr>
+                </a:solidFill>
+                <a:latin typeface="+mn-lt"/>
+                <a:ea typeface="+mn-ea"/>
+                <a:cs typeface="+mn-cs"/>
+              </a:defRPr>
+            </a:lvl3pPr>
+            <a:lvl4pPr marL="1828480" indent="0" algn="ctr" defTabSz="1218987" rtl="0" eaLnBrk="1" latinLnBrk="0" hangingPunct="1">
+              <a:lnSpc>
+                <a:spcPct val="90000"/>
+              </a:lnSpc>
+              <a:spcBef>
+                <a:spcPts val="800"/>
+              </a:spcBef>
+              <a:buClr>
+                <a:schemeClr val="accent1"/>
+              </a:buClr>
+              <a:buSzPct val="80000"/>
+              <a:buFont typeface="Arial" pitchFamily="34" charset="0"/>
+              <a:buNone/>
+              <a:defRPr sz="2000" kern="1200">
+                <a:solidFill>
+                  <a:schemeClr val="tx1">
+                    <a:tint val="75000"/>
+                  </a:schemeClr>
+                </a:solidFill>
+                <a:latin typeface="+mn-lt"/>
+                <a:ea typeface="+mn-ea"/>
+                <a:cs typeface="+mn-cs"/>
+              </a:defRPr>
+            </a:lvl4pPr>
+            <a:lvl5pPr marL="2437973" indent="0" algn="ctr" defTabSz="1218987" rtl="0" eaLnBrk="1" latinLnBrk="0" hangingPunct="1">
+              <a:lnSpc>
+                <a:spcPct val="90000"/>
+              </a:lnSpc>
+              <a:spcBef>
+                <a:spcPts val="800"/>
+              </a:spcBef>
+              <a:buClr>
+                <a:schemeClr val="accent1"/>
+              </a:buClr>
+              <a:buSzPct val="80000"/>
+              <a:buFont typeface="Arial" pitchFamily="34" charset="0"/>
+              <a:buNone/>
+              <a:defRPr sz="2000" kern="1200">
+                <a:solidFill>
+                  <a:schemeClr val="tx1">
+                    <a:tint val="75000"/>
+                  </a:schemeClr>
+                </a:solidFill>
+                <a:latin typeface="+mn-lt"/>
+                <a:ea typeface="+mn-ea"/>
+                <a:cs typeface="+mn-cs"/>
+              </a:defRPr>
+            </a:lvl5pPr>
+            <a:lvl6pPr marL="3047467" indent="0" algn="ctr" defTabSz="1218987" rtl="0" eaLnBrk="1" latinLnBrk="0" hangingPunct="1">
+              <a:lnSpc>
+                <a:spcPct val="90000"/>
+              </a:lnSpc>
+              <a:spcBef>
+                <a:spcPts val="800"/>
+              </a:spcBef>
+              <a:buClr>
+                <a:schemeClr val="accent1"/>
+              </a:buClr>
+              <a:buSzPct val="80000"/>
+              <a:buFont typeface="Arial" pitchFamily="34" charset="0"/>
+              <a:buNone/>
+              <a:defRPr sz="2000" kern="1200">
+                <a:solidFill>
+                  <a:schemeClr val="tx1">
+                    <a:tint val="75000"/>
+                  </a:schemeClr>
+                </a:solidFill>
+                <a:latin typeface="+mn-lt"/>
+                <a:ea typeface="+mn-ea"/>
+                <a:cs typeface="+mn-cs"/>
+              </a:defRPr>
+            </a:lvl6pPr>
+            <a:lvl7pPr marL="3656960" indent="0" algn="ctr" defTabSz="1218987" rtl="0" eaLnBrk="1" latinLnBrk="0" hangingPunct="1">
+              <a:lnSpc>
+                <a:spcPct val="90000"/>
+              </a:lnSpc>
+              <a:spcBef>
+                <a:spcPts val="800"/>
+              </a:spcBef>
+              <a:buClr>
+                <a:schemeClr val="accent1"/>
+              </a:buClr>
+              <a:buSzPct val="80000"/>
+              <a:buFont typeface="Arial" pitchFamily="34" charset="0"/>
+              <a:buNone/>
+              <a:defRPr sz="2000" kern="1200">
+                <a:solidFill>
+                  <a:schemeClr val="tx1">
+                    <a:tint val="75000"/>
+                  </a:schemeClr>
+                </a:solidFill>
+                <a:latin typeface="+mn-lt"/>
+                <a:ea typeface="+mn-ea"/>
+                <a:cs typeface="+mn-cs"/>
+              </a:defRPr>
+            </a:lvl7pPr>
+            <a:lvl8pPr marL="4266453" indent="0" algn="ctr" defTabSz="1218987" rtl="0" eaLnBrk="1" latinLnBrk="0" hangingPunct="1">
+              <a:lnSpc>
+                <a:spcPct val="90000"/>
+              </a:lnSpc>
+              <a:spcBef>
+                <a:spcPts val="800"/>
+              </a:spcBef>
+              <a:buClr>
+                <a:schemeClr val="accent1"/>
+              </a:buClr>
+              <a:buSzPct val="80000"/>
+              <a:buFont typeface="Arial" pitchFamily="34" charset="0"/>
+              <a:buNone/>
+              <a:defRPr sz="2000" kern="1200" baseline="0">
+                <a:solidFill>
+                  <a:schemeClr val="tx1">
+                    <a:tint val="75000"/>
+                  </a:schemeClr>
+                </a:solidFill>
+                <a:latin typeface="+mn-lt"/>
+                <a:ea typeface="+mn-ea"/>
+                <a:cs typeface="+mn-cs"/>
+              </a:defRPr>
+            </a:lvl8pPr>
+            <a:lvl9pPr marL="4875947" indent="0" algn="ctr" defTabSz="1218987" rtl="0" eaLnBrk="1" latinLnBrk="0" hangingPunct="1">
+              <a:lnSpc>
+                <a:spcPct val="90000"/>
+              </a:lnSpc>
+              <a:spcBef>
+                <a:spcPts val="800"/>
+              </a:spcBef>
+              <a:buClr>
+                <a:schemeClr val="accent1"/>
+              </a:buClr>
+              <a:buSzPct val="80000"/>
+              <a:buFont typeface="Arial" pitchFamily="34" charset="0"/>
+              <a:buNone/>
+              <a:defRPr sz="2000" kern="1200" baseline="0">
+                <a:solidFill>
+                  <a:schemeClr val="tx1">
+                    <a:tint val="75000"/>
+                  </a:schemeClr>
+                </a:solidFill>
+                <a:latin typeface="+mn-lt"/>
+                <a:ea typeface="+mn-ea"/>
+                <a:cs typeface="+mn-cs"/>
+              </a:defRPr>
+            </a:lvl9pPr>
+          </a:lstStyle>
+          <a:p>
+            <a:r>
+              <a:rPr lang="ru-RU" sz="1800" cap="none" dirty="0">
+                <a:solidFill>
+                  <a:schemeClr val="tx1"/>
+                </a:solidFill>
+              </a:rPr>
+              <a:t>Вывод:</a:t>
+            </a:r>
+          </a:p>
+          <a:p>
+            <a:pPr marL="457200" indent="-457200">
+              <a:buClr>
+                <a:schemeClr val="tx1"/>
+              </a:buClr>
+              <a:buFont typeface="+mj-lt"/>
+              <a:buAutoNum type="arabicPeriod"/>
+            </a:pPr>
+            <a:r>
+              <a:rPr lang="ru-RU" sz="1800" cap="none" dirty="0">
+                <a:solidFill>
+                  <a:schemeClr val="tx1"/>
+                </a:solidFill>
+              </a:rPr>
+              <a:t>Было решено добавить к сравнению еще несколько моделей и лишь затем делать окончательные выводы;</a:t>
+            </a:r>
+          </a:p>
+          <a:p>
+            <a:pPr marL="457200" indent="-457200">
+              <a:buClr>
+                <a:schemeClr val="tx1"/>
+              </a:buClr>
+              <a:buFont typeface="+mj-lt"/>
+              <a:buAutoNum type="arabicPeriod"/>
+            </a:pPr>
+            <a:r>
+              <a:rPr lang="ru-RU" sz="1800" cap="none" dirty="0">
+                <a:solidFill>
+                  <a:schemeClr val="tx1"/>
+                </a:solidFill>
+              </a:rPr>
+              <a:t>Текущий результат получился довольно интересным и может быть использован в задачах, где цена ложноположительных срабатываний ниже, чем ложноотрицательных.</a:t>
+            </a:r>
+          </a:p>
+        </p:txBody>
+      </p:sp>
+    </p:spTree>
+    <p:extLst>
+      <p:ext uri="{BB962C8B-B14F-4D97-AF65-F5344CB8AC3E}">
+        <p14:creationId xmlns:p14="http://schemas.microsoft.com/office/powerpoint/2010/main" val="3548558202"/>
+      </p:ext>
+    </p:extLst>
+  </p:cSld>
+  <p:clrMapOvr>
+    <a:masterClrMapping/>
+  </p:clrMapOvr>
+  <mc:AlternateContent xmlns:mc="http://schemas.openxmlformats.org/markup-compatibility/2006" xmlns:p14="http://schemas.microsoft.com/office/powerpoint/2010/main">
+    <mc:Choice Requires="p14">
+      <p:transition spd="med" p14:dur="700">
+        <p:fade/>
+      </p:transition>
+    </mc:Choice>
+    <mc:Fallback xmlns="">
+      <p:transition spd="med">
+        <p:fade/>
+      </p:transition>
+    </mc:Fallback>
+  </mc:AlternateContent>
+</p:sld>
+</file>
+
 <file path=ppt/slides/slide2.xml><?xml version="1.0" encoding="utf-8"?>
 <p:sld xmlns:a="http://schemas.openxmlformats.org/drawingml/2006/main" xmlns:r="http://schemas.openxmlformats.org/officeDocument/2006/relationships" xmlns:p="http://schemas.openxmlformats.org/presentationml/2006/main">
   <p:cSld>
@@ -6187,71 +7841,20 @@
           </a:bodyPr>
           <a:lstStyle/>
           <a:p>
-            <a:r>
-              <a:rPr lang="ru-RU" cap="none" dirty="0"/>
-              <a:t>Для </a:t>
-            </a:r>
-            <a:r>
-              <a:rPr lang="ru-RU" cap="none" dirty="0" err="1"/>
-              <a:t>распознавалки</a:t>
-            </a:r>
-            <a:r>
-              <a:rPr lang="ru-RU" cap="none" dirty="0"/>
-              <a:t>:</a:t>
-            </a:r>
-            <a:endParaRPr lang="en-US" cap="none" dirty="0"/>
-          </a:p>
-          <a:p>
-            <a:r>
-              <a:rPr lang="en-US" sz="2000" cap="none" dirty="0"/>
+            <a:endParaRPr lang="ru-RU" sz="2000" cap="none" dirty="0"/>
+          </a:p>
+          <a:p>
+            <a:r>
+              <a:rPr lang="en-US" sz="2400" cap="none" dirty="0"/>
               <a:t>Performance_2</a:t>
             </a:r>
             <a:r>
-              <a:rPr lang="ru-RU" sz="2000" cap="none" dirty="0"/>
+              <a:rPr lang="ru-RU" sz="2400" cap="none" dirty="0"/>
               <a:t> </a:t>
             </a:r>
             <a:r>
-              <a:rPr lang="en-US" sz="2000" cap="none" dirty="0"/>
+              <a:rPr lang="en-US" sz="2400" cap="none" dirty="0"/>
               <a:t>&gt; performance_1</a:t>
-            </a:r>
-          </a:p>
-          <a:p>
-            <a:endParaRPr lang="ru-RU" sz="2000" cap="none" dirty="0"/>
-          </a:p>
-          <a:p>
-            <a:r>
-              <a:rPr lang="ru-RU" cap="none" dirty="0"/>
-              <a:t>Для улучшения качества картинок:</a:t>
-            </a:r>
-          </a:p>
-          <a:p>
-            <a:r>
-              <a:rPr lang="ru-RU" sz="2000" cap="none" dirty="0"/>
-              <a:t>Не менее, чем 5% разницы </a:t>
-            </a:r>
-            <a:r>
-              <a:rPr lang="en-US" sz="2000" cap="none" dirty="0"/>
-              <a:t>c</a:t>
-            </a:r>
-            <a:r>
-              <a:rPr lang="ru-RU" sz="2000" cap="none" dirty="0"/>
-              <a:t> </a:t>
-            </a:r>
-            <a:r>
-              <a:rPr lang="en-US" sz="2000" cap="none" dirty="0"/>
-              <a:t>PSNR, SSIN </a:t>
-            </a:r>
-            <a:r>
-              <a:rPr lang="ru-RU" sz="2000" cap="none" dirty="0"/>
-              <a:t>или </a:t>
-            </a:r>
-            <a:r>
-              <a:rPr lang="en-US" sz="2000" cap="none" dirty="0"/>
-              <a:t>IFC</a:t>
-            </a:r>
-            <a:r>
-              <a:rPr lang="ru-RU" sz="2000" cap="none" dirty="0"/>
-              <a:t> по сравнению с алгоритмом бикубической интерполяции при уровне увеличения разрешения до 4-х раз</a:t>
             </a:r>
           </a:p>
         </p:txBody>
@@ -7401,7 +9004,15 @@
             </a:pPr>
             <a:r>
               <a:rPr lang="ru-RU" cap="none" dirty="0"/>
-              <a:t>Произвести проверку гипотезы об улучшении распознавания после предварительного увеличения разрешения поступающих изображений.</a:t>
+              <a:t>Произвести проверку гипотезы об улучшении распознавания после предварительного увеличения разрешения поступающих изображений</a:t>
+            </a:r>
+            <a:r>
+              <a:rPr lang="en-US" cap="none" dirty="0"/>
+              <a:t> </a:t>
+            </a:r>
+            <a:r>
+              <a:rPr lang="ru-RU" cap="none" dirty="0"/>
+              <a:t>в 2 раза.</a:t>
             </a:r>
           </a:p>
           <a:p>
@@ -9895,6 +11506,15 @@
 </file>
 
 <file path=customXml/item1.xml><?xml version="1.0" encoding="utf-8"?>
+<?mso-contentType ?>
+<FormTemplates xmlns="http://schemas.microsoft.com/sharepoint/v3/contenttype/forms">
+  <Display>DocumentLibraryForm</Display>
+  <Edit>AssetEditForm</Edit>
+  <New>DocumentLibraryForm</New>
+</FormTemplates>
+</file>
+
+<file path=customXml/item2.xml><?xml version="1.0" encoding="utf-8"?>
 <p:properties xmlns:p="http://schemas.microsoft.com/office/2006/metadata/properties" xmlns:xsi="http://www.w3.org/2001/XMLSchema-instance" xmlns:pc="http://schemas.microsoft.com/office/infopath/2007/PartnerControls">
   <documentManagement>
     <LocPublishedLinkedAssetsLookup xmlns="4873beb7-5857-4685-be1f-d57550cc96cc" xsi:nil="true"/>
@@ -10028,15 +11648,6 @@
     <LocMarketGroupTiers2 xmlns="4873beb7-5857-4685-be1f-d57550cc96cc" xsi:nil="true"/>
   </documentManagement>
 </p:properties>
-</file>
-
-<file path=customXml/item2.xml><?xml version="1.0" encoding="utf-8"?>
-<?mso-contentType ?>
-<FormTemplates xmlns="http://schemas.microsoft.com/sharepoint/v3/contenttype/forms">
-  <Display>DocumentLibraryForm</Display>
-  <Edit>AssetEditForm</Edit>
-  <New>DocumentLibraryForm</New>
-</FormTemplates>
 </file>
 
 <file path=customXml/item3.xml><?xml version="1.0" encoding="utf-8"?>
@@ -11080,6 +12691,14 @@
 </file>
 
 <file path=customXml/itemProps1.xml><?xml version="1.0" encoding="utf-8"?>
+<ds:datastoreItem xmlns:ds="http://schemas.openxmlformats.org/officeDocument/2006/customXml" ds:itemID="{3836F65B-1B07-41EE-A0E8-BC6EF3855225}">
+  <ds:schemaRefs>
+    <ds:schemaRef ds:uri="http://schemas.microsoft.com/sharepoint/v3/contenttype/forms"/>
+  </ds:schemaRefs>
+</ds:datastoreItem>
+</file>
+
+<file path=customXml/itemProps2.xml><?xml version="1.0" encoding="utf-8"?>
 <ds:datastoreItem xmlns:ds="http://schemas.openxmlformats.org/officeDocument/2006/customXml" ds:itemID="{60C67BEE-D13F-4BD2-98A5-34D8A0977F68}">
   <ds:schemaRefs>
     <ds:schemaRef ds:uri="http://schemas.microsoft.com/office/infopath/2007/PartnerControls"/>
@@ -11091,14 +12710,6 @@
     <ds:schemaRef ds:uri="http://purl.org/dc/elements/1.1/"/>
     <ds:schemaRef ds:uri="http://schemas.microsoft.com/office/2006/metadata/properties"/>
     <ds:schemaRef ds:uri="http://purl.org/dc/terms/"/>
-  </ds:schemaRefs>
-</ds:datastoreItem>
-</file>
-
-<file path=customXml/itemProps2.xml><?xml version="1.0" encoding="utf-8"?>
-<ds:datastoreItem xmlns:ds="http://schemas.openxmlformats.org/officeDocument/2006/customXml" ds:itemID="{3836F65B-1B07-41EE-A0E8-BC6EF3855225}">
-  <ds:schemaRefs>
-    <ds:schemaRef ds:uri="http://schemas.microsoft.com/sharepoint/v3/contenttype/forms"/>
   </ds:schemaRefs>
 </ds:datastoreItem>
 </file>

</xml_diff>

<commit_message>
Added DBPN, DBPNLL, proSR and proSRs
</commit_message>
<xml_diff>
--- a/Улучшение качества изображений.pptx
+++ b/Улучшение качества изображений.pptx
@@ -5,10 +5,10 @@
     <p:sldMasterId id="2147483660" r:id="rId4"/>
   </p:sldMasterIdLst>
   <p:notesMasterIdLst>
-    <p:notesMasterId r:id="rId16"/>
+    <p:notesMasterId r:id="rId18"/>
   </p:notesMasterIdLst>
   <p:handoutMasterIdLst>
-    <p:handoutMasterId r:id="rId17"/>
+    <p:handoutMasterId r:id="rId19"/>
   </p:handoutMasterIdLst>
   <p:sldIdLst>
     <p:sldId id="257" r:id="rId5"/>
@@ -22,6 +22,8 @@
     <p:sldId id="280" r:id="rId13"/>
     <p:sldId id="284" r:id="rId14"/>
     <p:sldId id="285" r:id="rId15"/>
+    <p:sldId id="286" r:id="rId16"/>
+    <p:sldId id="287" r:id="rId17"/>
   </p:sldIdLst>
   <p:sldSz cx="12188825" cy="6858000"/>
   <p:notesSz cx="6858000" cy="9144000"/>
@@ -6923,6 +6925,4451 @@
 </p:sld>
 </file>
 
+<file path=ppt/slides/slide12.xml><?xml version="1.0" encoding="utf-8"?>
+<p:sld xmlns:a="http://schemas.openxmlformats.org/drawingml/2006/main" xmlns:r="http://schemas.openxmlformats.org/officeDocument/2006/relationships" xmlns:p="http://schemas.openxmlformats.org/presentationml/2006/main">
+  <p:cSld>
+    <p:spTree>
+      <p:nvGrpSpPr>
+        <p:cNvPr id="1" name=""/>
+        <p:cNvGrpSpPr/>
+        <p:nvPr/>
+      </p:nvGrpSpPr>
+      <p:grpSpPr>
+        <a:xfrm>
+          <a:off x="0" y="0"/>
+          <a:ext cx="0" cy="0"/>
+          <a:chOff x="0" y="0"/>
+          <a:chExt cx="0" cy="0"/>
+        </a:xfrm>
+      </p:grpSpPr>
+      <p:graphicFrame>
+        <p:nvGraphicFramePr>
+          <p:cNvPr id="2" name="Таблица 1">
+            <a:extLst>
+              <a:ext uri="{FF2B5EF4-FFF2-40B4-BE49-F238E27FC236}">
+                <a16:creationId xmlns:a16="http://schemas.microsoft.com/office/drawing/2014/main" id="{71111B5F-91CE-4E36-893A-074DD099E0FA}"/>
+              </a:ext>
+            </a:extLst>
+          </p:cNvPr>
+          <p:cNvGraphicFramePr>
+            <a:graphicFrameLocks noGrp="1"/>
+          </p:cNvGraphicFramePr>
+          <p:nvPr>
+            <p:extLst>
+              <p:ext uri="{D42A27DB-BD31-4B8C-83A1-F6EECF244321}">
+                <p14:modId xmlns:p14="http://schemas.microsoft.com/office/powerpoint/2010/main" val="1663725612"/>
+              </p:ext>
+            </p:extLst>
+          </p:nvPr>
+        </p:nvGraphicFramePr>
+        <p:xfrm>
+          <a:off x="1845940" y="708478"/>
+          <a:ext cx="8125884" cy="914400"/>
+        </p:xfrm>
+        <a:graphic>
+          <a:graphicData uri="http://schemas.openxmlformats.org/drawingml/2006/table">
+            <a:tbl>
+              <a:tblPr bandRow="1">
+                <a:tableStyleId>{5C22544A-7EE6-4342-B048-85BDC9FD1C3A}</a:tableStyleId>
+              </a:tblPr>
+              <a:tblGrid>
+                <a:gridCol w="4062942">
+                  <a:extLst>
+                    <a:ext uri="{9D8B030D-6E8A-4147-A177-3AD203B41FA5}">
+                      <a16:colId xmlns:a16="http://schemas.microsoft.com/office/drawing/2014/main" val="2666315481"/>
+                    </a:ext>
+                  </a:extLst>
+                </a:gridCol>
+                <a:gridCol w="4062942">
+                  <a:extLst>
+                    <a:ext uri="{9D8B030D-6E8A-4147-A177-3AD203B41FA5}">
+                      <a16:colId xmlns:a16="http://schemas.microsoft.com/office/drawing/2014/main" val="1361916106"/>
+                    </a:ext>
+                  </a:extLst>
+                </a:gridCol>
+              </a:tblGrid>
+              <a:tr h="895487">
+                <a:tc>
+                  <a:txBody>
+                    <a:bodyPr/>
+                    <a:lstStyle/>
+                    <a:p>
+                      <a:pPr algn="ctr"/>
+                      <a:r>
+                        <a:rPr lang="ru-RU" sz="1800" dirty="0"/>
+                        <a:t>Добавление результатов других моделей для получения более определённых выводов</a:t>
+                      </a:r>
+                    </a:p>
+                  </a:txBody>
+                  <a:tcPr anchor="ctr"/>
+                </a:tc>
+                <a:tc>
+                  <a:txBody>
+                    <a:bodyPr/>
+                    <a:lstStyle/>
+                    <a:p>
+                      <a:pPr algn="ctr"/>
+                      <a:r>
+                        <a:rPr lang="en-US" dirty="0"/>
+                        <a:t>17.05.19 – 30.05.19</a:t>
+                      </a:r>
+                      <a:endParaRPr lang="ru-RU" dirty="0"/>
+                    </a:p>
+                  </a:txBody>
+                  <a:tcPr anchor="ctr"/>
+                </a:tc>
+                <a:extLst>
+                  <a:ext uri="{0D108BD9-81ED-4DB2-BD59-A6C34878D82A}">
+                    <a16:rowId xmlns:a16="http://schemas.microsoft.com/office/drawing/2014/main" val="1479445529"/>
+                  </a:ext>
+                </a:extLst>
+              </a:tr>
+            </a:tbl>
+          </a:graphicData>
+        </a:graphic>
+      </p:graphicFrame>
+      <p:sp>
+        <p:nvSpPr>
+          <p:cNvPr id="4" name="Прямоугольник 3">
+            <a:extLst>
+              <a:ext uri="{FF2B5EF4-FFF2-40B4-BE49-F238E27FC236}">
+                <a16:creationId xmlns:a16="http://schemas.microsoft.com/office/drawing/2014/main" id="{408A0652-FC88-4263-934E-A9DF628F8029}"/>
+              </a:ext>
+            </a:extLst>
+          </p:cNvPr>
+          <p:cNvSpPr/>
+          <p:nvPr/>
+        </p:nvSpPr>
+        <p:spPr>
+          <a:xfrm>
+            <a:off x="1053852" y="2001497"/>
+            <a:ext cx="10225136" cy="1643527"/>
+          </a:xfrm>
+          <a:prstGeom prst="rect">
+            <a:avLst/>
+          </a:prstGeom>
+        </p:spPr>
+        <p:txBody>
+          <a:bodyPr wrap="square">
+            <a:spAutoFit/>
+          </a:bodyPr>
+          <a:lstStyle/>
+          <a:p>
+            <a:pPr lvl="0">
+              <a:lnSpc>
+                <a:spcPct val="90000"/>
+              </a:lnSpc>
+              <a:buClr>
+                <a:srgbClr val="009999"/>
+              </a:buClr>
+              <a:buSzPct val="100000"/>
+            </a:pPr>
+            <a:r>
+              <a:rPr lang="ru-RU" sz="2800" spc="200" dirty="0">
+                <a:solidFill>
+                  <a:srgbClr val="009999"/>
+                </a:solidFill>
+              </a:rPr>
+              <a:t>Цель:</a:t>
+            </a:r>
+          </a:p>
+          <a:p>
+            <a:pPr marL="514350" lvl="0" indent="-514350">
+              <a:lnSpc>
+                <a:spcPct val="90000"/>
+              </a:lnSpc>
+              <a:buClr>
+                <a:srgbClr val="009999"/>
+              </a:buClr>
+              <a:buSzPct val="100000"/>
+              <a:buFont typeface="+mj-lt"/>
+              <a:buAutoNum type="arabicPeriod"/>
+            </a:pPr>
+            <a:r>
+              <a:rPr lang="ru-RU" sz="2800" spc="200" dirty="0">
+                <a:solidFill>
+                  <a:srgbClr val="009999"/>
+                </a:solidFill>
+              </a:rPr>
+              <a:t>Добавить новые модели;</a:t>
+            </a:r>
+          </a:p>
+          <a:p>
+            <a:pPr marL="514350" lvl="0" indent="-514350">
+              <a:lnSpc>
+                <a:spcPct val="90000"/>
+              </a:lnSpc>
+              <a:buClr>
+                <a:srgbClr val="009999"/>
+              </a:buClr>
+              <a:buSzPct val="100000"/>
+              <a:buFont typeface="+mj-lt"/>
+              <a:buAutoNum type="arabicPeriod"/>
+            </a:pPr>
+            <a:r>
+              <a:rPr lang="ru-RU" sz="2800" spc="200" dirty="0">
+                <a:solidFill>
+                  <a:srgbClr val="009999"/>
+                </a:solidFill>
+              </a:rPr>
+              <a:t>Подтвердить или опровергнуть изначальную гипотезу.</a:t>
+            </a:r>
+          </a:p>
+        </p:txBody>
+      </p:sp>
+      <p:sp>
+        <p:nvSpPr>
+          <p:cNvPr id="5" name="TextBox 4">
+            <a:extLst>
+              <a:ext uri="{FF2B5EF4-FFF2-40B4-BE49-F238E27FC236}">
+                <a16:creationId xmlns:a16="http://schemas.microsoft.com/office/drawing/2014/main" id="{BCCB8F21-5D34-42D4-BF84-4B361A4DDB8F}"/>
+              </a:ext>
+            </a:extLst>
+          </p:cNvPr>
+          <p:cNvSpPr txBox="1"/>
+          <p:nvPr/>
+        </p:nvSpPr>
+        <p:spPr>
+          <a:xfrm>
+            <a:off x="10126860" y="2685528"/>
+            <a:ext cx="453970" cy="523220"/>
+          </a:xfrm>
+          <a:prstGeom prst="rect">
+            <a:avLst/>
+          </a:prstGeom>
+          <a:noFill/>
+        </p:spPr>
+        <p:txBody>
+          <a:bodyPr wrap="none" rtlCol="0">
+            <a:spAutoFit/>
+          </a:bodyPr>
+          <a:lstStyle/>
+          <a:p>
+            <a:r>
+              <a:rPr lang="ru-RU" sz="2800" dirty="0">
+                <a:solidFill>
+                  <a:srgbClr val="00B050"/>
+                </a:solidFill>
+              </a:rPr>
+              <a:t>✓</a:t>
+            </a:r>
+            <a:endParaRPr lang="ru-RU" sz="2800" dirty="0"/>
+          </a:p>
+        </p:txBody>
+      </p:sp>
+      <p:sp>
+        <p:nvSpPr>
+          <p:cNvPr id="6" name="TextBox 5">
+            <a:extLst>
+              <a:ext uri="{FF2B5EF4-FFF2-40B4-BE49-F238E27FC236}">
+                <a16:creationId xmlns:a16="http://schemas.microsoft.com/office/drawing/2014/main" id="{6B68D98A-F66A-4615-B001-AB9530ACF2E5}"/>
+              </a:ext>
+            </a:extLst>
+          </p:cNvPr>
+          <p:cNvSpPr txBox="1"/>
+          <p:nvPr/>
+        </p:nvSpPr>
+        <p:spPr>
+          <a:xfrm>
+            <a:off x="10126860" y="2289529"/>
+            <a:ext cx="453970" cy="523220"/>
+          </a:xfrm>
+          <a:prstGeom prst="rect">
+            <a:avLst/>
+          </a:prstGeom>
+          <a:noFill/>
+        </p:spPr>
+        <p:txBody>
+          <a:bodyPr wrap="square" rtlCol="0">
+            <a:spAutoFit/>
+          </a:bodyPr>
+          <a:lstStyle/>
+          <a:p>
+            <a:r>
+              <a:rPr lang="ru-RU" sz="2800" dirty="0">
+                <a:solidFill>
+                  <a:srgbClr val="00B050"/>
+                </a:solidFill>
+              </a:rPr>
+              <a:t>✓</a:t>
+            </a:r>
+            <a:endParaRPr lang="ru-RU" sz="2800" dirty="0"/>
+          </a:p>
+        </p:txBody>
+      </p:sp>
+      <p:sp>
+        <p:nvSpPr>
+          <p:cNvPr id="7" name="Прямоугольник 6">
+            <a:extLst>
+              <a:ext uri="{FF2B5EF4-FFF2-40B4-BE49-F238E27FC236}">
+                <a16:creationId xmlns:a16="http://schemas.microsoft.com/office/drawing/2014/main" id="{258CC277-C6B3-4C4C-8386-CD6AF06D6F28}"/>
+              </a:ext>
+            </a:extLst>
+          </p:cNvPr>
+          <p:cNvSpPr/>
+          <p:nvPr/>
+        </p:nvSpPr>
+        <p:spPr>
+          <a:xfrm>
+            <a:off x="1053852" y="4077072"/>
+            <a:ext cx="10225136" cy="867930"/>
+          </a:xfrm>
+          <a:prstGeom prst="rect">
+            <a:avLst/>
+          </a:prstGeom>
+        </p:spPr>
+        <p:txBody>
+          <a:bodyPr wrap="square">
+            <a:spAutoFit/>
+          </a:bodyPr>
+          <a:lstStyle/>
+          <a:p>
+            <a:pPr lvl="0">
+              <a:lnSpc>
+                <a:spcPct val="90000"/>
+              </a:lnSpc>
+              <a:buClr>
+                <a:srgbClr val="009999"/>
+              </a:buClr>
+              <a:buSzPct val="100000"/>
+            </a:pPr>
+            <a:r>
+              <a:rPr lang="ru-RU" sz="2800" spc="200" dirty="0">
+                <a:solidFill>
+                  <a:srgbClr val="009999"/>
+                </a:solidFill>
+              </a:rPr>
+              <a:t>Результат:</a:t>
+            </a:r>
+          </a:p>
+          <a:p>
+            <a:pPr lvl="0">
+              <a:lnSpc>
+                <a:spcPct val="90000"/>
+              </a:lnSpc>
+              <a:buClr>
+                <a:srgbClr val="009999"/>
+              </a:buClr>
+              <a:buSzPct val="100000"/>
+            </a:pPr>
+            <a:r>
+              <a:rPr lang="ru-RU" sz="2800" spc="200" dirty="0">
+                <a:solidFill>
+                  <a:srgbClr val="009999"/>
+                </a:solidFill>
+              </a:rPr>
+              <a:t>На следующем слайде.</a:t>
+            </a:r>
+          </a:p>
+        </p:txBody>
+      </p:sp>
+    </p:spTree>
+    <p:extLst>
+      <p:ext uri="{BB962C8B-B14F-4D97-AF65-F5344CB8AC3E}">
+        <p14:creationId xmlns:p14="http://schemas.microsoft.com/office/powerpoint/2010/main" val="3565547141"/>
+      </p:ext>
+    </p:extLst>
+  </p:cSld>
+  <p:clrMapOvr>
+    <a:masterClrMapping/>
+  </p:clrMapOvr>
+  <mc:AlternateContent xmlns:mc="http://schemas.openxmlformats.org/markup-compatibility/2006" xmlns:p14="http://schemas.microsoft.com/office/powerpoint/2010/main">
+    <mc:Choice Requires="p14">
+      <p:transition spd="med" p14:dur="700">
+        <p:fade/>
+      </p:transition>
+    </mc:Choice>
+    <mc:Fallback xmlns="">
+      <p:transition spd="med">
+        <p:fade/>
+      </p:transition>
+    </mc:Fallback>
+  </mc:AlternateContent>
+</p:sld>
+</file>
+
+<file path=ppt/slides/slide13.xml><?xml version="1.0" encoding="utf-8"?>
+<p:sld xmlns:a="http://schemas.openxmlformats.org/drawingml/2006/main" xmlns:r="http://schemas.openxmlformats.org/officeDocument/2006/relationships" xmlns:p="http://schemas.openxmlformats.org/presentationml/2006/main">
+  <p:cSld>
+    <p:spTree>
+      <p:nvGrpSpPr>
+        <p:cNvPr id="1" name=""/>
+        <p:cNvGrpSpPr/>
+        <p:nvPr/>
+      </p:nvGrpSpPr>
+      <p:grpSpPr>
+        <a:xfrm>
+          <a:off x="0" y="0"/>
+          <a:ext cx="0" cy="0"/>
+          <a:chOff x="0" y="0"/>
+          <a:chExt cx="0" cy="0"/>
+        </a:xfrm>
+      </p:grpSpPr>
+      <p:graphicFrame>
+        <p:nvGraphicFramePr>
+          <p:cNvPr id="6" name="Таблица 5">
+            <a:extLst>
+              <a:ext uri="{FF2B5EF4-FFF2-40B4-BE49-F238E27FC236}">
+                <a16:creationId xmlns:a16="http://schemas.microsoft.com/office/drawing/2014/main" id="{B7C34B5A-940C-4DCF-BDB6-B2163FE534B2}"/>
+              </a:ext>
+            </a:extLst>
+          </p:cNvPr>
+          <p:cNvGraphicFramePr>
+            <a:graphicFrameLocks noGrp="1"/>
+          </p:cNvGraphicFramePr>
+          <p:nvPr>
+            <p:extLst>
+              <p:ext uri="{D42A27DB-BD31-4B8C-83A1-F6EECF244321}">
+                <p14:modId xmlns:p14="http://schemas.microsoft.com/office/powerpoint/2010/main" val="570875171"/>
+              </p:ext>
+            </p:extLst>
+          </p:nvPr>
+        </p:nvGraphicFramePr>
+        <p:xfrm>
+          <a:off x="1768178" y="85935"/>
+          <a:ext cx="8652469" cy="6686130"/>
+        </p:xfrm>
+        <a:graphic>
+          <a:graphicData uri="http://schemas.openxmlformats.org/drawingml/2006/table">
+            <a:tbl>
+              <a:tblPr>
+                <a:tableStyleId>{5C22544A-7EE6-4342-B048-85BDC9FD1C3A}</a:tableStyleId>
+              </a:tblPr>
+              <a:tblGrid>
+                <a:gridCol w="1841812">
+                  <a:extLst>
+                    <a:ext uri="{9D8B030D-6E8A-4147-A177-3AD203B41FA5}">
+                      <a16:colId xmlns:a16="http://schemas.microsoft.com/office/drawing/2014/main" val="3540014845"/>
+                    </a:ext>
+                  </a:extLst>
+                </a:gridCol>
+                <a:gridCol w="1072703">
+                  <a:extLst>
+                    <a:ext uri="{9D8B030D-6E8A-4147-A177-3AD203B41FA5}">
+                      <a16:colId xmlns:a16="http://schemas.microsoft.com/office/drawing/2014/main" val="3736071382"/>
+                    </a:ext>
+                  </a:extLst>
+                </a:gridCol>
+                <a:gridCol w="1381360">
+                  <a:extLst>
+                    <a:ext uri="{9D8B030D-6E8A-4147-A177-3AD203B41FA5}">
+                      <a16:colId xmlns:a16="http://schemas.microsoft.com/office/drawing/2014/main" val="1666806214"/>
+                    </a:ext>
+                  </a:extLst>
+                </a:gridCol>
+                <a:gridCol w="1457257">
+                  <a:extLst>
+                    <a:ext uri="{9D8B030D-6E8A-4147-A177-3AD203B41FA5}">
+                      <a16:colId xmlns:a16="http://schemas.microsoft.com/office/drawing/2014/main" val="2279894458"/>
+                    </a:ext>
+                  </a:extLst>
+                </a:gridCol>
+                <a:gridCol w="1113184">
+                  <a:extLst>
+                    <a:ext uri="{9D8B030D-6E8A-4147-A177-3AD203B41FA5}">
+                      <a16:colId xmlns:a16="http://schemas.microsoft.com/office/drawing/2014/main" val="3524017142"/>
+                    </a:ext>
+                  </a:extLst>
+                </a:gridCol>
+                <a:gridCol w="774168">
+                  <a:extLst>
+                    <a:ext uri="{9D8B030D-6E8A-4147-A177-3AD203B41FA5}">
+                      <a16:colId xmlns:a16="http://schemas.microsoft.com/office/drawing/2014/main" val="1822794971"/>
+                    </a:ext>
+                  </a:extLst>
+                </a:gridCol>
+                <a:gridCol w="1011985">
+                  <a:extLst>
+                    <a:ext uri="{9D8B030D-6E8A-4147-A177-3AD203B41FA5}">
+                      <a16:colId xmlns:a16="http://schemas.microsoft.com/office/drawing/2014/main" val="2371686950"/>
+                    </a:ext>
+                  </a:extLst>
+                </a:gridCol>
+              </a:tblGrid>
+              <a:tr h="303915">
+                <a:tc>
+                  <a:txBody>
+                    <a:bodyPr/>
+                    <a:lstStyle/>
+                    <a:p>
+                      <a:pPr algn="ctr" fontAlgn="t"/>
+                      <a:r>
+                        <a:rPr lang="ru-RU" sz="1700" u="none" strike="noStrike" dirty="0">
+                          <a:effectLst/>
+                        </a:rPr>
+                        <a:t>Название модели</a:t>
+                      </a:r>
+                      <a:endParaRPr lang="en-US" sz="1700" b="1" i="0" u="none" strike="noStrike" dirty="0">
+                        <a:solidFill>
+                          <a:srgbClr val="000000"/>
+                        </a:solidFill>
+                        <a:effectLst/>
+                        <a:latin typeface="Calibri" panose="020F0502020204030204" pitchFamily="34" charset="0"/>
+                      </a:endParaRPr>
+                    </a:p>
+                  </a:txBody>
+                  <a:tcPr marL="15195" marR="15195" marT="15195" marB="0" anchor="ctr"/>
+                </a:tc>
+                <a:tc>
+                  <a:txBody>
+                    <a:bodyPr/>
+                    <a:lstStyle/>
+                    <a:p>
+                      <a:pPr algn="ctr" fontAlgn="t"/>
+                      <a:r>
+                        <a:rPr lang="ru-RU" sz="1700" u="none" strike="noStrike" dirty="0">
+                          <a:effectLst/>
+                        </a:rPr>
+                        <a:t>Масштаб</a:t>
+                      </a:r>
+                      <a:endParaRPr lang="en-US" sz="1700" b="1" i="0" u="none" strike="noStrike" dirty="0">
+                        <a:solidFill>
+                          <a:srgbClr val="000000"/>
+                        </a:solidFill>
+                        <a:effectLst/>
+                        <a:latin typeface="Calibri" panose="020F0502020204030204" pitchFamily="34" charset="0"/>
+                      </a:endParaRPr>
+                    </a:p>
+                  </a:txBody>
+                  <a:tcPr marL="15195" marR="15195" marT="15195" marB="0" anchor="ctr"/>
+                </a:tc>
+                <a:tc>
+                  <a:txBody>
+                    <a:bodyPr/>
+                    <a:lstStyle/>
+                    <a:p>
+                      <a:pPr algn="ctr" fontAlgn="t"/>
+                      <a:r>
+                        <a:rPr lang="en-US" sz="1700" b="0" i="0" u="none" strike="noStrike" dirty="0">
+                          <a:solidFill>
+                            <a:srgbClr val="000000"/>
+                          </a:solidFill>
+                          <a:effectLst/>
+                          <a:latin typeface="Calibri" panose="020F0502020204030204" pitchFamily="34" charset="0"/>
+                        </a:rPr>
+                        <a:t>Accuracy</a:t>
+                      </a:r>
+                    </a:p>
+                  </a:txBody>
+                  <a:tcPr marL="15195" marR="15195" marT="15195" marB="0" anchor="ctr"/>
+                </a:tc>
+                <a:tc>
+                  <a:txBody>
+                    <a:bodyPr/>
+                    <a:lstStyle/>
+                    <a:p>
+                      <a:pPr algn="ctr" fontAlgn="t"/>
+                      <a:r>
+                        <a:rPr lang="ru-RU" sz="1700" b="0" i="0" u="none" strike="noStrike" dirty="0">
+                          <a:solidFill>
+                            <a:srgbClr val="000000"/>
+                          </a:solidFill>
+                          <a:effectLst/>
+                          <a:latin typeface="Calibri" panose="020F0502020204030204" pitchFamily="34" charset="0"/>
+                        </a:rPr>
+                        <a:t>Точность</a:t>
+                      </a:r>
+                      <a:endParaRPr lang="en-US" sz="1700" b="0" i="0" u="none" strike="noStrike" dirty="0">
+                        <a:solidFill>
+                          <a:srgbClr val="000000"/>
+                        </a:solidFill>
+                        <a:effectLst/>
+                        <a:latin typeface="Calibri" panose="020F0502020204030204" pitchFamily="34" charset="0"/>
+                      </a:endParaRPr>
+                    </a:p>
+                  </a:txBody>
+                  <a:tcPr marL="15195" marR="15195" marT="15195" marB="0" anchor="ctr"/>
+                </a:tc>
+                <a:tc>
+                  <a:txBody>
+                    <a:bodyPr/>
+                    <a:lstStyle/>
+                    <a:p>
+                      <a:pPr algn="ctr" fontAlgn="t"/>
+                      <a:r>
+                        <a:rPr lang="ru-RU" sz="1700" u="none" strike="noStrike" dirty="0">
+                          <a:effectLst/>
+                        </a:rPr>
+                        <a:t>Полнота</a:t>
+                      </a:r>
+                      <a:endParaRPr lang="en-US" sz="1700" b="1" i="0" u="none" strike="noStrike" dirty="0">
+                        <a:solidFill>
+                          <a:srgbClr val="000000"/>
+                        </a:solidFill>
+                        <a:effectLst/>
+                        <a:latin typeface="Calibri" panose="020F0502020204030204" pitchFamily="34" charset="0"/>
+                      </a:endParaRPr>
+                    </a:p>
+                  </a:txBody>
+                  <a:tcPr marL="15195" marR="15195" marT="15195" marB="0" anchor="ctr"/>
+                </a:tc>
+                <a:tc>
+                  <a:txBody>
+                    <a:bodyPr/>
+                    <a:lstStyle/>
+                    <a:p>
+                      <a:pPr algn="ctr" fontAlgn="t"/>
+                      <a:r>
+                        <a:rPr lang="en-US" sz="1700" b="0" i="0" u="none" strike="noStrike" dirty="0">
+                          <a:solidFill>
+                            <a:srgbClr val="000000"/>
+                          </a:solidFill>
+                          <a:effectLst/>
+                          <a:latin typeface="Calibri" panose="020F0502020204030204" pitchFamily="34" charset="0"/>
+                        </a:rPr>
+                        <a:t>F1</a:t>
+                      </a:r>
+                    </a:p>
+                  </a:txBody>
+                  <a:tcPr marL="15195" marR="15195" marT="15195" marB="0" anchor="ctr"/>
+                </a:tc>
+                <a:tc>
+                  <a:txBody>
+                    <a:bodyPr/>
+                    <a:lstStyle/>
+                    <a:p>
+                      <a:pPr algn="ctr" fontAlgn="t"/>
+                      <a:r>
+                        <a:rPr lang="ru-RU" sz="1700" b="1" u="none" strike="noStrike" dirty="0">
+                          <a:effectLst/>
+                        </a:rPr>
+                        <a:t>Ранг</a:t>
+                      </a:r>
+                      <a:endParaRPr lang="en-US" sz="1700" b="1" i="0" u="none" strike="noStrike" dirty="0">
+                        <a:solidFill>
+                          <a:srgbClr val="000000"/>
+                        </a:solidFill>
+                        <a:effectLst/>
+                        <a:latin typeface="Calibri" panose="020F0502020204030204" pitchFamily="34" charset="0"/>
+                      </a:endParaRPr>
+                    </a:p>
+                  </a:txBody>
+                  <a:tcPr marL="15195" marR="15195" marT="15195" marB="0" anchor="ctr"/>
+                </a:tc>
+                <a:extLst>
+                  <a:ext uri="{0D108BD9-81ED-4DB2-BD59-A6C34878D82A}">
+                    <a16:rowId xmlns:a16="http://schemas.microsoft.com/office/drawing/2014/main" val="220470264"/>
+                  </a:ext>
+                </a:extLst>
+              </a:tr>
+              <a:tr h="303915">
+                <a:tc>
+                  <a:txBody>
+                    <a:bodyPr/>
+                    <a:lstStyle/>
+                    <a:p>
+                      <a:pPr algn="ctr" fontAlgn="b"/>
+                      <a:r>
+                        <a:rPr lang="en-US" sz="1700" u="none" strike="noStrike" dirty="0">
+                          <a:effectLst/>
+                        </a:rPr>
+                        <a:t>DCSCN</a:t>
+                      </a:r>
+                      <a:endParaRPr lang="en-US" sz="1700" b="0" i="0" u="none" strike="noStrike" dirty="0">
+                        <a:solidFill>
+                          <a:srgbClr val="000000"/>
+                        </a:solidFill>
+                        <a:effectLst/>
+                        <a:latin typeface="Calibri" panose="020F0502020204030204" pitchFamily="34" charset="0"/>
+                      </a:endParaRPr>
+                    </a:p>
+                  </a:txBody>
+                  <a:tcPr marL="15195" marR="15195" marT="15195" marB="0" anchor="ctr"/>
+                </a:tc>
+                <a:tc>
+                  <a:txBody>
+                    <a:bodyPr/>
+                    <a:lstStyle/>
+                    <a:p>
+                      <a:pPr algn="ctr" fontAlgn="b"/>
+                      <a:r>
+                        <a:rPr lang="ru-RU" sz="1700" u="none" strike="noStrike" dirty="0">
+                          <a:effectLst/>
+                        </a:rPr>
+                        <a:t>2</a:t>
+                      </a:r>
+                      <a:endParaRPr lang="ru-RU" sz="1700" b="0" i="0" u="none" strike="noStrike" dirty="0">
+                        <a:solidFill>
+                          <a:srgbClr val="000000"/>
+                        </a:solidFill>
+                        <a:effectLst/>
+                        <a:latin typeface="Calibri" panose="020F0502020204030204" pitchFamily="34" charset="0"/>
+                      </a:endParaRPr>
+                    </a:p>
+                  </a:txBody>
+                  <a:tcPr marL="15195" marR="15195" marT="15195" marB="0" anchor="ctr"/>
+                </a:tc>
+                <a:tc>
+                  <a:txBody>
+                    <a:bodyPr/>
+                    <a:lstStyle/>
+                    <a:p>
+                      <a:pPr algn="ctr" fontAlgn="b"/>
+                      <a:r>
+                        <a:rPr lang="ru-RU" sz="1700" u="none" strike="noStrike" dirty="0">
+                          <a:solidFill>
+                            <a:srgbClr val="00B050"/>
+                          </a:solidFill>
+                          <a:effectLst/>
+                        </a:rPr>
+                        <a:t>73,98</a:t>
+                      </a:r>
+                      <a:endParaRPr lang="ru-RU" sz="1700" b="0" i="0" u="none" strike="noStrike" dirty="0">
+                        <a:solidFill>
+                          <a:srgbClr val="00B050"/>
+                        </a:solidFill>
+                        <a:effectLst/>
+                        <a:latin typeface="Calibri" panose="020F0502020204030204" pitchFamily="34" charset="0"/>
+                      </a:endParaRPr>
+                    </a:p>
+                  </a:txBody>
+                  <a:tcPr marL="15195" marR="15195" marT="15195" marB="0" anchor="ctr"/>
+                </a:tc>
+                <a:tc>
+                  <a:txBody>
+                    <a:bodyPr/>
+                    <a:lstStyle/>
+                    <a:p>
+                      <a:pPr algn="ctr" fontAlgn="b"/>
+                      <a:r>
+                        <a:rPr lang="ru-RU" sz="1700" u="none" strike="noStrike" dirty="0">
+                          <a:solidFill>
+                            <a:srgbClr val="FF0000"/>
+                          </a:solidFill>
+                          <a:effectLst/>
+                        </a:rPr>
+                        <a:t>70,12</a:t>
+                      </a:r>
+                      <a:endParaRPr lang="ru-RU" sz="1700" b="0" i="0" u="none" strike="noStrike" dirty="0">
+                        <a:solidFill>
+                          <a:srgbClr val="FF0000"/>
+                        </a:solidFill>
+                        <a:effectLst/>
+                        <a:latin typeface="Calibri" panose="020F0502020204030204" pitchFamily="34" charset="0"/>
+                      </a:endParaRPr>
+                    </a:p>
+                  </a:txBody>
+                  <a:tcPr marL="15195" marR="15195" marT="15195" marB="0" anchor="ctr"/>
+                </a:tc>
+                <a:tc>
+                  <a:txBody>
+                    <a:bodyPr/>
+                    <a:lstStyle/>
+                    <a:p>
+                      <a:pPr algn="ctr" fontAlgn="b"/>
+                      <a:r>
+                        <a:rPr lang="ru-RU" sz="1700" u="none" strike="noStrike" dirty="0">
+                          <a:solidFill>
+                            <a:srgbClr val="00B050"/>
+                          </a:solidFill>
+                          <a:effectLst/>
+                        </a:rPr>
+                        <a:t>83,57</a:t>
+                      </a:r>
+                      <a:endParaRPr lang="ru-RU" sz="1700" b="0" i="0" u="none" strike="noStrike" dirty="0">
+                        <a:solidFill>
+                          <a:srgbClr val="00B050"/>
+                        </a:solidFill>
+                        <a:effectLst/>
+                        <a:latin typeface="Calibri" panose="020F0502020204030204" pitchFamily="34" charset="0"/>
+                      </a:endParaRPr>
+                    </a:p>
+                  </a:txBody>
+                  <a:tcPr marL="15195" marR="15195" marT="15195" marB="0" anchor="ctr"/>
+                </a:tc>
+                <a:tc>
+                  <a:txBody>
+                    <a:bodyPr/>
+                    <a:lstStyle/>
+                    <a:p>
+                      <a:pPr algn="ctr" fontAlgn="b"/>
+                      <a:r>
+                        <a:rPr lang="ru-RU" sz="1700" u="none" strike="noStrike" dirty="0">
+                          <a:solidFill>
+                            <a:srgbClr val="00B050"/>
+                          </a:solidFill>
+                          <a:effectLst/>
+                        </a:rPr>
+                        <a:t>76,26</a:t>
+                      </a:r>
+                      <a:endParaRPr lang="ru-RU" sz="1700" b="0" i="0" u="none" strike="noStrike" dirty="0">
+                        <a:solidFill>
+                          <a:srgbClr val="00B050"/>
+                        </a:solidFill>
+                        <a:effectLst/>
+                        <a:latin typeface="Calibri" panose="020F0502020204030204" pitchFamily="34" charset="0"/>
+                      </a:endParaRPr>
+                    </a:p>
+                  </a:txBody>
+                  <a:tcPr marL="15195" marR="15195" marT="15195" marB="0" anchor="ctr"/>
+                </a:tc>
+                <a:tc>
+                  <a:txBody>
+                    <a:bodyPr/>
+                    <a:lstStyle/>
+                    <a:p>
+                      <a:pPr algn="ctr" fontAlgn="b"/>
+                      <a:r>
+                        <a:rPr lang="ru-RU" sz="1700" u="none" strike="noStrike" dirty="0">
+                          <a:effectLst/>
+                        </a:rPr>
+                        <a:t>49</a:t>
+                      </a:r>
+                      <a:endParaRPr lang="ru-RU" sz="1700" b="0" i="0" u="none" strike="noStrike" dirty="0">
+                        <a:solidFill>
+                          <a:srgbClr val="000000"/>
+                        </a:solidFill>
+                        <a:effectLst/>
+                        <a:latin typeface="Calibri" panose="020F0502020204030204" pitchFamily="34" charset="0"/>
+                      </a:endParaRPr>
+                    </a:p>
+                  </a:txBody>
+                  <a:tcPr marL="15195" marR="15195" marT="15195" marB="0" anchor="ctr"/>
+                </a:tc>
+                <a:extLst>
+                  <a:ext uri="{0D108BD9-81ED-4DB2-BD59-A6C34878D82A}">
+                    <a16:rowId xmlns:a16="http://schemas.microsoft.com/office/drawing/2014/main" val="2417359562"/>
+                  </a:ext>
+                </a:extLst>
+              </a:tr>
+              <a:tr h="303915">
+                <a:tc>
+                  <a:txBody>
+                    <a:bodyPr/>
+                    <a:lstStyle/>
+                    <a:p>
+                      <a:pPr algn="ctr" fontAlgn="b"/>
+                      <a:r>
+                        <a:rPr lang="en-US" sz="1700" u="none" strike="noStrike" dirty="0">
+                          <a:effectLst/>
+                        </a:rPr>
+                        <a:t>MDSR</a:t>
+                      </a:r>
+                      <a:endParaRPr lang="en-US" sz="1700" b="0" i="0" u="none" strike="noStrike" dirty="0">
+                        <a:solidFill>
+                          <a:srgbClr val="000000"/>
+                        </a:solidFill>
+                        <a:effectLst/>
+                        <a:latin typeface="Calibri" panose="020F0502020204030204" pitchFamily="34" charset="0"/>
+                      </a:endParaRPr>
+                    </a:p>
+                  </a:txBody>
+                  <a:tcPr marL="15195" marR="15195" marT="15195" marB="0" anchor="ctr"/>
+                </a:tc>
+                <a:tc>
+                  <a:txBody>
+                    <a:bodyPr/>
+                    <a:lstStyle/>
+                    <a:p>
+                      <a:pPr algn="ctr" fontAlgn="b"/>
+                      <a:r>
+                        <a:rPr lang="ru-RU" sz="1700" u="none" strike="noStrike" dirty="0">
+                          <a:effectLst/>
+                        </a:rPr>
+                        <a:t>2</a:t>
+                      </a:r>
+                      <a:endParaRPr lang="ru-RU" sz="1700" b="0" i="0" u="none" strike="noStrike" dirty="0">
+                        <a:solidFill>
+                          <a:srgbClr val="000000"/>
+                        </a:solidFill>
+                        <a:effectLst/>
+                        <a:latin typeface="Calibri" panose="020F0502020204030204" pitchFamily="34" charset="0"/>
+                      </a:endParaRPr>
+                    </a:p>
+                  </a:txBody>
+                  <a:tcPr marL="15195" marR="15195" marT="15195" marB="0" anchor="ctr"/>
+                </a:tc>
+                <a:tc>
+                  <a:txBody>
+                    <a:bodyPr/>
+                    <a:lstStyle/>
+                    <a:p>
+                      <a:pPr algn="ctr" fontAlgn="b"/>
+                      <a:r>
+                        <a:rPr lang="ru-RU" sz="1700" u="none" strike="noStrike" dirty="0">
+                          <a:solidFill>
+                            <a:srgbClr val="00B050"/>
+                          </a:solidFill>
+                          <a:effectLst/>
+                        </a:rPr>
+                        <a:t>74,22</a:t>
+                      </a:r>
+                      <a:endParaRPr lang="ru-RU" sz="1700" b="0" i="0" u="none" strike="noStrike" dirty="0">
+                        <a:solidFill>
+                          <a:srgbClr val="00B050"/>
+                        </a:solidFill>
+                        <a:effectLst/>
+                        <a:latin typeface="Calibri" panose="020F0502020204030204" pitchFamily="34" charset="0"/>
+                      </a:endParaRPr>
+                    </a:p>
+                  </a:txBody>
+                  <a:tcPr marL="15195" marR="15195" marT="15195" marB="0" anchor="ctr"/>
+                </a:tc>
+                <a:tc>
+                  <a:txBody>
+                    <a:bodyPr/>
+                    <a:lstStyle/>
+                    <a:p>
+                      <a:pPr algn="ctr" fontAlgn="b"/>
+                      <a:r>
+                        <a:rPr lang="ru-RU" sz="1700" u="none" strike="noStrike" dirty="0">
+                          <a:solidFill>
+                            <a:srgbClr val="FF0000"/>
+                          </a:solidFill>
+                          <a:effectLst/>
+                        </a:rPr>
+                        <a:t>70,65</a:t>
+                      </a:r>
+                      <a:endParaRPr lang="ru-RU" sz="1700" b="0" i="0" u="none" strike="noStrike" dirty="0">
+                        <a:solidFill>
+                          <a:srgbClr val="FF0000"/>
+                        </a:solidFill>
+                        <a:effectLst/>
+                        <a:latin typeface="Calibri" panose="020F0502020204030204" pitchFamily="34" charset="0"/>
+                      </a:endParaRPr>
+                    </a:p>
+                  </a:txBody>
+                  <a:tcPr marL="15195" marR="15195" marT="15195" marB="0" anchor="ctr"/>
+                </a:tc>
+                <a:tc>
+                  <a:txBody>
+                    <a:bodyPr/>
+                    <a:lstStyle/>
+                    <a:p>
+                      <a:pPr algn="ctr" fontAlgn="b"/>
+                      <a:r>
+                        <a:rPr lang="ru-RU" sz="1700" u="none" strike="noStrike" dirty="0">
+                          <a:solidFill>
+                            <a:srgbClr val="00B050"/>
+                          </a:solidFill>
+                          <a:effectLst/>
+                        </a:rPr>
+                        <a:t>82,85</a:t>
+                      </a:r>
+                      <a:endParaRPr lang="ru-RU" sz="1700" b="0" i="0" u="none" strike="noStrike" dirty="0">
+                        <a:solidFill>
+                          <a:srgbClr val="00B050"/>
+                        </a:solidFill>
+                        <a:effectLst/>
+                        <a:latin typeface="Calibri" panose="020F0502020204030204" pitchFamily="34" charset="0"/>
+                      </a:endParaRPr>
+                    </a:p>
+                  </a:txBody>
+                  <a:tcPr marL="15195" marR="15195" marT="15195" marB="0" anchor="ctr"/>
+                </a:tc>
+                <a:tc>
+                  <a:txBody>
+                    <a:bodyPr/>
+                    <a:lstStyle/>
+                    <a:p>
+                      <a:pPr algn="ctr" fontAlgn="b"/>
+                      <a:r>
+                        <a:rPr lang="ru-RU" sz="1700" u="none" strike="noStrike" dirty="0">
+                          <a:solidFill>
+                            <a:srgbClr val="00B050"/>
+                          </a:solidFill>
+                          <a:effectLst/>
+                        </a:rPr>
+                        <a:t>76,27</a:t>
+                      </a:r>
+                      <a:endParaRPr lang="ru-RU" sz="1700" b="0" i="0" u="none" strike="noStrike" dirty="0">
+                        <a:solidFill>
+                          <a:srgbClr val="00B050"/>
+                        </a:solidFill>
+                        <a:effectLst/>
+                        <a:latin typeface="Calibri" panose="020F0502020204030204" pitchFamily="34" charset="0"/>
+                      </a:endParaRPr>
+                    </a:p>
+                  </a:txBody>
+                  <a:tcPr marL="15195" marR="15195" marT="15195" marB="0" anchor="ctr"/>
+                </a:tc>
+                <a:tc>
+                  <a:txBody>
+                    <a:bodyPr/>
+                    <a:lstStyle/>
+                    <a:p>
+                      <a:pPr algn="ctr" fontAlgn="b"/>
+                      <a:r>
+                        <a:rPr lang="ru-RU" sz="1700" u="none" strike="noStrike">
+                          <a:effectLst/>
+                        </a:rPr>
+                        <a:t>49</a:t>
+                      </a:r>
+                      <a:endParaRPr lang="ru-RU" sz="1700" b="0" i="0" u="none" strike="noStrike">
+                        <a:solidFill>
+                          <a:srgbClr val="000000"/>
+                        </a:solidFill>
+                        <a:effectLst/>
+                        <a:latin typeface="Calibri" panose="020F0502020204030204" pitchFamily="34" charset="0"/>
+                      </a:endParaRPr>
+                    </a:p>
+                  </a:txBody>
+                  <a:tcPr marL="15195" marR="15195" marT="15195" marB="0" anchor="ctr"/>
+                </a:tc>
+                <a:extLst>
+                  <a:ext uri="{0D108BD9-81ED-4DB2-BD59-A6C34878D82A}">
+                    <a16:rowId xmlns:a16="http://schemas.microsoft.com/office/drawing/2014/main" val="1973099771"/>
+                  </a:ext>
+                </a:extLst>
+              </a:tr>
+              <a:tr h="303915">
+                <a:tc>
+                  <a:txBody>
+                    <a:bodyPr/>
+                    <a:lstStyle/>
+                    <a:p>
+                      <a:pPr algn="ctr" fontAlgn="b"/>
+                      <a:r>
+                        <a:rPr lang="en-US" sz="1700" u="none" strike="noStrike" dirty="0">
+                          <a:effectLst/>
+                        </a:rPr>
+                        <a:t>DBPNLL</a:t>
+                      </a:r>
+                      <a:endParaRPr lang="en-US" sz="1700" b="0" i="0" u="none" strike="noStrike" dirty="0">
+                        <a:solidFill>
+                          <a:srgbClr val="000000"/>
+                        </a:solidFill>
+                        <a:effectLst/>
+                        <a:latin typeface="Calibri" panose="020F0502020204030204" pitchFamily="34" charset="0"/>
+                      </a:endParaRPr>
+                    </a:p>
+                  </a:txBody>
+                  <a:tcPr marL="15195" marR="15195" marT="15195" marB="0" anchor="ctr"/>
+                </a:tc>
+                <a:tc>
+                  <a:txBody>
+                    <a:bodyPr/>
+                    <a:lstStyle/>
+                    <a:p>
+                      <a:pPr algn="ctr" fontAlgn="b"/>
+                      <a:r>
+                        <a:rPr lang="ru-RU" sz="1700" u="none" strike="noStrike">
+                          <a:effectLst/>
+                        </a:rPr>
+                        <a:t>4</a:t>
+                      </a:r>
+                      <a:endParaRPr lang="ru-RU" sz="1700" b="0" i="0" u="none" strike="noStrike">
+                        <a:solidFill>
+                          <a:srgbClr val="000000"/>
+                        </a:solidFill>
+                        <a:effectLst/>
+                        <a:latin typeface="Calibri" panose="020F0502020204030204" pitchFamily="34" charset="0"/>
+                      </a:endParaRPr>
+                    </a:p>
+                  </a:txBody>
+                  <a:tcPr marL="15195" marR="15195" marT="15195" marB="0" anchor="ctr"/>
+                </a:tc>
+                <a:tc>
+                  <a:txBody>
+                    <a:bodyPr/>
+                    <a:lstStyle/>
+                    <a:p>
+                      <a:pPr algn="ctr" fontAlgn="b"/>
+                      <a:r>
+                        <a:rPr lang="ru-RU" sz="1700" u="none" strike="noStrike" dirty="0">
+                          <a:solidFill>
+                            <a:srgbClr val="FF0000"/>
+                          </a:solidFill>
+                          <a:effectLst/>
+                        </a:rPr>
+                        <a:t>72,78</a:t>
+                      </a:r>
+                      <a:endParaRPr lang="ru-RU" sz="1700" b="0" i="0" u="none" strike="noStrike" dirty="0">
+                        <a:solidFill>
+                          <a:srgbClr val="FF0000"/>
+                        </a:solidFill>
+                        <a:effectLst/>
+                        <a:latin typeface="Calibri" panose="020F0502020204030204" pitchFamily="34" charset="0"/>
+                      </a:endParaRPr>
+                    </a:p>
+                  </a:txBody>
+                  <a:tcPr marL="15195" marR="15195" marT="15195" marB="0" anchor="ctr"/>
+                </a:tc>
+                <a:tc>
+                  <a:txBody>
+                    <a:bodyPr/>
+                    <a:lstStyle/>
+                    <a:p>
+                      <a:pPr algn="ctr" fontAlgn="b"/>
+                      <a:r>
+                        <a:rPr lang="ru-RU" sz="1700" u="none" strike="noStrike" dirty="0">
+                          <a:solidFill>
+                            <a:srgbClr val="FF0000"/>
+                          </a:solidFill>
+                          <a:effectLst/>
+                        </a:rPr>
+                        <a:t>68,45</a:t>
+                      </a:r>
+                      <a:endParaRPr lang="ru-RU" sz="1700" b="0" i="0" u="none" strike="noStrike" dirty="0">
+                        <a:solidFill>
+                          <a:srgbClr val="FF0000"/>
+                        </a:solidFill>
+                        <a:effectLst/>
+                        <a:latin typeface="Calibri" panose="020F0502020204030204" pitchFamily="34" charset="0"/>
+                      </a:endParaRPr>
+                    </a:p>
+                  </a:txBody>
+                  <a:tcPr marL="15195" marR="15195" marT="15195" marB="0" anchor="ctr"/>
+                </a:tc>
+                <a:tc>
+                  <a:txBody>
+                    <a:bodyPr/>
+                    <a:lstStyle/>
+                    <a:p>
+                      <a:pPr algn="ctr" fontAlgn="b"/>
+                      <a:r>
+                        <a:rPr lang="ru-RU" sz="1700" u="none" strike="noStrike" dirty="0">
+                          <a:solidFill>
+                            <a:srgbClr val="00B050"/>
+                          </a:solidFill>
+                          <a:effectLst/>
+                        </a:rPr>
+                        <a:t>84,53</a:t>
+                      </a:r>
+                      <a:endParaRPr lang="ru-RU" sz="1700" b="0" i="0" u="none" strike="noStrike" dirty="0">
+                        <a:solidFill>
+                          <a:srgbClr val="00B050"/>
+                        </a:solidFill>
+                        <a:effectLst/>
+                        <a:latin typeface="Calibri" panose="020F0502020204030204" pitchFamily="34" charset="0"/>
+                      </a:endParaRPr>
+                    </a:p>
+                  </a:txBody>
+                  <a:tcPr marL="15195" marR="15195" marT="15195" marB="0" anchor="ctr"/>
+                </a:tc>
+                <a:tc>
+                  <a:txBody>
+                    <a:bodyPr/>
+                    <a:lstStyle/>
+                    <a:p>
+                      <a:pPr algn="ctr" fontAlgn="b"/>
+                      <a:r>
+                        <a:rPr lang="ru-RU" sz="1700" u="none" strike="noStrike" dirty="0">
+                          <a:solidFill>
+                            <a:srgbClr val="00B050"/>
+                          </a:solidFill>
+                          <a:effectLst/>
+                        </a:rPr>
+                        <a:t>75,64</a:t>
+                      </a:r>
+                      <a:endParaRPr lang="ru-RU" sz="1700" b="0" i="0" u="none" strike="noStrike" dirty="0">
+                        <a:solidFill>
+                          <a:srgbClr val="00B050"/>
+                        </a:solidFill>
+                        <a:effectLst/>
+                        <a:latin typeface="Calibri" panose="020F0502020204030204" pitchFamily="34" charset="0"/>
+                      </a:endParaRPr>
+                    </a:p>
+                  </a:txBody>
+                  <a:tcPr marL="15195" marR="15195" marT="15195" marB="0" anchor="ctr"/>
+                </a:tc>
+                <a:tc>
+                  <a:txBody>
+                    <a:bodyPr/>
+                    <a:lstStyle/>
+                    <a:p>
+                      <a:pPr algn="ctr" fontAlgn="b"/>
+                      <a:r>
+                        <a:rPr lang="ru-RU" sz="1700" u="none" strike="noStrike">
+                          <a:effectLst/>
+                        </a:rPr>
+                        <a:t>46</a:t>
+                      </a:r>
+                      <a:endParaRPr lang="ru-RU" sz="1700" b="0" i="0" u="none" strike="noStrike">
+                        <a:solidFill>
+                          <a:srgbClr val="000000"/>
+                        </a:solidFill>
+                        <a:effectLst/>
+                        <a:latin typeface="Calibri" panose="020F0502020204030204" pitchFamily="34" charset="0"/>
+                      </a:endParaRPr>
+                    </a:p>
+                  </a:txBody>
+                  <a:tcPr marL="15195" marR="15195" marT="15195" marB="0" anchor="ctr"/>
+                </a:tc>
+                <a:extLst>
+                  <a:ext uri="{0D108BD9-81ED-4DB2-BD59-A6C34878D82A}">
+                    <a16:rowId xmlns:a16="http://schemas.microsoft.com/office/drawing/2014/main" val="2598587511"/>
+                  </a:ext>
+                </a:extLst>
+              </a:tr>
+              <a:tr h="303915">
+                <a:tc>
+                  <a:txBody>
+                    <a:bodyPr/>
+                    <a:lstStyle/>
+                    <a:p>
+                      <a:pPr algn="ctr" fontAlgn="b"/>
+                      <a:r>
+                        <a:rPr lang="en-US" sz="1700" i="1" u="sng" strike="noStrike" dirty="0">
+                          <a:solidFill>
+                            <a:schemeClr val="accent6"/>
+                          </a:solidFill>
+                          <a:effectLst/>
+                        </a:rPr>
+                        <a:t>No Scale</a:t>
+                      </a:r>
+                      <a:endParaRPr lang="en-US" sz="1700" b="0" i="1" u="sng" strike="noStrike" dirty="0">
+                        <a:solidFill>
+                          <a:schemeClr val="accent6"/>
+                        </a:solidFill>
+                        <a:effectLst/>
+                        <a:latin typeface="Calibri" panose="020F0502020204030204" pitchFamily="34" charset="0"/>
+                      </a:endParaRPr>
+                    </a:p>
+                  </a:txBody>
+                  <a:tcPr marL="15195" marR="15195" marT="15195" marB="0" anchor="ctr"/>
+                </a:tc>
+                <a:tc>
+                  <a:txBody>
+                    <a:bodyPr/>
+                    <a:lstStyle/>
+                    <a:p>
+                      <a:pPr algn="ctr" fontAlgn="b"/>
+                      <a:r>
+                        <a:rPr lang="ru-RU" sz="1700" u="none" strike="noStrike" dirty="0">
+                          <a:solidFill>
+                            <a:schemeClr val="accent6"/>
+                          </a:solidFill>
+                          <a:effectLst/>
+                        </a:rPr>
+                        <a:t>1</a:t>
+                      </a:r>
+                      <a:endParaRPr lang="ru-RU" sz="1700" b="0" i="0" u="none" strike="noStrike" dirty="0">
+                        <a:solidFill>
+                          <a:schemeClr val="accent6"/>
+                        </a:solidFill>
+                        <a:effectLst/>
+                        <a:latin typeface="Calibri" panose="020F0502020204030204" pitchFamily="34" charset="0"/>
+                      </a:endParaRPr>
+                    </a:p>
+                  </a:txBody>
+                  <a:tcPr marL="15195" marR="15195" marT="15195" marB="0" anchor="ctr"/>
+                </a:tc>
+                <a:tc>
+                  <a:txBody>
+                    <a:bodyPr/>
+                    <a:lstStyle/>
+                    <a:p>
+                      <a:pPr algn="ctr" fontAlgn="b"/>
+                      <a:r>
+                        <a:rPr lang="ru-RU" sz="1700" u="none" strike="noStrike" dirty="0">
+                          <a:solidFill>
+                            <a:schemeClr val="accent6"/>
+                          </a:solidFill>
+                          <a:effectLst/>
+                        </a:rPr>
+                        <a:t>73,68</a:t>
+                      </a:r>
+                      <a:endParaRPr lang="ru-RU" sz="1700" b="0" i="0" u="none" strike="noStrike" dirty="0">
+                        <a:solidFill>
+                          <a:schemeClr val="accent6"/>
+                        </a:solidFill>
+                        <a:effectLst/>
+                        <a:latin typeface="Calibri" panose="020F0502020204030204" pitchFamily="34" charset="0"/>
+                      </a:endParaRPr>
+                    </a:p>
+                  </a:txBody>
+                  <a:tcPr marL="15195" marR="15195" marT="15195" marB="0" anchor="ctr"/>
+                </a:tc>
+                <a:tc>
+                  <a:txBody>
+                    <a:bodyPr/>
+                    <a:lstStyle/>
+                    <a:p>
+                      <a:pPr algn="ctr" fontAlgn="b"/>
+                      <a:r>
+                        <a:rPr lang="ru-RU" sz="1700" u="none" strike="noStrike" dirty="0">
+                          <a:solidFill>
+                            <a:schemeClr val="accent6"/>
+                          </a:solidFill>
+                          <a:effectLst/>
+                        </a:rPr>
+                        <a:t>70,72</a:t>
+                      </a:r>
+                      <a:endParaRPr lang="ru-RU" sz="1700" b="0" i="0" u="none" strike="noStrike" dirty="0">
+                        <a:solidFill>
+                          <a:schemeClr val="accent6"/>
+                        </a:solidFill>
+                        <a:effectLst/>
+                        <a:latin typeface="Calibri" panose="020F0502020204030204" pitchFamily="34" charset="0"/>
+                      </a:endParaRPr>
+                    </a:p>
+                  </a:txBody>
+                  <a:tcPr marL="15195" marR="15195" marT="15195" marB="0" anchor="ctr"/>
+                </a:tc>
+                <a:tc>
+                  <a:txBody>
+                    <a:bodyPr/>
+                    <a:lstStyle/>
+                    <a:p>
+                      <a:pPr algn="ctr" fontAlgn="b"/>
+                      <a:r>
+                        <a:rPr lang="ru-RU" sz="1700" u="none" strike="noStrike" dirty="0">
+                          <a:solidFill>
+                            <a:schemeClr val="accent6"/>
+                          </a:solidFill>
+                          <a:effectLst/>
+                        </a:rPr>
+                        <a:t>80,82</a:t>
+                      </a:r>
+                      <a:endParaRPr lang="ru-RU" sz="1700" b="0" i="0" u="none" strike="noStrike" dirty="0">
+                        <a:solidFill>
+                          <a:schemeClr val="accent6"/>
+                        </a:solidFill>
+                        <a:effectLst/>
+                        <a:latin typeface="Calibri" panose="020F0502020204030204" pitchFamily="34" charset="0"/>
+                      </a:endParaRPr>
+                    </a:p>
+                  </a:txBody>
+                  <a:tcPr marL="15195" marR="15195" marT="15195" marB="0" anchor="ctr"/>
+                </a:tc>
+                <a:tc>
+                  <a:txBody>
+                    <a:bodyPr/>
+                    <a:lstStyle/>
+                    <a:p>
+                      <a:pPr algn="ctr" fontAlgn="b"/>
+                      <a:r>
+                        <a:rPr lang="ru-RU" sz="1700" u="none" strike="noStrike" dirty="0">
+                          <a:solidFill>
+                            <a:schemeClr val="accent6"/>
+                          </a:solidFill>
+                          <a:effectLst/>
+                        </a:rPr>
+                        <a:t>75,43</a:t>
+                      </a:r>
+                      <a:endParaRPr lang="ru-RU" sz="1700" b="0" i="0" u="none" strike="noStrike" dirty="0">
+                        <a:solidFill>
+                          <a:schemeClr val="accent6"/>
+                        </a:solidFill>
+                        <a:effectLst/>
+                        <a:latin typeface="Calibri" panose="020F0502020204030204" pitchFamily="34" charset="0"/>
+                      </a:endParaRPr>
+                    </a:p>
+                  </a:txBody>
+                  <a:tcPr marL="15195" marR="15195" marT="15195" marB="0" anchor="ctr"/>
+                </a:tc>
+                <a:tc>
+                  <a:txBody>
+                    <a:bodyPr/>
+                    <a:lstStyle/>
+                    <a:p>
+                      <a:pPr algn="ctr" fontAlgn="b"/>
+                      <a:r>
+                        <a:rPr lang="ru-RU" sz="1700" u="none" strike="noStrike" dirty="0">
+                          <a:solidFill>
+                            <a:schemeClr val="accent6"/>
+                          </a:solidFill>
+                          <a:effectLst/>
+                        </a:rPr>
+                        <a:t>41</a:t>
+                      </a:r>
+                      <a:endParaRPr lang="ru-RU" sz="1700" b="0" i="0" u="none" strike="noStrike" dirty="0">
+                        <a:solidFill>
+                          <a:schemeClr val="accent6"/>
+                        </a:solidFill>
+                        <a:effectLst/>
+                        <a:latin typeface="Calibri" panose="020F0502020204030204" pitchFamily="34" charset="0"/>
+                      </a:endParaRPr>
+                    </a:p>
+                  </a:txBody>
+                  <a:tcPr marL="15195" marR="15195" marT="15195" marB="0" anchor="ctr"/>
+                </a:tc>
+                <a:extLst>
+                  <a:ext uri="{0D108BD9-81ED-4DB2-BD59-A6C34878D82A}">
+                    <a16:rowId xmlns:a16="http://schemas.microsoft.com/office/drawing/2014/main" val="1328525654"/>
+                  </a:ext>
+                </a:extLst>
+              </a:tr>
+              <a:tr h="303915">
+                <a:tc>
+                  <a:txBody>
+                    <a:bodyPr/>
+                    <a:lstStyle/>
+                    <a:p>
+                      <a:pPr algn="ctr" fontAlgn="b"/>
+                      <a:r>
+                        <a:rPr lang="en-US" sz="1700" u="none" strike="noStrike" dirty="0">
+                          <a:effectLst/>
+                        </a:rPr>
+                        <a:t>DDSRCNN</a:t>
+                      </a:r>
+                      <a:endParaRPr lang="en-US" sz="1700" b="0" i="0" u="none" strike="noStrike" dirty="0">
+                        <a:solidFill>
+                          <a:srgbClr val="000000"/>
+                        </a:solidFill>
+                        <a:effectLst/>
+                        <a:latin typeface="Calibri" panose="020F0502020204030204" pitchFamily="34" charset="0"/>
+                      </a:endParaRPr>
+                    </a:p>
+                  </a:txBody>
+                  <a:tcPr marL="15195" marR="15195" marT="15195" marB="0" anchor="ctr"/>
+                </a:tc>
+                <a:tc>
+                  <a:txBody>
+                    <a:bodyPr/>
+                    <a:lstStyle/>
+                    <a:p>
+                      <a:pPr algn="ctr" fontAlgn="b"/>
+                      <a:r>
+                        <a:rPr lang="ru-RU" sz="1700" u="none" strike="noStrike" dirty="0">
+                          <a:effectLst/>
+                        </a:rPr>
+                        <a:t>2</a:t>
+                      </a:r>
+                      <a:endParaRPr lang="ru-RU" sz="1700" b="0" i="0" u="none" strike="noStrike" dirty="0">
+                        <a:solidFill>
+                          <a:srgbClr val="000000"/>
+                        </a:solidFill>
+                        <a:effectLst/>
+                        <a:latin typeface="Calibri" panose="020F0502020204030204" pitchFamily="34" charset="0"/>
+                      </a:endParaRPr>
+                    </a:p>
+                  </a:txBody>
+                  <a:tcPr marL="15195" marR="15195" marT="15195" marB="0" anchor="ctr"/>
+                </a:tc>
+                <a:tc>
+                  <a:txBody>
+                    <a:bodyPr/>
+                    <a:lstStyle/>
+                    <a:p>
+                      <a:pPr algn="ctr" fontAlgn="b"/>
+                      <a:r>
+                        <a:rPr lang="ru-RU" sz="1700" u="none" strike="noStrike" dirty="0">
+                          <a:solidFill>
+                            <a:srgbClr val="FF0000"/>
+                          </a:solidFill>
+                          <a:effectLst/>
+                        </a:rPr>
+                        <a:t>73,56</a:t>
+                      </a:r>
+                      <a:endParaRPr lang="ru-RU" sz="1700" b="0" i="0" u="none" strike="noStrike" dirty="0">
+                        <a:solidFill>
+                          <a:srgbClr val="FF0000"/>
+                        </a:solidFill>
+                        <a:effectLst/>
+                        <a:latin typeface="Calibri" panose="020F0502020204030204" pitchFamily="34" charset="0"/>
+                      </a:endParaRPr>
+                    </a:p>
+                  </a:txBody>
+                  <a:tcPr marL="15195" marR="15195" marT="15195" marB="0" anchor="ctr"/>
+                </a:tc>
+                <a:tc>
+                  <a:txBody>
+                    <a:bodyPr/>
+                    <a:lstStyle/>
+                    <a:p>
+                      <a:pPr algn="ctr" fontAlgn="b"/>
+                      <a:r>
+                        <a:rPr lang="ru-RU" sz="1700" u="none" strike="noStrike" dirty="0">
+                          <a:solidFill>
+                            <a:srgbClr val="FF0000"/>
+                          </a:solidFill>
+                          <a:effectLst/>
+                        </a:rPr>
+                        <a:t>70,2</a:t>
+                      </a:r>
+                      <a:endParaRPr lang="ru-RU" sz="1700" b="0" i="0" u="none" strike="noStrike" dirty="0">
+                        <a:solidFill>
+                          <a:srgbClr val="FF0000"/>
+                        </a:solidFill>
+                        <a:effectLst/>
+                        <a:latin typeface="Calibri" panose="020F0502020204030204" pitchFamily="34" charset="0"/>
+                      </a:endParaRPr>
+                    </a:p>
+                  </a:txBody>
+                  <a:tcPr marL="15195" marR="15195" marT="15195" marB="0" anchor="ctr"/>
+                </a:tc>
+                <a:tc>
+                  <a:txBody>
+                    <a:bodyPr/>
+                    <a:lstStyle/>
+                    <a:p>
+                      <a:pPr algn="ctr" fontAlgn="b"/>
+                      <a:r>
+                        <a:rPr lang="ru-RU" sz="1700" u="none" strike="noStrike" dirty="0">
+                          <a:solidFill>
+                            <a:srgbClr val="00B050"/>
+                          </a:solidFill>
+                          <a:effectLst/>
+                        </a:rPr>
+                        <a:t>81,89</a:t>
+                      </a:r>
+                      <a:endParaRPr lang="ru-RU" sz="1700" b="0" i="0" u="none" strike="noStrike" dirty="0">
+                        <a:solidFill>
+                          <a:srgbClr val="00B050"/>
+                        </a:solidFill>
+                        <a:effectLst/>
+                        <a:latin typeface="Calibri" panose="020F0502020204030204" pitchFamily="34" charset="0"/>
+                      </a:endParaRPr>
+                    </a:p>
+                  </a:txBody>
+                  <a:tcPr marL="15195" marR="15195" marT="15195" marB="0" anchor="ctr"/>
+                </a:tc>
+                <a:tc>
+                  <a:txBody>
+                    <a:bodyPr/>
+                    <a:lstStyle/>
+                    <a:p>
+                      <a:pPr algn="ctr" fontAlgn="b"/>
+                      <a:r>
+                        <a:rPr lang="ru-RU" sz="1700" u="none" strike="noStrike" dirty="0">
+                          <a:solidFill>
+                            <a:srgbClr val="00B050"/>
+                          </a:solidFill>
+                          <a:effectLst/>
+                        </a:rPr>
+                        <a:t>75,59</a:t>
+                      </a:r>
+                      <a:endParaRPr lang="ru-RU" sz="1700" b="0" i="0" u="none" strike="noStrike" dirty="0">
+                        <a:solidFill>
+                          <a:srgbClr val="00B050"/>
+                        </a:solidFill>
+                        <a:effectLst/>
+                        <a:latin typeface="Calibri" panose="020F0502020204030204" pitchFamily="34" charset="0"/>
+                      </a:endParaRPr>
+                    </a:p>
+                  </a:txBody>
+                  <a:tcPr marL="15195" marR="15195" marT="15195" marB="0" anchor="ctr"/>
+                </a:tc>
+                <a:tc>
+                  <a:txBody>
+                    <a:bodyPr/>
+                    <a:lstStyle/>
+                    <a:p>
+                      <a:pPr algn="ctr" fontAlgn="b"/>
+                      <a:r>
+                        <a:rPr lang="ru-RU" sz="1700" u="none" strike="noStrike" dirty="0">
+                          <a:effectLst/>
+                        </a:rPr>
+                        <a:t>40</a:t>
+                      </a:r>
+                      <a:endParaRPr lang="ru-RU" sz="1700" b="0" i="0" u="none" strike="noStrike" dirty="0">
+                        <a:solidFill>
+                          <a:srgbClr val="000000"/>
+                        </a:solidFill>
+                        <a:effectLst/>
+                        <a:latin typeface="Calibri" panose="020F0502020204030204" pitchFamily="34" charset="0"/>
+                      </a:endParaRPr>
+                    </a:p>
+                  </a:txBody>
+                  <a:tcPr marL="15195" marR="15195" marT="15195" marB="0" anchor="ctr"/>
+                </a:tc>
+                <a:extLst>
+                  <a:ext uri="{0D108BD9-81ED-4DB2-BD59-A6C34878D82A}">
+                    <a16:rowId xmlns:a16="http://schemas.microsoft.com/office/drawing/2014/main" val="1742853081"/>
+                  </a:ext>
+                </a:extLst>
+              </a:tr>
+              <a:tr h="303915">
+                <a:tc>
+                  <a:txBody>
+                    <a:bodyPr/>
+                    <a:lstStyle/>
+                    <a:p>
+                      <a:pPr algn="ctr" fontAlgn="b"/>
+                      <a:r>
+                        <a:rPr lang="en-US" sz="1700" u="none" strike="noStrike" dirty="0" err="1">
+                          <a:effectLst/>
+                        </a:rPr>
+                        <a:t>proSRs</a:t>
+                      </a:r>
+                      <a:endParaRPr lang="en-US" sz="1700" b="0" i="0" u="none" strike="noStrike" dirty="0">
+                        <a:solidFill>
+                          <a:srgbClr val="000000"/>
+                        </a:solidFill>
+                        <a:effectLst/>
+                        <a:latin typeface="Calibri" panose="020F0502020204030204" pitchFamily="34" charset="0"/>
+                      </a:endParaRPr>
+                    </a:p>
+                  </a:txBody>
+                  <a:tcPr marL="15195" marR="15195" marT="15195" marB="0" anchor="ctr"/>
+                </a:tc>
+                <a:tc>
+                  <a:txBody>
+                    <a:bodyPr/>
+                    <a:lstStyle/>
+                    <a:p>
+                      <a:pPr algn="ctr" fontAlgn="b"/>
+                      <a:r>
+                        <a:rPr lang="ru-RU" sz="1700" u="none" strike="noStrike">
+                          <a:effectLst/>
+                        </a:rPr>
+                        <a:t>2</a:t>
+                      </a:r>
+                      <a:endParaRPr lang="ru-RU" sz="1700" b="0" i="0" u="none" strike="noStrike">
+                        <a:solidFill>
+                          <a:srgbClr val="000000"/>
+                        </a:solidFill>
+                        <a:effectLst/>
+                        <a:latin typeface="Calibri" panose="020F0502020204030204" pitchFamily="34" charset="0"/>
+                      </a:endParaRPr>
+                    </a:p>
+                  </a:txBody>
+                  <a:tcPr marL="15195" marR="15195" marT="15195" marB="0" anchor="ctr"/>
+                </a:tc>
+                <a:tc>
+                  <a:txBody>
+                    <a:bodyPr/>
+                    <a:lstStyle/>
+                    <a:p>
+                      <a:pPr algn="ctr" fontAlgn="b"/>
+                      <a:r>
+                        <a:rPr lang="ru-RU" sz="1700" u="none" strike="noStrike" dirty="0">
+                          <a:solidFill>
+                            <a:srgbClr val="FF0000"/>
+                          </a:solidFill>
+                          <a:effectLst/>
+                        </a:rPr>
+                        <a:t>73,2</a:t>
+                      </a:r>
+                      <a:endParaRPr lang="ru-RU" sz="1700" b="0" i="0" u="none" strike="noStrike" dirty="0">
+                        <a:solidFill>
+                          <a:srgbClr val="FF0000"/>
+                        </a:solidFill>
+                        <a:effectLst/>
+                        <a:latin typeface="Calibri" panose="020F0502020204030204" pitchFamily="34" charset="0"/>
+                      </a:endParaRPr>
+                    </a:p>
+                  </a:txBody>
+                  <a:tcPr marL="15195" marR="15195" marT="15195" marB="0" anchor="ctr"/>
+                </a:tc>
+                <a:tc>
+                  <a:txBody>
+                    <a:bodyPr/>
+                    <a:lstStyle/>
+                    <a:p>
+                      <a:pPr algn="ctr" fontAlgn="b"/>
+                      <a:r>
+                        <a:rPr lang="ru-RU" sz="1700" u="none" strike="noStrike" dirty="0">
+                          <a:solidFill>
+                            <a:srgbClr val="FF0000"/>
+                          </a:solidFill>
+                          <a:effectLst/>
+                        </a:rPr>
+                        <a:t>69,72</a:t>
+                      </a:r>
+                      <a:endParaRPr lang="ru-RU" sz="1700" b="0" i="0" u="none" strike="noStrike" dirty="0">
+                        <a:solidFill>
+                          <a:srgbClr val="FF0000"/>
+                        </a:solidFill>
+                        <a:effectLst/>
+                        <a:latin typeface="Calibri" panose="020F0502020204030204" pitchFamily="34" charset="0"/>
+                      </a:endParaRPr>
+                    </a:p>
+                  </a:txBody>
+                  <a:tcPr marL="15195" marR="15195" marT="15195" marB="0" anchor="ctr"/>
+                </a:tc>
+                <a:tc>
+                  <a:txBody>
+                    <a:bodyPr/>
+                    <a:lstStyle/>
+                    <a:p>
+                      <a:pPr algn="ctr" fontAlgn="b"/>
+                      <a:r>
+                        <a:rPr lang="ru-RU" sz="1700" u="none" strike="noStrike" dirty="0">
+                          <a:solidFill>
+                            <a:srgbClr val="00B050"/>
+                          </a:solidFill>
+                          <a:effectLst/>
+                        </a:rPr>
+                        <a:t>82,01</a:t>
+                      </a:r>
+                      <a:endParaRPr lang="ru-RU" sz="1700" b="0" i="0" u="none" strike="noStrike" dirty="0">
+                        <a:solidFill>
+                          <a:srgbClr val="00B050"/>
+                        </a:solidFill>
+                        <a:effectLst/>
+                        <a:latin typeface="Calibri" panose="020F0502020204030204" pitchFamily="34" charset="0"/>
+                      </a:endParaRPr>
+                    </a:p>
+                  </a:txBody>
+                  <a:tcPr marL="15195" marR="15195" marT="15195" marB="0" anchor="ctr"/>
+                </a:tc>
+                <a:tc>
+                  <a:txBody>
+                    <a:bodyPr/>
+                    <a:lstStyle/>
+                    <a:p>
+                      <a:pPr algn="ctr" fontAlgn="b"/>
+                      <a:r>
+                        <a:rPr lang="ru-RU" sz="1700" u="none" strike="noStrike" dirty="0">
+                          <a:solidFill>
+                            <a:srgbClr val="FF0000"/>
+                          </a:solidFill>
+                          <a:effectLst/>
+                        </a:rPr>
+                        <a:t>75,37</a:t>
+                      </a:r>
+                      <a:endParaRPr lang="ru-RU" sz="1700" b="0" i="0" u="none" strike="noStrike" dirty="0">
+                        <a:solidFill>
+                          <a:srgbClr val="FF0000"/>
+                        </a:solidFill>
+                        <a:effectLst/>
+                        <a:latin typeface="Calibri" panose="020F0502020204030204" pitchFamily="34" charset="0"/>
+                      </a:endParaRPr>
+                    </a:p>
+                  </a:txBody>
+                  <a:tcPr marL="15195" marR="15195" marT="15195" marB="0" anchor="ctr"/>
+                </a:tc>
+                <a:tc>
+                  <a:txBody>
+                    <a:bodyPr/>
+                    <a:lstStyle/>
+                    <a:p>
+                      <a:pPr algn="ctr" fontAlgn="b"/>
+                      <a:r>
+                        <a:rPr lang="ru-RU" sz="1700" u="none" strike="noStrike" dirty="0">
+                          <a:effectLst/>
+                        </a:rPr>
+                        <a:t>40</a:t>
+                      </a:r>
+                      <a:endParaRPr lang="ru-RU" sz="1700" b="0" i="0" u="none" strike="noStrike" dirty="0">
+                        <a:solidFill>
+                          <a:srgbClr val="000000"/>
+                        </a:solidFill>
+                        <a:effectLst/>
+                        <a:latin typeface="Calibri" panose="020F0502020204030204" pitchFamily="34" charset="0"/>
+                      </a:endParaRPr>
+                    </a:p>
+                  </a:txBody>
+                  <a:tcPr marL="15195" marR="15195" marT="15195" marB="0" anchor="ctr"/>
+                </a:tc>
+                <a:extLst>
+                  <a:ext uri="{0D108BD9-81ED-4DB2-BD59-A6C34878D82A}">
+                    <a16:rowId xmlns:a16="http://schemas.microsoft.com/office/drawing/2014/main" val="1757977660"/>
+                  </a:ext>
+                </a:extLst>
+              </a:tr>
+              <a:tr h="303915">
+                <a:tc>
+                  <a:txBody>
+                    <a:bodyPr/>
+                    <a:lstStyle/>
+                    <a:p>
+                      <a:pPr algn="ctr" fontAlgn="b"/>
+                      <a:r>
+                        <a:rPr lang="en-US" sz="1700" u="none" strike="noStrike" dirty="0" err="1">
+                          <a:effectLst/>
+                        </a:rPr>
+                        <a:t>proSR</a:t>
+                      </a:r>
+                      <a:endParaRPr lang="en-US" sz="1700" b="0" i="0" u="none" strike="noStrike" dirty="0">
+                        <a:solidFill>
+                          <a:srgbClr val="000000"/>
+                        </a:solidFill>
+                        <a:effectLst/>
+                        <a:latin typeface="Calibri" panose="020F0502020204030204" pitchFamily="34" charset="0"/>
+                      </a:endParaRPr>
+                    </a:p>
+                  </a:txBody>
+                  <a:tcPr marL="15195" marR="15195" marT="15195" marB="0" anchor="ctr"/>
+                </a:tc>
+                <a:tc>
+                  <a:txBody>
+                    <a:bodyPr/>
+                    <a:lstStyle/>
+                    <a:p>
+                      <a:pPr algn="ctr" fontAlgn="b"/>
+                      <a:r>
+                        <a:rPr lang="ru-RU" sz="1700" u="none" strike="noStrike">
+                          <a:effectLst/>
+                        </a:rPr>
+                        <a:t>2</a:t>
+                      </a:r>
+                      <a:endParaRPr lang="ru-RU" sz="1700" b="0" i="0" u="none" strike="noStrike">
+                        <a:solidFill>
+                          <a:srgbClr val="000000"/>
+                        </a:solidFill>
+                        <a:effectLst/>
+                        <a:latin typeface="Calibri" panose="020F0502020204030204" pitchFamily="34" charset="0"/>
+                      </a:endParaRPr>
+                    </a:p>
+                  </a:txBody>
+                  <a:tcPr marL="15195" marR="15195" marT="15195" marB="0" anchor="ctr"/>
+                </a:tc>
+                <a:tc>
+                  <a:txBody>
+                    <a:bodyPr/>
+                    <a:lstStyle/>
+                    <a:p>
+                      <a:pPr algn="ctr" fontAlgn="b"/>
+                      <a:r>
+                        <a:rPr lang="ru-RU" sz="1700" u="none" strike="noStrike" dirty="0">
+                          <a:solidFill>
+                            <a:srgbClr val="FF0000"/>
+                          </a:solidFill>
+                          <a:effectLst/>
+                        </a:rPr>
+                        <a:t>72,84</a:t>
+                      </a:r>
+                      <a:endParaRPr lang="ru-RU" sz="1700" b="0" i="0" u="none" strike="noStrike" dirty="0">
+                        <a:solidFill>
+                          <a:srgbClr val="FF0000"/>
+                        </a:solidFill>
+                        <a:effectLst/>
+                        <a:latin typeface="Calibri" panose="020F0502020204030204" pitchFamily="34" charset="0"/>
+                      </a:endParaRPr>
+                    </a:p>
+                  </a:txBody>
+                  <a:tcPr marL="15195" marR="15195" marT="15195" marB="0" anchor="ctr"/>
+                </a:tc>
+                <a:tc>
+                  <a:txBody>
+                    <a:bodyPr/>
+                    <a:lstStyle/>
+                    <a:p>
+                      <a:pPr algn="ctr" fontAlgn="b"/>
+                      <a:r>
+                        <a:rPr lang="ru-RU" sz="1700" u="none" strike="noStrike" dirty="0">
+                          <a:solidFill>
+                            <a:srgbClr val="FF0000"/>
+                          </a:solidFill>
+                          <a:effectLst/>
+                        </a:rPr>
+                        <a:t>69,26</a:t>
+                      </a:r>
+                      <a:endParaRPr lang="ru-RU" sz="1700" b="0" i="0" u="none" strike="noStrike" dirty="0">
+                        <a:solidFill>
+                          <a:srgbClr val="FF0000"/>
+                        </a:solidFill>
+                        <a:effectLst/>
+                        <a:latin typeface="Calibri" panose="020F0502020204030204" pitchFamily="34" charset="0"/>
+                      </a:endParaRPr>
+                    </a:p>
+                  </a:txBody>
+                  <a:tcPr marL="15195" marR="15195" marT="15195" marB="0" anchor="ctr"/>
+                </a:tc>
+                <a:tc>
+                  <a:txBody>
+                    <a:bodyPr/>
+                    <a:lstStyle/>
+                    <a:p>
+                      <a:pPr algn="ctr" fontAlgn="b"/>
+                      <a:r>
+                        <a:rPr lang="ru-RU" sz="1700" u="none" strike="noStrike" dirty="0">
+                          <a:solidFill>
+                            <a:srgbClr val="00B050"/>
+                          </a:solidFill>
+                          <a:effectLst/>
+                        </a:rPr>
+                        <a:t>82,13</a:t>
+                      </a:r>
+                      <a:endParaRPr lang="ru-RU" sz="1700" b="0" i="0" u="none" strike="noStrike" dirty="0">
+                        <a:solidFill>
+                          <a:srgbClr val="00B050"/>
+                        </a:solidFill>
+                        <a:effectLst/>
+                        <a:latin typeface="Calibri" panose="020F0502020204030204" pitchFamily="34" charset="0"/>
+                      </a:endParaRPr>
+                    </a:p>
+                  </a:txBody>
+                  <a:tcPr marL="15195" marR="15195" marT="15195" marB="0" anchor="ctr"/>
+                </a:tc>
+                <a:tc>
+                  <a:txBody>
+                    <a:bodyPr/>
+                    <a:lstStyle/>
+                    <a:p>
+                      <a:pPr algn="ctr" fontAlgn="b"/>
+                      <a:r>
+                        <a:rPr lang="ru-RU" sz="1700" u="none" strike="noStrike" dirty="0">
+                          <a:solidFill>
+                            <a:srgbClr val="FF0000"/>
+                          </a:solidFill>
+                          <a:effectLst/>
+                        </a:rPr>
+                        <a:t>75,15</a:t>
+                      </a:r>
+                      <a:endParaRPr lang="ru-RU" sz="1700" b="0" i="0" u="none" strike="noStrike" dirty="0">
+                        <a:solidFill>
+                          <a:srgbClr val="FF0000"/>
+                        </a:solidFill>
+                        <a:effectLst/>
+                        <a:latin typeface="Calibri" panose="020F0502020204030204" pitchFamily="34" charset="0"/>
+                      </a:endParaRPr>
+                    </a:p>
+                  </a:txBody>
+                  <a:tcPr marL="15195" marR="15195" marT="15195" marB="0" anchor="ctr"/>
+                </a:tc>
+                <a:tc>
+                  <a:txBody>
+                    <a:bodyPr/>
+                    <a:lstStyle/>
+                    <a:p>
+                      <a:pPr algn="ctr" fontAlgn="b"/>
+                      <a:r>
+                        <a:rPr lang="ru-RU" sz="1700" u="none" strike="noStrike" dirty="0">
+                          <a:effectLst/>
+                        </a:rPr>
+                        <a:t>39</a:t>
+                      </a:r>
+                      <a:endParaRPr lang="ru-RU" sz="1700" b="0" i="0" u="none" strike="noStrike" dirty="0">
+                        <a:solidFill>
+                          <a:srgbClr val="000000"/>
+                        </a:solidFill>
+                        <a:effectLst/>
+                        <a:latin typeface="Calibri" panose="020F0502020204030204" pitchFamily="34" charset="0"/>
+                      </a:endParaRPr>
+                    </a:p>
+                  </a:txBody>
+                  <a:tcPr marL="15195" marR="15195" marT="15195" marB="0" anchor="ctr"/>
+                </a:tc>
+                <a:extLst>
+                  <a:ext uri="{0D108BD9-81ED-4DB2-BD59-A6C34878D82A}">
+                    <a16:rowId xmlns:a16="http://schemas.microsoft.com/office/drawing/2014/main" val="2004144643"/>
+                  </a:ext>
+                </a:extLst>
+              </a:tr>
+              <a:tr h="303915">
+                <a:tc>
+                  <a:txBody>
+                    <a:bodyPr/>
+                    <a:lstStyle/>
+                    <a:p>
+                      <a:pPr algn="ctr" fontAlgn="b"/>
+                      <a:r>
+                        <a:rPr lang="en-US" sz="1700" u="none" strike="noStrike" dirty="0">
+                          <a:effectLst/>
+                        </a:rPr>
+                        <a:t>DCSCN</a:t>
+                      </a:r>
+                      <a:endParaRPr lang="en-US" sz="1700" b="0" i="0" u="none" strike="noStrike" dirty="0">
+                        <a:solidFill>
+                          <a:srgbClr val="000000"/>
+                        </a:solidFill>
+                        <a:effectLst/>
+                        <a:latin typeface="Calibri" panose="020F0502020204030204" pitchFamily="34" charset="0"/>
+                      </a:endParaRPr>
+                    </a:p>
+                  </a:txBody>
+                  <a:tcPr marL="15195" marR="15195" marT="15195" marB="0" anchor="ctr"/>
+                </a:tc>
+                <a:tc>
+                  <a:txBody>
+                    <a:bodyPr/>
+                    <a:lstStyle/>
+                    <a:p>
+                      <a:pPr algn="ctr" fontAlgn="b"/>
+                      <a:r>
+                        <a:rPr lang="ru-RU" sz="1700" u="none" strike="noStrike">
+                          <a:effectLst/>
+                        </a:rPr>
+                        <a:t>3</a:t>
+                      </a:r>
+                      <a:endParaRPr lang="ru-RU" sz="1700" b="0" i="0" u="none" strike="noStrike">
+                        <a:solidFill>
+                          <a:srgbClr val="000000"/>
+                        </a:solidFill>
+                        <a:effectLst/>
+                        <a:latin typeface="Calibri" panose="020F0502020204030204" pitchFamily="34" charset="0"/>
+                      </a:endParaRPr>
+                    </a:p>
+                  </a:txBody>
+                  <a:tcPr marL="15195" marR="15195" marT="15195" marB="0" anchor="ctr"/>
+                </a:tc>
+                <a:tc>
+                  <a:txBody>
+                    <a:bodyPr/>
+                    <a:lstStyle/>
+                    <a:p>
+                      <a:pPr algn="ctr" fontAlgn="b"/>
+                      <a:r>
+                        <a:rPr lang="ru-RU" sz="1700" u="none" strike="noStrike" dirty="0">
+                          <a:solidFill>
+                            <a:srgbClr val="FF0000"/>
+                          </a:solidFill>
+                          <a:effectLst/>
+                        </a:rPr>
+                        <a:t>72,48</a:t>
+                      </a:r>
+                      <a:endParaRPr lang="ru-RU" sz="1700" b="0" i="0" u="none" strike="noStrike" dirty="0">
+                        <a:solidFill>
+                          <a:srgbClr val="FF0000"/>
+                        </a:solidFill>
+                        <a:effectLst/>
+                        <a:latin typeface="Calibri" panose="020F0502020204030204" pitchFamily="34" charset="0"/>
+                      </a:endParaRPr>
+                    </a:p>
+                  </a:txBody>
+                  <a:tcPr marL="15195" marR="15195" marT="15195" marB="0" anchor="ctr"/>
+                </a:tc>
+                <a:tc>
+                  <a:txBody>
+                    <a:bodyPr/>
+                    <a:lstStyle/>
+                    <a:p>
+                      <a:pPr algn="ctr" fontAlgn="b"/>
+                      <a:r>
+                        <a:rPr lang="ru-RU" sz="1700" u="none" strike="noStrike" dirty="0">
+                          <a:solidFill>
+                            <a:srgbClr val="FF0000"/>
+                          </a:solidFill>
+                          <a:effectLst/>
+                        </a:rPr>
+                        <a:t>68,4</a:t>
+                      </a:r>
+                      <a:endParaRPr lang="ru-RU" sz="1700" b="0" i="0" u="none" strike="noStrike" dirty="0">
+                        <a:solidFill>
+                          <a:srgbClr val="FF0000"/>
+                        </a:solidFill>
+                        <a:effectLst/>
+                        <a:latin typeface="Calibri" panose="020F0502020204030204" pitchFamily="34" charset="0"/>
+                      </a:endParaRPr>
+                    </a:p>
+                  </a:txBody>
+                  <a:tcPr marL="15195" marR="15195" marT="15195" marB="0" anchor="ctr"/>
+                </a:tc>
+                <a:tc>
+                  <a:txBody>
+                    <a:bodyPr/>
+                    <a:lstStyle/>
+                    <a:p>
+                      <a:pPr algn="ctr" fontAlgn="b"/>
+                      <a:r>
+                        <a:rPr lang="ru-RU" sz="1700" u="none" strike="noStrike" dirty="0">
+                          <a:solidFill>
+                            <a:srgbClr val="00B050"/>
+                          </a:solidFill>
+                          <a:effectLst/>
+                        </a:rPr>
+                        <a:t>83,57</a:t>
+                      </a:r>
+                      <a:endParaRPr lang="ru-RU" sz="1700" b="0" i="0" u="none" strike="noStrike" dirty="0">
+                        <a:solidFill>
+                          <a:srgbClr val="00B050"/>
+                        </a:solidFill>
+                        <a:effectLst/>
+                        <a:latin typeface="Calibri" panose="020F0502020204030204" pitchFamily="34" charset="0"/>
+                      </a:endParaRPr>
+                    </a:p>
+                  </a:txBody>
+                  <a:tcPr marL="15195" marR="15195" marT="15195" marB="0" anchor="ctr"/>
+                </a:tc>
+                <a:tc>
+                  <a:txBody>
+                    <a:bodyPr/>
+                    <a:lstStyle/>
+                    <a:p>
+                      <a:pPr algn="ctr" fontAlgn="b"/>
+                      <a:r>
+                        <a:rPr lang="ru-RU" sz="1700" u="none" strike="noStrike" dirty="0">
+                          <a:solidFill>
+                            <a:srgbClr val="FF0000"/>
+                          </a:solidFill>
+                          <a:effectLst/>
+                        </a:rPr>
+                        <a:t>75,23</a:t>
+                      </a:r>
+                      <a:endParaRPr lang="ru-RU" sz="1700" b="0" i="0" u="none" strike="noStrike" dirty="0">
+                        <a:solidFill>
+                          <a:srgbClr val="FF0000"/>
+                        </a:solidFill>
+                        <a:effectLst/>
+                        <a:latin typeface="Calibri" panose="020F0502020204030204" pitchFamily="34" charset="0"/>
+                      </a:endParaRPr>
+                    </a:p>
+                  </a:txBody>
+                  <a:tcPr marL="15195" marR="15195" marT="15195" marB="0" anchor="ctr"/>
+                </a:tc>
+                <a:tc>
+                  <a:txBody>
+                    <a:bodyPr/>
+                    <a:lstStyle/>
+                    <a:p>
+                      <a:pPr algn="ctr" fontAlgn="b"/>
+                      <a:r>
+                        <a:rPr lang="ru-RU" sz="1700" u="none" strike="noStrike" dirty="0">
+                          <a:effectLst/>
+                        </a:rPr>
+                        <a:t>37</a:t>
+                      </a:r>
+                      <a:endParaRPr lang="ru-RU" sz="1700" b="0" i="0" u="none" strike="noStrike" dirty="0">
+                        <a:solidFill>
+                          <a:srgbClr val="000000"/>
+                        </a:solidFill>
+                        <a:effectLst/>
+                        <a:latin typeface="Calibri" panose="020F0502020204030204" pitchFamily="34" charset="0"/>
+                      </a:endParaRPr>
+                    </a:p>
+                  </a:txBody>
+                  <a:tcPr marL="15195" marR="15195" marT="15195" marB="0" anchor="ctr"/>
+                </a:tc>
+                <a:extLst>
+                  <a:ext uri="{0D108BD9-81ED-4DB2-BD59-A6C34878D82A}">
+                    <a16:rowId xmlns:a16="http://schemas.microsoft.com/office/drawing/2014/main" val="1993758018"/>
+                  </a:ext>
+                </a:extLst>
+              </a:tr>
+              <a:tr h="303915">
+                <a:tc>
+                  <a:txBody>
+                    <a:bodyPr/>
+                    <a:lstStyle/>
+                    <a:p>
+                      <a:pPr algn="ctr" fontAlgn="b"/>
+                      <a:r>
+                        <a:rPr lang="en-US" sz="1700" u="none" strike="noStrike" dirty="0">
+                          <a:effectLst/>
+                        </a:rPr>
+                        <a:t>EDSR</a:t>
+                      </a:r>
+                      <a:endParaRPr lang="en-US" sz="1700" b="0" i="0" u="none" strike="noStrike" dirty="0">
+                        <a:solidFill>
+                          <a:srgbClr val="000000"/>
+                        </a:solidFill>
+                        <a:effectLst/>
+                        <a:latin typeface="Calibri" panose="020F0502020204030204" pitchFamily="34" charset="0"/>
+                      </a:endParaRPr>
+                    </a:p>
+                  </a:txBody>
+                  <a:tcPr marL="15195" marR="15195" marT="15195" marB="0" anchor="ctr"/>
+                </a:tc>
+                <a:tc>
+                  <a:txBody>
+                    <a:bodyPr/>
+                    <a:lstStyle/>
+                    <a:p>
+                      <a:pPr algn="ctr" fontAlgn="b"/>
+                      <a:r>
+                        <a:rPr lang="ru-RU" sz="1700" u="none" strike="noStrike">
+                          <a:effectLst/>
+                        </a:rPr>
+                        <a:t>4</a:t>
+                      </a:r>
+                      <a:endParaRPr lang="ru-RU" sz="1700" b="0" i="0" u="none" strike="noStrike">
+                        <a:solidFill>
+                          <a:srgbClr val="000000"/>
+                        </a:solidFill>
+                        <a:effectLst/>
+                        <a:latin typeface="Calibri" panose="020F0502020204030204" pitchFamily="34" charset="0"/>
+                      </a:endParaRPr>
+                    </a:p>
+                  </a:txBody>
+                  <a:tcPr marL="15195" marR="15195" marT="15195" marB="0" anchor="ctr"/>
+                </a:tc>
+                <a:tc>
+                  <a:txBody>
+                    <a:bodyPr/>
+                    <a:lstStyle/>
+                    <a:p>
+                      <a:pPr algn="ctr" fontAlgn="b"/>
+                      <a:r>
+                        <a:rPr lang="ru-RU" sz="1700" u="none" strike="noStrike" dirty="0">
+                          <a:solidFill>
+                            <a:srgbClr val="FF0000"/>
+                          </a:solidFill>
+                          <a:effectLst/>
+                        </a:rPr>
+                        <a:t>72,36</a:t>
+                      </a:r>
+                      <a:endParaRPr lang="ru-RU" sz="1700" b="0" i="0" u="none" strike="noStrike" dirty="0">
+                        <a:solidFill>
+                          <a:srgbClr val="FF0000"/>
+                        </a:solidFill>
+                        <a:effectLst/>
+                        <a:latin typeface="Calibri" panose="020F0502020204030204" pitchFamily="34" charset="0"/>
+                      </a:endParaRPr>
+                    </a:p>
+                  </a:txBody>
+                  <a:tcPr marL="15195" marR="15195" marT="15195" marB="0" anchor="ctr"/>
+                </a:tc>
+                <a:tc>
+                  <a:txBody>
+                    <a:bodyPr/>
+                    <a:lstStyle/>
+                    <a:p>
+                      <a:pPr algn="ctr" fontAlgn="b"/>
+                      <a:r>
+                        <a:rPr lang="ru-RU" sz="1700" u="none" strike="noStrike" dirty="0">
+                          <a:solidFill>
+                            <a:srgbClr val="FF0000"/>
+                          </a:solidFill>
+                          <a:effectLst/>
+                        </a:rPr>
+                        <a:t>68,09</a:t>
+                      </a:r>
+                      <a:endParaRPr lang="ru-RU" sz="1700" b="0" i="0" u="none" strike="noStrike" dirty="0">
+                        <a:solidFill>
+                          <a:srgbClr val="FF0000"/>
+                        </a:solidFill>
+                        <a:effectLst/>
+                        <a:latin typeface="Calibri" panose="020F0502020204030204" pitchFamily="34" charset="0"/>
+                      </a:endParaRPr>
+                    </a:p>
+                  </a:txBody>
+                  <a:tcPr marL="15195" marR="15195" marT="15195" marB="0" anchor="ctr"/>
+                </a:tc>
+                <a:tc>
+                  <a:txBody>
+                    <a:bodyPr/>
+                    <a:lstStyle/>
+                    <a:p>
+                      <a:pPr algn="ctr" fontAlgn="b"/>
+                      <a:r>
+                        <a:rPr lang="ru-RU" sz="1700" u="none" strike="noStrike" dirty="0">
+                          <a:solidFill>
+                            <a:srgbClr val="00B050"/>
+                          </a:solidFill>
+                          <a:effectLst/>
+                        </a:rPr>
+                        <a:t>84,17</a:t>
+                      </a:r>
+                      <a:endParaRPr lang="ru-RU" sz="1700" b="0" i="0" u="none" strike="noStrike" dirty="0">
+                        <a:solidFill>
+                          <a:srgbClr val="00B050"/>
+                        </a:solidFill>
+                        <a:effectLst/>
+                        <a:latin typeface="Calibri" panose="020F0502020204030204" pitchFamily="34" charset="0"/>
+                      </a:endParaRPr>
+                    </a:p>
+                  </a:txBody>
+                  <a:tcPr marL="15195" marR="15195" marT="15195" marB="0" anchor="ctr"/>
+                </a:tc>
+                <a:tc>
+                  <a:txBody>
+                    <a:bodyPr/>
+                    <a:lstStyle/>
+                    <a:p>
+                      <a:pPr algn="ctr" fontAlgn="b"/>
+                      <a:r>
+                        <a:rPr lang="ru-RU" sz="1700" u="none" strike="noStrike" dirty="0">
+                          <a:solidFill>
+                            <a:srgbClr val="FF0000"/>
+                          </a:solidFill>
+                          <a:effectLst/>
+                        </a:rPr>
+                        <a:t>75,28</a:t>
+                      </a:r>
+                      <a:endParaRPr lang="ru-RU" sz="1700" b="0" i="0" u="none" strike="noStrike" dirty="0">
+                        <a:solidFill>
+                          <a:srgbClr val="FF0000"/>
+                        </a:solidFill>
+                        <a:effectLst/>
+                        <a:latin typeface="Calibri" panose="020F0502020204030204" pitchFamily="34" charset="0"/>
+                      </a:endParaRPr>
+                    </a:p>
+                  </a:txBody>
+                  <a:tcPr marL="15195" marR="15195" marT="15195" marB="0" anchor="ctr"/>
+                </a:tc>
+                <a:tc>
+                  <a:txBody>
+                    <a:bodyPr/>
+                    <a:lstStyle/>
+                    <a:p>
+                      <a:pPr algn="ctr" fontAlgn="b"/>
+                      <a:r>
+                        <a:rPr lang="ru-RU" sz="1700" u="none" strike="noStrike" dirty="0">
+                          <a:effectLst/>
+                        </a:rPr>
+                        <a:t>36</a:t>
+                      </a:r>
+                      <a:endParaRPr lang="ru-RU" sz="1700" b="0" i="0" u="none" strike="noStrike" dirty="0">
+                        <a:solidFill>
+                          <a:srgbClr val="000000"/>
+                        </a:solidFill>
+                        <a:effectLst/>
+                        <a:latin typeface="Calibri" panose="020F0502020204030204" pitchFamily="34" charset="0"/>
+                      </a:endParaRPr>
+                    </a:p>
+                  </a:txBody>
+                  <a:tcPr marL="15195" marR="15195" marT="15195" marB="0" anchor="ctr"/>
+                </a:tc>
+                <a:extLst>
+                  <a:ext uri="{0D108BD9-81ED-4DB2-BD59-A6C34878D82A}">
+                    <a16:rowId xmlns:a16="http://schemas.microsoft.com/office/drawing/2014/main" val="734883921"/>
+                  </a:ext>
+                </a:extLst>
+              </a:tr>
+              <a:tr h="303915">
+                <a:tc>
+                  <a:txBody>
+                    <a:bodyPr/>
+                    <a:lstStyle/>
+                    <a:p>
+                      <a:pPr algn="ctr" fontAlgn="b"/>
+                      <a:r>
+                        <a:rPr lang="en-US" sz="1700" u="none" strike="noStrike" dirty="0">
+                          <a:effectLst/>
+                        </a:rPr>
+                        <a:t>DBPN</a:t>
+                      </a:r>
+                      <a:endParaRPr lang="en-US" sz="1700" b="0" i="0" u="none" strike="noStrike" dirty="0">
+                        <a:solidFill>
+                          <a:srgbClr val="000000"/>
+                        </a:solidFill>
+                        <a:effectLst/>
+                        <a:latin typeface="Calibri" panose="020F0502020204030204" pitchFamily="34" charset="0"/>
+                      </a:endParaRPr>
+                    </a:p>
+                  </a:txBody>
+                  <a:tcPr marL="15195" marR="15195" marT="15195" marB="0" anchor="ctr"/>
+                </a:tc>
+                <a:tc>
+                  <a:txBody>
+                    <a:bodyPr/>
+                    <a:lstStyle/>
+                    <a:p>
+                      <a:pPr algn="ctr" fontAlgn="b"/>
+                      <a:r>
+                        <a:rPr lang="ru-RU" sz="1700" u="none" strike="noStrike">
+                          <a:effectLst/>
+                        </a:rPr>
+                        <a:t>4</a:t>
+                      </a:r>
+                      <a:endParaRPr lang="ru-RU" sz="1700" b="0" i="0" u="none" strike="noStrike">
+                        <a:solidFill>
+                          <a:srgbClr val="000000"/>
+                        </a:solidFill>
+                        <a:effectLst/>
+                        <a:latin typeface="Calibri" panose="020F0502020204030204" pitchFamily="34" charset="0"/>
+                      </a:endParaRPr>
+                    </a:p>
+                  </a:txBody>
+                  <a:tcPr marL="15195" marR="15195" marT="15195" marB="0" anchor="ctr"/>
+                </a:tc>
+                <a:tc>
+                  <a:txBody>
+                    <a:bodyPr/>
+                    <a:lstStyle/>
+                    <a:p>
+                      <a:pPr algn="ctr" fontAlgn="b"/>
+                      <a:r>
+                        <a:rPr lang="ru-RU" sz="1700" u="none" strike="noStrike" dirty="0">
+                          <a:solidFill>
+                            <a:srgbClr val="FF0000"/>
+                          </a:solidFill>
+                          <a:effectLst/>
+                        </a:rPr>
+                        <a:t>72,18</a:t>
+                      </a:r>
+                      <a:endParaRPr lang="ru-RU" sz="1700" b="0" i="0" u="none" strike="noStrike" dirty="0">
+                        <a:solidFill>
+                          <a:srgbClr val="FF0000"/>
+                        </a:solidFill>
+                        <a:effectLst/>
+                        <a:latin typeface="Calibri" panose="020F0502020204030204" pitchFamily="34" charset="0"/>
+                      </a:endParaRPr>
+                    </a:p>
+                  </a:txBody>
+                  <a:tcPr marL="15195" marR="15195" marT="15195" marB="0" anchor="ctr"/>
+                </a:tc>
+                <a:tc>
+                  <a:txBody>
+                    <a:bodyPr/>
+                    <a:lstStyle/>
+                    <a:p>
+                      <a:pPr algn="ctr" fontAlgn="b"/>
+                      <a:r>
+                        <a:rPr lang="ru-RU" sz="1700" u="none" strike="noStrike" dirty="0">
+                          <a:solidFill>
+                            <a:srgbClr val="FF0000"/>
+                          </a:solidFill>
+                          <a:effectLst/>
+                        </a:rPr>
+                        <a:t>67,79</a:t>
+                      </a:r>
+                      <a:endParaRPr lang="ru-RU" sz="1700" b="0" i="0" u="none" strike="noStrike" dirty="0">
+                        <a:solidFill>
+                          <a:srgbClr val="FF0000"/>
+                        </a:solidFill>
+                        <a:effectLst/>
+                        <a:latin typeface="Calibri" panose="020F0502020204030204" pitchFamily="34" charset="0"/>
+                      </a:endParaRPr>
+                    </a:p>
+                  </a:txBody>
+                  <a:tcPr marL="15195" marR="15195" marT="15195" marB="0" anchor="ctr"/>
+                </a:tc>
+                <a:tc>
+                  <a:txBody>
+                    <a:bodyPr/>
+                    <a:lstStyle/>
+                    <a:p>
+                      <a:pPr algn="ctr" fontAlgn="b"/>
+                      <a:r>
+                        <a:rPr lang="ru-RU" sz="1700" u="none" strike="noStrike" dirty="0">
+                          <a:solidFill>
+                            <a:srgbClr val="00B050"/>
+                          </a:solidFill>
+                          <a:effectLst/>
+                        </a:rPr>
+                        <a:t>84,53</a:t>
+                      </a:r>
+                      <a:endParaRPr lang="ru-RU" sz="1700" b="0" i="0" u="none" strike="noStrike" dirty="0">
+                        <a:solidFill>
+                          <a:srgbClr val="00B050"/>
+                        </a:solidFill>
+                        <a:effectLst/>
+                        <a:latin typeface="Calibri" panose="020F0502020204030204" pitchFamily="34" charset="0"/>
+                      </a:endParaRPr>
+                    </a:p>
+                  </a:txBody>
+                  <a:tcPr marL="15195" marR="15195" marT="15195" marB="0" anchor="ctr"/>
+                </a:tc>
+                <a:tc>
+                  <a:txBody>
+                    <a:bodyPr/>
+                    <a:lstStyle/>
+                    <a:p>
+                      <a:pPr algn="ctr" fontAlgn="b"/>
+                      <a:r>
+                        <a:rPr lang="ru-RU" sz="1700" u="none" strike="noStrike" dirty="0">
+                          <a:solidFill>
+                            <a:srgbClr val="FF0000"/>
+                          </a:solidFill>
+                          <a:effectLst/>
+                        </a:rPr>
+                        <a:t>75,24</a:t>
+                      </a:r>
+                      <a:endParaRPr lang="ru-RU" sz="1700" b="0" i="0" u="none" strike="noStrike" dirty="0">
+                        <a:solidFill>
+                          <a:srgbClr val="FF0000"/>
+                        </a:solidFill>
+                        <a:effectLst/>
+                        <a:latin typeface="Calibri" panose="020F0502020204030204" pitchFamily="34" charset="0"/>
+                      </a:endParaRPr>
+                    </a:p>
+                  </a:txBody>
+                  <a:tcPr marL="15195" marR="15195" marT="15195" marB="0" anchor="ctr"/>
+                </a:tc>
+                <a:tc>
+                  <a:txBody>
+                    <a:bodyPr/>
+                    <a:lstStyle/>
+                    <a:p>
+                      <a:pPr algn="ctr" fontAlgn="b"/>
+                      <a:r>
+                        <a:rPr lang="ru-RU" sz="1700" u="none" strike="noStrike" dirty="0">
+                          <a:effectLst/>
+                        </a:rPr>
+                        <a:t>33</a:t>
+                      </a:r>
+                      <a:endParaRPr lang="ru-RU" sz="1700" b="0" i="0" u="none" strike="noStrike" dirty="0">
+                        <a:solidFill>
+                          <a:srgbClr val="000000"/>
+                        </a:solidFill>
+                        <a:effectLst/>
+                        <a:latin typeface="Calibri" panose="020F0502020204030204" pitchFamily="34" charset="0"/>
+                      </a:endParaRPr>
+                    </a:p>
+                  </a:txBody>
+                  <a:tcPr marL="15195" marR="15195" marT="15195" marB="0" anchor="ctr"/>
+                </a:tc>
+                <a:extLst>
+                  <a:ext uri="{0D108BD9-81ED-4DB2-BD59-A6C34878D82A}">
+                    <a16:rowId xmlns:a16="http://schemas.microsoft.com/office/drawing/2014/main" val="198743261"/>
+                  </a:ext>
+                </a:extLst>
+              </a:tr>
+              <a:tr h="303915">
+                <a:tc>
+                  <a:txBody>
+                    <a:bodyPr/>
+                    <a:lstStyle/>
+                    <a:p>
+                      <a:pPr algn="ctr" fontAlgn="b"/>
+                      <a:r>
+                        <a:rPr lang="en-US" sz="1700" u="none" strike="noStrike" dirty="0">
+                          <a:effectLst/>
+                        </a:rPr>
+                        <a:t>EDSR</a:t>
+                      </a:r>
+                      <a:endParaRPr lang="en-US" sz="1700" b="0" i="0" u="none" strike="noStrike" dirty="0">
+                        <a:solidFill>
+                          <a:srgbClr val="000000"/>
+                        </a:solidFill>
+                        <a:effectLst/>
+                        <a:latin typeface="Calibri" panose="020F0502020204030204" pitchFamily="34" charset="0"/>
+                      </a:endParaRPr>
+                    </a:p>
+                  </a:txBody>
+                  <a:tcPr marL="15195" marR="15195" marT="15195" marB="0" anchor="ctr"/>
+                </a:tc>
+                <a:tc>
+                  <a:txBody>
+                    <a:bodyPr/>
+                    <a:lstStyle/>
+                    <a:p>
+                      <a:pPr algn="ctr" fontAlgn="b"/>
+                      <a:r>
+                        <a:rPr lang="ru-RU" sz="1700" u="none" strike="noStrike">
+                          <a:effectLst/>
+                        </a:rPr>
+                        <a:t>2</a:t>
+                      </a:r>
+                      <a:endParaRPr lang="ru-RU" sz="1700" b="0" i="0" u="none" strike="noStrike">
+                        <a:solidFill>
+                          <a:srgbClr val="000000"/>
+                        </a:solidFill>
+                        <a:effectLst/>
+                        <a:latin typeface="Calibri" panose="020F0502020204030204" pitchFamily="34" charset="0"/>
+                      </a:endParaRPr>
+                    </a:p>
+                  </a:txBody>
+                  <a:tcPr marL="15195" marR="15195" marT="15195" marB="0" anchor="ctr"/>
+                </a:tc>
+                <a:tc>
+                  <a:txBody>
+                    <a:bodyPr/>
+                    <a:lstStyle/>
+                    <a:p>
+                      <a:pPr algn="ctr" fontAlgn="b"/>
+                      <a:r>
+                        <a:rPr lang="ru-RU" sz="1700" u="none" strike="noStrike" dirty="0">
+                          <a:solidFill>
+                            <a:srgbClr val="FF0000"/>
+                          </a:solidFill>
+                          <a:effectLst/>
+                        </a:rPr>
+                        <a:t>72,3</a:t>
+                      </a:r>
+                      <a:endParaRPr lang="ru-RU" sz="1700" b="0" i="0" u="none" strike="noStrike" dirty="0">
+                        <a:solidFill>
+                          <a:srgbClr val="FF0000"/>
+                        </a:solidFill>
+                        <a:effectLst/>
+                        <a:latin typeface="Calibri" panose="020F0502020204030204" pitchFamily="34" charset="0"/>
+                      </a:endParaRPr>
+                    </a:p>
+                  </a:txBody>
+                  <a:tcPr marL="15195" marR="15195" marT="15195" marB="0" anchor="ctr"/>
+                </a:tc>
+                <a:tc>
+                  <a:txBody>
+                    <a:bodyPr/>
+                    <a:lstStyle/>
+                    <a:p>
+                      <a:pPr algn="ctr" fontAlgn="b"/>
+                      <a:r>
+                        <a:rPr lang="ru-RU" sz="1700" u="none" strike="noStrike" dirty="0">
+                          <a:solidFill>
+                            <a:srgbClr val="FF0000"/>
+                          </a:solidFill>
+                          <a:effectLst/>
+                        </a:rPr>
+                        <a:t>68,67</a:t>
+                      </a:r>
+                      <a:endParaRPr lang="ru-RU" sz="1700" b="0" i="0" u="none" strike="noStrike" dirty="0">
+                        <a:solidFill>
+                          <a:srgbClr val="FF0000"/>
+                        </a:solidFill>
+                        <a:effectLst/>
+                        <a:latin typeface="Calibri" panose="020F0502020204030204" pitchFamily="34" charset="0"/>
+                      </a:endParaRPr>
+                    </a:p>
+                  </a:txBody>
+                  <a:tcPr marL="15195" marR="15195" marT="15195" marB="0" anchor="ctr"/>
+                </a:tc>
+                <a:tc>
+                  <a:txBody>
+                    <a:bodyPr/>
+                    <a:lstStyle/>
+                    <a:p>
+                      <a:pPr algn="ctr" fontAlgn="b"/>
+                      <a:r>
+                        <a:rPr lang="ru-RU" sz="1700" u="none" strike="noStrike" dirty="0">
+                          <a:solidFill>
+                            <a:srgbClr val="00B050"/>
+                          </a:solidFill>
+                          <a:effectLst/>
+                        </a:rPr>
+                        <a:t>82,01</a:t>
+                      </a:r>
+                      <a:endParaRPr lang="ru-RU" sz="1700" b="0" i="0" u="none" strike="noStrike" dirty="0">
+                        <a:solidFill>
+                          <a:srgbClr val="00B050"/>
+                        </a:solidFill>
+                        <a:effectLst/>
+                        <a:latin typeface="Calibri" panose="020F0502020204030204" pitchFamily="34" charset="0"/>
+                      </a:endParaRPr>
+                    </a:p>
+                  </a:txBody>
+                  <a:tcPr marL="15195" marR="15195" marT="15195" marB="0" anchor="ctr"/>
+                </a:tc>
+                <a:tc>
+                  <a:txBody>
+                    <a:bodyPr/>
+                    <a:lstStyle/>
+                    <a:p>
+                      <a:pPr algn="ctr" fontAlgn="b"/>
+                      <a:r>
+                        <a:rPr lang="ru-RU" sz="1700" u="none" strike="noStrike" dirty="0">
+                          <a:solidFill>
+                            <a:srgbClr val="FF0000"/>
+                          </a:solidFill>
+                          <a:effectLst/>
+                        </a:rPr>
+                        <a:t>74,75</a:t>
+                      </a:r>
+                      <a:endParaRPr lang="ru-RU" sz="1700" b="0" i="0" u="none" strike="noStrike" dirty="0">
+                        <a:solidFill>
+                          <a:srgbClr val="FF0000"/>
+                        </a:solidFill>
+                        <a:effectLst/>
+                        <a:latin typeface="Calibri" panose="020F0502020204030204" pitchFamily="34" charset="0"/>
+                      </a:endParaRPr>
+                    </a:p>
+                  </a:txBody>
+                  <a:tcPr marL="15195" marR="15195" marT="15195" marB="0" anchor="ctr"/>
+                </a:tc>
+                <a:tc>
+                  <a:txBody>
+                    <a:bodyPr/>
+                    <a:lstStyle/>
+                    <a:p>
+                      <a:pPr algn="ctr" fontAlgn="b"/>
+                      <a:r>
+                        <a:rPr lang="ru-RU" sz="1700" u="none" strike="noStrike" dirty="0">
+                          <a:effectLst/>
+                        </a:rPr>
+                        <a:t>30</a:t>
+                      </a:r>
+                      <a:endParaRPr lang="ru-RU" sz="1700" b="0" i="0" u="none" strike="noStrike" dirty="0">
+                        <a:solidFill>
+                          <a:srgbClr val="000000"/>
+                        </a:solidFill>
+                        <a:effectLst/>
+                        <a:latin typeface="Calibri" panose="020F0502020204030204" pitchFamily="34" charset="0"/>
+                      </a:endParaRPr>
+                    </a:p>
+                  </a:txBody>
+                  <a:tcPr marL="15195" marR="15195" marT="15195" marB="0" anchor="ctr"/>
+                </a:tc>
+                <a:extLst>
+                  <a:ext uri="{0D108BD9-81ED-4DB2-BD59-A6C34878D82A}">
+                    <a16:rowId xmlns:a16="http://schemas.microsoft.com/office/drawing/2014/main" val="4092672087"/>
+                  </a:ext>
+                </a:extLst>
+              </a:tr>
+              <a:tr h="303915">
+                <a:tc>
+                  <a:txBody>
+                    <a:bodyPr/>
+                    <a:lstStyle/>
+                    <a:p>
+                      <a:pPr algn="ctr" fontAlgn="b"/>
+                      <a:r>
+                        <a:rPr lang="en-US" sz="1700" u="none" strike="noStrike" dirty="0">
+                          <a:effectLst/>
+                        </a:rPr>
+                        <a:t>SRFBN</a:t>
+                      </a:r>
+                      <a:endParaRPr lang="en-US" sz="1700" b="0" i="0" u="none" strike="noStrike" dirty="0">
+                        <a:solidFill>
+                          <a:srgbClr val="000000"/>
+                        </a:solidFill>
+                        <a:effectLst/>
+                        <a:latin typeface="Calibri" panose="020F0502020204030204" pitchFamily="34" charset="0"/>
+                      </a:endParaRPr>
+                    </a:p>
+                  </a:txBody>
+                  <a:tcPr marL="15195" marR="15195" marT="15195" marB="0" anchor="ctr"/>
+                </a:tc>
+                <a:tc>
+                  <a:txBody>
+                    <a:bodyPr/>
+                    <a:lstStyle/>
+                    <a:p>
+                      <a:pPr algn="ctr" fontAlgn="b"/>
+                      <a:r>
+                        <a:rPr lang="ru-RU" sz="1700" u="none" strike="noStrike">
+                          <a:effectLst/>
+                        </a:rPr>
+                        <a:t>2</a:t>
+                      </a:r>
+                      <a:endParaRPr lang="ru-RU" sz="1700" b="0" i="0" u="none" strike="noStrike">
+                        <a:solidFill>
+                          <a:srgbClr val="000000"/>
+                        </a:solidFill>
+                        <a:effectLst/>
+                        <a:latin typeface="Calibri" panose="020F0502020204030204" pitchFamily="34" charset="0"/>
+                      </a:endParaRPr>
+                    </a:p>
+                  </a:txBody>
+                  <a:tcPr marL="15195" marR="15195" marT="15195" marB="0" anchor="ctr"/>
+                </a:tc>
+                <a:tc>
+                  <a:txBody>
+                    <a:bodyPr/>
+                    <a:lstStyle/>
+                    <a:p>
+                      <a:pPr algn="ctr" fontAlgn="b"/>
+                      <a:r>
+                        <a:rPr lang="ru-RU" sz="1700" u="none" strike="noStrike" dirty="0">
+                          <a:solidFill>
+                            <a:srgbClr val="FF0000"/>
+                          </a:solidFill>
+                          <a:effectLst/>
+                        </a:rPr>
+                        <a:t>72,42</a:t>
+                      </a:r>
+                      <a:endParaRPr lang="ru-RU" sz="1700" b="0" i="0" u="none" strike="noStrike" dirty="0">
+                        <a:solidFill>
+                          <a:srgbClr val="FF0000"/>
+                        </a:solidFill>
+                        <a:effectLst/>
+                        <a:latin typeface="Calibri" panose="020F0502020204030204" pitchFamily="34" charset="0"/>
+                      </a:endParaRPr>
+                    </a:p>
+                  </a:txBody>
+                  <a:tcPr marL="15195" marR="15195" marT="15195" marB="0" anchor="ctr"/>
+                </a:tc>
+                <a:tc>
+                  <a:txBody>
+                    <a:bodyPr/>
+                    <a:lstStyle/>
+                    <a:p>
+                      <a:pPr algn="ctr" fontAlgn="b"/>
+                      <a:r>
+                        <a:rPr lang="ru-RU" sz="1700" u="none" strike="noStrike" dirty="0">
+                          <a:solidFill>
+                            <a:srgbClr val="FF0000"/>
+                          </a:solidFill>
+                          <a:effectLst/>
+                        </a:rPr>
+                        <a:t>68,93</a:t>
+                      </a:r>
+                      <a:endParaRPr lang="ru-RU" sz="1700" b="0" i="0" u="none" strike="noStrike" dirty="0">
+                        <a:solidFill>
+                          <a:srgbClr val="FF0000"/>
+                        </a:solidFill>
+                        <a:effectLst/>
+                        <a:latin typeface="Calibri" panose="020F0502020204030204" pitchFamily="34" charset="0"/>
+                      </a:endParaRPr>
+                    </a:p>
+                  </a:txBody>
+                  <a:tcPr marL="15195" marR="15195" marT="15195" marB="0" anchor="ctr"/>
+                </a:tc>
+                <a:tc>
+                  <a:txBody>
+                    <a:bodyPr/>
+                    <a:lstStyle/>
+                    <a:p>
+                      <a:pPr algn="ctr" fontAlgn="b"/>
+                      <a:r>
+                        <a:rPr lang="ru-RU" sz="1700" u="none" strike="noStrike" dirty="0">
+                          <a:solidFill>
+                            <a:srgbClr val="00B050"/>
+                          </a:solidFill>
+                          <a:effectLst/>
+                        </a:rPr>
+                        <a:t>81,65</a:t>
+                      </a:r>
+                      <a:endParaRPr lang="ru-RU" sz="1700" b="0" i="0" u="none" strike="noStrike" dirty="0">
+                        <a:solidFill>
+                          <a:srgbClr val="00B050"/>
+                        </a:solidFill>
+                        <a:effectLst/>
+                        <a:latin typeface="Calibri" panose="020F0502020204030204" pitchFamily="34" charset="0"/>
+                      </a:endParaRPr>
+                    </a:p>
+                  </a:txBody>
+                  <a:tcPr marL="15195" marR="15195" marT="15195" marB="0" anchor="ctr"/>
+                </a:tc>
+                <a:tc>
+                  <a:txBody>
+                    <a:bodyPr/>
+                    <a:lstStyle/>
+                    <a:p>
+                      <a:pPr algn="ctr" fontAlgn="b"/>
+                      <a:r>
+                        <a:rPr lang="ru-RU" sz="1700" u="none" strike="noStrike">
+                          <a:solidFill>
+                            <a:srgbClr val="FF0000"/>
+                          </a:solidFill>
+                          <a:effectLst/>
+                        </a:rPr>
+                        <a:t>74,75</a:t>
+                      </a:r>
+                      <a:endParaRPr lang="ru-RU" sz="1700" b="0" i="0" u="none" strike="noStrike">
+                        <a:solidFill>
+                          <a:srgbClr val="FF0000"/>
+                        </a:solidFill>
+                        <a:effectLst/>
+                        <a:latin typeface="Calibri" panose="020F0502020204030204" pitchFamily="34" charset="0"/>
+                      </a:endParaRPr>
+                    </a:p>
+                  </a:txBody>
+                  <a:tcPr marL="15195" marR="15195" marT="15195" marB="0" anchor="ctr"/>
+                </a:tc>
+                <a:tc>
+                  <a:txBody>
+                    <a:bodyPr/>
+                    <a:lstStyle/>
+                    <a:p>
+                      <a:pPr algn="ctr" fontAlgn="b"/>
+                      <a:r>
+                        <a:rPr lang="ru-RU" sz="1700" u="none" strike="noStrike" dirty="0">
+                          <a:effectLst/>
+                        </a:rPr>
+                        <a:t>30</a:t>
+                      </a:r>
+                      <a:endParaRPr lang="ru-RU" sz="1700" b="0" i="0" u="none" strike="noStrike" dirty="0">
+                        <a:solidFill>
+                          <a:srgbClr val="000000"/>
+                        </a:solidFill>
+                        <a:effectLst/>
+                        <a:latin typeface="Calibri" panose="020F0502020204030204" pitchFamily="34" charset="0"/>
+                      </a:endParaRPr>
+                    </a:p>
+                  </a:txBody>
+                  <a:tcPr marL="15195" marR="15195" marT="15195" marB="0" anchor="ctr"/>
+                </a:tc>
+                <a:extLst>
+                  <a:ext uri="{0D108BD9-81ED-4DB2-BD59-A6C34878D82A}">
+                    <a16:rowId xmlns:a16="http://schemas.microsoft.com/office/drawing/2014/main" val="927101156"/>
+                  </a:ext>
+                </a:extLst>
+              </a:tr>
+              <a:tr h="303915">
+                <a:tc>
+                  <a:txBody>
+                    <a:bodyPr/>
+                    <a:lstStyle/>
+                    <a:p>
+                      <a:pPr algn="ctr" fontAlgn="b"/>
+                      <a:r>
+                        <a:rPr lang="en-US" sz="1700" u="none" strike="noStrike" dirty="0" err="1">
+                          <a:effectLst/>
+                        </a:rPr>
+                        <a:t>proSRs</a:t>
+                      </a:r>
+                      <a:endParaRPr lang="en-US" sz="1700" b="0" i="0" u="none" strike="noStrike" dirty="0">
+                        <a:solidFill>
+                          <a:srgbClr val="000000"/>
+                        </a:solidFill>
+                        <a:effectLst/>
+                        <a:latin typeface="Calibri" panose="020F0502020204030204" pitchFamily="34" charset="0"/>
+                      </a:endParaRPr>
+                    </a:p>
+                  </a:txBody>
+                  <a:tcPr marL="15195" marR="15195" marT="15195" marB="0" anchor="ctr"/>
+                </a:tc>
+                <a:tc>
+                  <a:txBody>
+                    <a:bodyPr/>
+                    <a:lstStyle/>
+                    <a:p>
+                      <a:pPr algn="ctr" fontAlgn="b"/>
+                      <a:r>
+                        <a:rPr lang="ru-RU" sz="1700" u="none" strike="noStrike">
+                          <a:effectLst/>
+                        </a:rPr>
+                        <a:t>4</a:t>
+                      </a:r>
+                      <a:endParaRPr lang="ru-RU" sz="1700" b="0" i="0" u="none" strike="noStrike">
+                        <a:solidFill>
+                          <a:srgbClr val="000000"/>
+                        </a:solidFill>
+                        <a:effectLst/>
+                        <a:latin typeface="Calibri" panose="020F0502020204030204" pitchFamily="34" charset="0"/>
+                      </a:endParaRPr>
+                    </a:p>
+                  </a:txBody>
+                  <a:tcPr marL="15195" marR="15195" marT="15195" marB="0" anchor="ctr"/>
+                </a:tc>
+                <a:tc>
+                  <a:txBody>
+                    <a:bodyPr/>
+                    <a:lstStyle/>
+                    <a:p>
+                      <a:pPr algn="ctr" fontAlgn="b"/>
+                      <a:r>
+                        <a:rPr lang="ru-RU" sz="1700" u="none" strike="noStrike" dirty="0">
+                          <a:solidFill>
+                            <a:srgbClr val="FF0000"/>
+                          </a:solidFill>
+                          <a:effectLst/>
+                        </a:rPr>
+                        <a:t>72,12</a:t>
+                      </a:r>
+                      <a:endParaRPr lang="ru-RU" sz="1700" b="0" i="0" u="none" strike="noStrike" dirty="0">
+                        <a:solidFill>
+                          <a:srgbClr val="FF0000"/>
+                        </a:solidFill>
+                        <a:effectLst/>
+                        <a:latin typeface="Calibri" panose="020F0502020204030204" pitchFamily="34" charset="0"/>
+                      </a:endParaRPr>
+                    </a:p>
+                  </a:txBody>
+                  <a:tcPr marL="15195" marR="15195" marT="15195" marB="0" anchor="ctr"/>
+                </a:tc>
+                <a:tc>
+                  <a:txBody>
+                    <a:bodyPr/>
+                    <a:lstStyle/>
+                    <a:p>
+                      <a:pPr algn="ctr" fontAlgn="b"/>
+                      <a:r>
+                        <a:rPr lang="ru-RU" sz="1700" u="none" strike="noStrike" dirty="0">
+                          <a:solidFill>
+                            <a:srgbClr val="FF0000"/>
+                          </a:solidFill>
+                          <a:effectLst/>
+                        </a:rPr>
+                        <a:t>67,72</a:t>
+                      </a:r>
+                      <a:endParaRPr lang="ru-RU" sz="1700" b="0" i="0" u="none" strike="noStrike" dirty="0">
+                        <a:solidFill>
+                          <a:srgbClr val="FF0000"/>
+                        </a:solidFill>
+                        <a:effectLst/>
+                        <a:latin typeface="Calibri" panose="020F0502020204030204" pitchFamily="34" charset="0"/>
+                      </a:endParaRPr>
+                    </a:p>
+                  </a:txBody>
+                  <a:tcPr marL="15195" marR="15195" marT="15195" marB="0" anchor="ctr"/>
+                </a:tc>
+                <a:tc>
+                  <a:txBody>
+                    <a:bodyPr/>
+                    <a:lstStyle/>
+                    <a:p>
+                      <a:pPr algn="ctr" fontAlgn="b"/>
+                      <a:r>
+                        <a:rPr lang="ru-RU" sz="1700" u="none" strike="noStrike" dirty="0">
+                          <a:solidFill>
+                            <a:srgbClr val="00B050"/>
+                          </a:solidFill>
+                          <a:effectLst/>
+                        </a:rPr>
+                        <a:t>84,53</a:t>
+                      </a:r>
+                      <a:endParaRPr lang="ru-RU" sz="1700" b="0" i="0" u="none" strike="noStrike" dirty="0">
+                        <a:solidFill>
+                          <a:srgbClr val="00B050"/>
+                        </a:solidFill>
+                        <a:effectLst/>
+                        <a:latin typeface="Calibri" panose="020F0502020204030204" pitchFamily="34" charset="0"/>
+                      </a:endParaRPr>
+                    </a:p>
+                  </a:txBody>
+                  <a:tcPr marL="15195" marR="15195" marT="15195" marB="0" anchor="ctr"/>
+                </a:tc>
+                <a:tc>
+                  <a:txBody>
+                    <a:bodyPr/>
+                    <a:lstStyle/>
+                    <a:p>
+                      <a:pPr algn="ctr" fontAlgn="b"/>
+                      <a:r>
+                        <a:rPr lang="ru-RU" sz="1700" u="none" strike="noStrike" dirty="0">
+                          <a:solidFill>
+                            <a:srgbClr val="FF0000"/>
+                          </a:solidFill>
+                          <a:effectLst/>
+                        </a:rPr>
+                        <a:t>75,2</a:t>
+                      </a:r>
+                      <a:endParaRPr lang="ru-RU" sz="1700" b="0" i="0" u="none" strike="noStrike" dirty="0">
+                        <a:solidFill>
+                          <a:srgbClr val="FF0000"/>
+                        </a:solidFill>
+                        <a:effectLst/>
+                        <a:latin typeface="Calibri" panose="020F0502020204030204" pitchFamily="34" charset="0"/>
+                      </a:endParaRPr>
+                    </a:p>
+                  </a:txBody>
+                  <a:tcPr marL="15195" marR="15195" marT="15195" marB="0" anchor="ctr"/>
+                </a:tc>
+                <a:tc>
+                  <a:txBody>
+                    <a:bodyPr/>
+                    <a:lstStyle/>
+                    <a:p>
+                      <a:pPr algn="ctr" fontAlgn="b"/>
+                      <a:r>
+                        <a:rPr lang="ru-RU" sz="1700" u="none" strike="noStrike" dirty="0">
+                          <a:effectLst/>
+                        </a:rPr>
+                        <a:t>30</a:t>
+                      </a:r>
+                      <a:endParaRPr lang="ru-RU" sz="1700" b="0" i="0" u="none" strike="noStrike" dirty="0">
+                        <a:solidFill>
+                          <a:srgbClr val="000000"/>
+                        </a:solidFill>
+                        <a:effectLst/>
+                        <a:latin typeface="Calibri" panose="020F0502020204030204" pitchFamily="34" charset="0"/>
+                      </a:endParaRPr>
+                    </a:p>
+                  </a:txBody>
+                  <a:tcPr marL="15195" marR="15195" marT="15195" marB="0" anchor="ctr"/>
+                </a:tc>
+                <a:extLst>
+                  <a:ext uri="{0D108BD9-81ED-4DB2-BD59-A6C34878D82A}">
+                    <a16:rowId xmlns:a16="http://schemas.microsoft.com/office/drawing/2014/main" val="1051509526"/>
+                  </a:ext>
+                </a:extLst>
+              </a:tr>
+              <a:tr h="303915">
+                <a:tc>
+                  <a:txBody>
+                    <a:bodyPr/>
+                    <a:lstStyle/>
+                    <a:p>
+                      <a:pPr algn="ctr" fontAlgn="b"/>
+                      <a:r>
+                        <a:rPr lang="en-US" sz="1700" u="none" strike="noStrike" dirty="0">
+                          <a:effectLst/>
+                        </a:rPr>
+                        <a:t>SRFBN</a:t>
+                      </a:r>
+                      <a:endParaRPr lang="en-US" sz="1700" b="0" i="0" u="none" strike="noStrike" dirty="0">
+                        <a:solidFill>
+                          <a:srgbClr val="000000"/>
+                        </a:solidFill>
+                        <a:effectLst/>
+                        <a:latin typeface="Calibri" panose="020F0502020204030204" pitchFamily="34" charset="0"/>
+                      </a:endParaRPr>
+                    </a:p>
+                  </a:txBody>
+                  <a:tcPr marL="15195" marR="15195" marT="15195" marB="0" anchor="ctr"/>
+                </a:tc>
+                <a:tc>
+                  <a:txBody>
+                    <a:bodyPr/>
+                    <a:lstStyle/>
+                    <a:p>
+                      <a:pPr algn="ctr" fontAlgn="b"/>
+                      <a:r>
+                        <a:rPr lang="ru-RU" sz="1700" u="none" strike="noStrike">
+                          <a:effectLst/>
+                        </a:rPr>
+                        <a:t>3</a:t>
+                      </a:r>
+                      <a:endParaRPr lang="ru-RU" sz="1700" b="0" i="0" u="none" strike="noStrike">
+                        <a:solidFill>
+                          <a:srgbClr val="000000"/>
+                        </a:solidFill>
+                        <a:effectLst/>
+                        <a:latin typeface="Calibri" panose="020F0502020204030204" pitchFamily="34" charset="0"/>
+                      </a:endParaRPr>
+                    </a:p>
+                  </a:txBody>
+                  <a:tcPr marL="15195" marR="15195" marT="15195" marB="0" anchor="ctr"/>
+                </a:tc>
+                <a:tc>
+                  <a:txBody>
+                    <a:bodyPr/>
+                    <a:lstStyle/>
+                    <a:p>
+                      <a:pPr algn="ctr" fontAlgn="b"/>
+                      <a:r>
+                        <a:rPr lang="ru-RU" sz="1700" u="none" strike="noStrike" dirty="0">
+                          <a:solidFill>
+                            <a:srgbClr val="FF0000"/>
+                          </a:solidFill>
+                          <a:effectLst/>
+                        </a:rPr>
+                        <a:t>72,24</a:t>
+                      </a:r>
+                      <a:endParaRPr lang="ru-RU" sz="1700" b="0" i="0" u="none" strike="noStrike" dirty="0">
+                        <a:solidFill>
+                          <a:srgbClr val="FF0000"/>
+                        </a:solidFill>
+                        <a:effectLst/>
+                        <a:latin typeface="Calibri" panose="020F0502020204030204" pitchFamily="34" charset="0"/>
+                      </a:endParaRPr>
+                    </a:p>
+                  </a:txBody>
+                  <a:tcPr marL="15195" marR="15195" marT="15195" marB="0" anchor="ctr"/>
+                </a:tc>
+                <a:tc>
+                  <a:txBody>
+                    <a:bodyPr/>
+                    <a:lstStyle/>
+                    <a:p>
+                      <a:pPr algn="ctr" fontAlgn="b"/>
+                      <a:r>
+                        <a:rPr lang="ru-RU" sz="1700" u="none" strike="noStrike" dirty="0">
+                          <a:solidFill>
+                            <a:srgbClr val="FF0000"/>
+                          </a:solidFill>
+                          <a:effectLst/>
+                        </a:rPr>
+                        <a:t>68,28</a:t>
+                      </a:r>
+                      <a:endParaRPr lang="ru-RU" sz="1700" b="0" i="0" u="none" strike="noStrike" dirty="0">
+                        <a:solidFill>
+                          <a:srgbClr val="FF0000"/>
+                        </a:solidFill>
+                        <a:effectLst/>
+                        <a:latin typeface="Calibri" panose="020F0502020204030204" pitchFamily="34" charset="0"/>
+                      </a:endParaRPr>
+                    </a:p>
+                  </a:txBody>
+                  <a:tcPr marL="15195" marR="15195" marT="15195" marB="0" anchor="ctr"/>
+                </a:tc>
+                <a:tc>
+                  <a:txBody>
+                    <a:bodyPr/>
+                    <a:lstStyle/>
+                    <a:p>
+                      <a:pPr algn="ctr" fontAlgn="b"/>
+                      <a:r>
+                        <a:rPr lang="ru-RU" sz="1700" u="none" strike="noStrike" dirty="0">
+                          <a:solidFill>
+                            <a:srgbClr val="00B050"/>
+                          </a:solidFill>
+                          <a:effectLst/>
+                        </a:rPr>
+                        <a:t>83,09</a:t>
+                      </a:r>
+                      <a:endParaRPr lang="ru-RU" sz="1700" b="0" i="0" u="none" strike="noStrike" dirty="0">
+                        <a:solidFill>
+                          <a:srgbClr val="00B050"/>
+                        </a:solidFill>
+                        <a:effectLst/>
+                        <a:latin typeface="Calibri" panose="020F0502020204030204" pitchFamily="34" charset="0"/>
+                      </a:endParaRPr>
+                    </a:p>
+                  </a:txBody>
+                  <a:tcPr marL="15195" marR="15195" marT="15195" marB="0" anchor="ctr"/>
+                </a:tc>
+                <a:tc>
+                  <a:txBody>
+                    <a:bodyPr/>
+                    <a:lstStyle/>
+                    <a:p>
+                      <a:pPr algn="ctr" fontAlgn="b"/>
+                      <a:r>
+                        <a:rPr lang="ru-RU" sz="1700" u="none" strike="noStrike" dirty="0">
+                          <a:solidFill>
+                            <a:srgbClr val="FF0000"/>
+                          </a:solidFill>
+                          <a:effectLst/>
+                        </a:rPr>
+                        <a:t>74,96</a:t>
+                      </a:r>
+                      <a:endParaRPr lang="ru-RU" sz="1700" b="0" i="0" u="none" strike="noStrike" dirty="0">
+                        <a:solidFill>
+                          <a:srgbClr val="FF0000"/>
+                        </a:solidFill>
+                        <a:effectLst/>
+                        <a:latin typeface="Calibri" panose="020F0502020204030204" pitchFamily="34" charset="0"/>
+                      </a:endParaRPr>
+                    </a:p>
+                  </a:txBody>
+                  <a:tcPr marL="15195" marR="15195" marT="15195" marB="0" anchor="ctr"/>
+                </a:tc>
+                <a:tc>
+                  <a:txBody>
+                    <a:bodyPr/>
+                    <a:lstStyle/>
+                    <a:p>
+                      <a:pPr algn="ctr" fontAlgn="b"/>
+                      <a:r>
+                        <a:rPr lang="ru-RU" sz="1700" u="none" strike="noStrike" dirty="0">
+                          <a:effectLst/>
+                        </a:rPr>
+                        <a:t>29</a:t>
+                      </a:r>
+                      <a:endParaRPr lang="ru-RU" sz="1700" b="0" i="0" u="none" strike="noStrike" dirty="0">
+                        <a:solidFill>
+                          <a:srgbClr val="000000"/>
+                        </a:solidFill>
+                        <a:effectLst/>
+                        <a:latin typeface="Calibri" panose="020F0502020204030204" pitchFamily="34" charset="0"/>
+                      </a:endParaRPr>
+                    </a:p>
+                  </a:txBody>
+                  <a:tcPr marL="15195" marR="15195" marT="15195" marB="0" anchor="ctr"/>
+                </a:tc>
+                <a:extLst>
+                  <a:ext uri="{0D108BD9-81ED-4DB2-BD59-A6C34878D82A}">
+                    <a16:rowId xmlns:a16="http://schemas.microsoft.com/office/drawing/2014/main" val="3607789253"/>
+                  </a:ext>
+                </a:extLst>
+              </a:tr>
+              <a:tr h="303915">
+                <a:tc>
+                  <a:txBody>
+                    <a:bodyPr/>
+                    <a:lstStyle/>
+                    <a:p>
+                      <a:pPr algn="ctr" fontAlgn="b"/>
+                      <a:r>
+                        <a:rPr lang="en-US" sz="1700" u="none" strike="noStrike" dirty="0">
+                          <a:effectLst/>
+                        </a:rPr>
+                        <a:t>DBPN</a:t>
+                      </a:r>
+                      <a:endParaRPr lang="en-US" sz="1700" b="0" i="0" u="none" strike="noStrike" dirty="0">
+                        <a:solidFill>
+                          <a:srgbClr val="000000"/>
+                        </a:solidFill>
+                        <a:effectLst/>
+                        <a:latin typeface="Calibri" panose="020F0502020204030204" pitchFamily="34" charset="0"/>
+                      </a:endParaRPr>
+                    </a:p>
+                  </a:txBody>
+                  <a:tcPr marL="15195" marR="15195" marT="15195" marB="0" anchor="ctr"/>
+                </a:tc>
+                <a:tc>
+                  <a:txBody>
+                    <a:bodyPr/>
+                    <a:lstStyle/>
+                    <a:p>
+                      <a:pPr algn="ctr" fontAlgn="b"/>
+                      <a:r>
+                        <a:rPr lang="ru-RU" sz="1700" u="none" strike="noStrike">
+                          <a:effectLst/>
+                        </a:rPr>
+                        <a:t>2</a:t>
+                      </a:r>
+                      <a:endParaRPr lang="ru-RU" sz="1700" b="0" i="0" u="none" strike="noStrike">
+                        <a:solidFill>
+                          <a:srgbClr val="000000"/>
+                        </a:solidFill>
+                        <a:effectLst/>
+                        <a:latin typeface="Calibri" panose="020F0502020204030204" pitchFamily="34" charset="0"/>
+                      </a:endParaRPr>
+                    </a:p>
+                  </a:txBody>
+                  <a:tcPr marL="15195" marR="15195" marT="15195" marB="0" anchor="ctr"/>
+                </a:tc>
+                <a:tc>
+                  <a:txBody>
+                    <a:bodyPr/>
+                    <a:lstStyle/>
+                    <a:p>
+                      <a:pPr algn="ctr" fontAlgn="b"/>
+                      <a:r>
+                        <a:rPr lang="ru-RU" sz="1700" u="none" strike="noStrike" dirty="0">
+                          <a:solidFill>
+                            <a:srgbClr val="FF0000"/>
+                          </a:solidFill>
+                          <a:effectLst/>
+                        </a:rPr>
+                        <a:t>72,24</a:t>
+                      </a:r>
+                      <a:endParaRPr lang="ru-RU" sz="1700" b="0" i="0" u="none" strike="noStrike" dirty="0">
+                        <a:solidFill>
+                          <a:srgbClr val="FF0000"/>
+                        </a:solidFill>
+                        <a:effectLst/>
+                        <a:latin typeface="Calibri" panose="020F0502020204030204" pitchFamily="34" charset="0"/>
+                      </a:endParaRPr>
+                    </a:p>
+                  </a:txBody>
+                  <a:tcPr marL="15195" marR="15195" marT="15195" marB="0" anchor="ctr"/>
+                </a:tc>
+                <a:tc>
+                  <a:txBody>
+                    <a:bodyPr/>
+                    <a:lstStyle/>
+                    <a:p>
+                      <a:pPr algn="ctr" fontAlgn="b"/>
+                      <a:r>
+                        <a:rPr lang="ru-RU" sz="1700" u="none" strike="noStrike" dirty="0">
+                          <a:solidFill>
+                            <a:srgbClr val="FF0000"/>
+                          </a:solidFill>
+                          <a:effectLst/>
+                        </a:rPr>
+                        <a:t>68,64</a:t>
+                      </a:r>
+                      <a:endParaRPr lang="ru-RU" sz="1700" b="0" i="0" u="none" strike="noStrike" dirty="0">
+                        <a:solidFill>
+                          <a:srgbClr val="FF0000"/>
+                        </a:solidFill>
+                        <a:effectLst/>
+                        <a:latin typeface="Calibri" panose="020F0502020204030204" pitchFamily="34" charset="0"/>
+                      </a:endParaRPr>
+                    </a:p>
+                  </a:txBody>
+                  <a:tcPr marL="15195" marR="15195" marT="15195" marB="0" anchor="ctr"/>
+                </a:tc>
+                <a:tc>
+                  <a:txBody>
+                    <a:bodyPr/>
+                    <a:lstStyle/>
+                    <a:p>
+                      <a:pPr algn="ctr" fontAlgn="b"/>
+                      <a:r>
+                        <a:rPr lang="ru-RU" sz="1700" u="none" strike="noStrike" dirty="0">
+                          <a:solidFill>
+                            <a:srgbClr val="00B050"/>
+                          </a:solidFill>
+                          <a:effectLst/>
+                        </a:rPr>
+                        <a:t>81,89</a:t>
+                      </a:r>
+                      <a:endParaRPr lang="ru-RU" sz="1700" b="0" i="0" u="none" strike="noStrike" dirty="0">
+                        <a:solidFill>
+                          <a:srgbClr val="00B050"/>
+                        </a:solidFill>
+                        <a:effectLst/>
+                        <a:latin typeface="Calibri" panose="020F0502020204030204" pitchFamily="34" charset="0"/>
+                      </a:endParaRPr>
+                    </a:p>
+                  </a:txBody>
+                  <a:tcPr marL="15195" marR="15195" marT="15195" marB="0" anchor="ctr"/>
+                </a:tc>
+                <a:tc>
+                  <a:txBody>
+                    <a:bodyPr/>
+                    <a:lstStyle/>
+                    <a:p>
+                      <a:pPr algn="ctr" fontAlgn="b"/>
+                      <a:r>
+                        <a:rPr lang="ru-RU" sz="1700" u="none" strike="noStrike" dirty="0">
+                          <a:solidFill>
+                            <a:srgbClr val="FF0000"/>
+                          </a:solidFill>
+                          <a:effectLst/>
+                        </a:rPr>
+                        <a:t>74,69</a:t>
+                      </a:r>
+                      <a:endParaRPr lang="ru-RU" sz="1700" b="0" i="0" u="none" strike="noStrike" dirty="0">
+                        <a:solidFill>
+                          <a:srgbClr val="FF0000"/>
+                        </a:solidFill>
+                        <a:effectLst/>
+                        <a:latin typeface="Calibri" panose="020F0502020204030204" pitchFamily="34" charset="0"/>
+                      </a:endParaRPr>
+                    </a:p>
+                  </a:txBody>
+                  <a:tcPr marL="15195" marR="15195" marT="15195" marB="0" anchor="ctr"/>
+                </a:tc>
+                <a:tc>
+                  <a:txBody>
+                    <a:bodyPr/>
+                    <a:lstStyle/>
+                    <a:p>
+                      <a:pPr algn="ctr" fontAlgn="b"/>
+                      <a:r>
+                        <a:rPr lang="ru-RU" sz="1700" u="none" strike="noStrike" dirty="0">
+                          <a:effectLst/>
+                        </a:rPr>
+                        <a:t>27</a:t>
+                      </a:r>
+                      <a:endParaRPr lang="ru-RU" sz="1700" b="0" i="0" u="none" strike="noStrike" dirty="0">
+                        <a:solidFill>
+                          <a:srgbClr val="000000"/>
+                        </a:solidFill>
+                        <a:effectLst/>
+                        <a:latin typeface="Calibri" panose="020F0502020204030204" pitchFamily="34" charset="0"/>
+                      </a:endParaRPr>
+                    </a:p>
+                  </a:txBody>
+                  <a:tcPr marL="15195" marR="15195" marT="15195" marB="0" anchor="ctr"/>
+                </a:tc>
+                <a:extLst>
+                  <a:ext uri="{0D108BD9-81ED-4DB2-BD59-A6C34878D82A}">
+                    <a16:rowId xmlns:a16="http://schemas.microsoft.com/office/drawing/2014/main" val="2809266517"/>
+                  </a:ext>
+                </a:extLst>
+              </a:tr>
+              <a:tr h="303915">
+                <a:tc>
+                  <a:txBody>
+                    <a:bodyPr/>
+                    <a:lstStyle/>
+                    <a:p>
+                      <a:pPr algn="ctr" fontAlgn="b"/>
+                      <a:r>
+                        <a:rPr lang="en-US" sz="1700" u="none" strike="noStrike" dirty="0">
+                          <a:effectLst/>
+                        </a:rPr>
+                        <a:t>ESRGAN</a:t>
+                      </a:r>
+                      <a:endParaRPr lang="en-US" sz="1700" b="0" i="0" u="none" strike="noStrike" dirty="0">
+                        <a:solidFill>
+                          <a:srgbClr val="000000"/>
+                        </a:solidFill>
+                        <a:effectLst/>
+                        <a:latin typeface="Calibri" panose="020F0502020204030204" pitchFamily="34" charset="0"/>
+                      </a:endParaRPr>
+                    </a:p>
+                  </a:txBody>
+                  <a:tcPr marL="15195" marR="15195" marT="15195" marB="0" anchor="ctr"/>
+                </a:tc>
+                <a:tc>
+                  <a:txBody>
+                    <a:bodyPr/>
+                    <a:lstStyle/>
+                    <a:p>
+                      <a:pPr algn="ctr" fontAlgn="b"/>
+                      <a:r>
+                        <a:rPr lang="ru-RU" sz="1700" u="none" strike="noStrike">
+                          <a:effectLst/>
+                        </a:rPr>
+                        <a:t>4</a:t>
+                      </a:r>
+                      <a:endParaRPr lang="ru-RU" sz="1700" b="0" i="0" u="none" strike="noStrike">
+                        <a:solidFill>
+                          <a:srgbClr val="000000"/>
+                        </a:solidFill>
+                        <a:effectLst/>
+                        <a:latin typeface="Calibri" panose="020F0502020204030204" pitchFamily="34" charset="0"/>
+                      </a:endParaRPr>
+                    </a:p>
+                  </a:txBody>
+                  <a:tcPr marL="15195" marR="15195" marT="15195" marB="0" anchor="ctr"/>
+                </a:tc>
+                <a:tc>
+                  <a:txBody>
+                    <a:bodyPr/>
+                    <a:lstStyle/>
+                    <a:p>
+                      <a:pPr algn="ctr" fontAlgn="b"/>
+                      <a:r>
+                        <a:rPr lang="ru-RU" sz="1700" u="none" strike="noStrike" dirty="0">
+                          <a:solidFill>
+                            <a:srgbClr val="FF0000"/>
+                          </a:solidFill>
+                          <a:effectLst/>
+                        </a:rPr>
+                        <a:t>72</a:t>
+                      </a:r>
+                      <a:endParaRPr lang="ru-RU" sz="1700" b="0" i="0" u="none" strike="noStrike" dirty="0">
+                        <a:solidFill>
+                          <a:srgbClr val="FF0000"/>
+                        </a:solidFill>
+                        <a:effectLst/>
+                        <a:latin typeface="Calibri" panose="020F0502020204030204" pitchFamily="34" charset="0"/>
+                      </a:endParaRPr>
+                    </a:p>
+                  </a:txBody>
+                  <a:tcPr marL="15195" marR="15195" marT="15195" marB="0" anchor="ctr"/>
+                </a:tc>
+                <a:tc>
+                  <a:txBody>
+                    <a:bodyPr/>
+                    <a:lstStyle/>
+                    <a:p>
+                      <a:pPr algn="ctr" fontAlgn="b"/>
+                      <a:r>
+                        <a:rPr lang="ru-RU" sz="1700" u="none" strike="noStrike" dirty="0">
+                          <a:solidFill>
+                            <a:srgbClr val="FF0000"/>
+                          </a:solidFill>
+                          <a:effectLst/>
+                        </a:rPr>
+                        <a:t>67,59</a:t>
+                      </a:r>
+                      <a:endParaRPr lang="ru-RU" sz="1700" b="0" i="0" u="none" strike="noStrike" dirty="0">
+                        <a:solidFill>
+                          <a:srgbClr val="FF0000"/>
+                        </a:solidFill>
+                        <a:effectLst/>
+                        <a:latin typeface="Calibri" panose="020F0502020204030204" pitchFamily="34" charset="0"/>
+                      </a:endParaRPr>
+                    </a:p>
+                  </a:txBody>
+                  <a:tcPr marL="15195" marR="15195" marT="15195" marB="0" anchor="ctr"/>
+                </a:tc>
+                <a:tc>
+                  <a:txBody>
+                    <a:bodyPr/>
+                    <a:lstStyle/>
+                    <a:p>
+                      <a:pPr algn="ctr" fontAlgn="b"/>
+                      <a:r>
+                        <a:rPr lang="ru-RU" sz="1700" u="none" strike="noStrike" dirty="0">
+                          <a:solidFill>
+                            <a:srgbClr val="00B050"/>
+                          </a:solidFill>
+                          <a:effectLst/>
+                        </a:rPr>
+                        <a:t>84,53</a:t>
+                      </a:r>
+                      <a:endParaRPr lang="ru-RU" sz="1700" b="0" i="0" u="none" strike="noStrike" dirty="0">
+                        <a:solidFill>
+                          <a:srgbClr val="00B050"/>
+                        </a:solidFill>
+                        <a:effectLst/>
+                        <a:latin typeface="Calibri" panose="020F0502020204030204" pitchFamily="34" charset="0"/>
+                      </a:endParaRPr>
+                    </a:p>
+                  </a:txBody>
+                  <a:tcPr marL="15195" marR="15195" marT="15195" marB="0" anchor="ctr"/>
+                </a:tc>
+                <a:tc>
+                  <a:txBody>
+                    <a:bodyPr/>
+                    <a:lstStyle/>
+                    <a:p>
+                      <a:pPr algn="ctr" fontAlgn="b"/>
+                      <a:r>
+                        <a:rPr lang="ru-RU" sz="1700" u="none" strike="noStrike" dirty="0">
+                          <a:solidFill>
+                            <a:srgbClr val="FF0000"/>
+                          </a:solidFill>
+                          <a:effectLst/>
+                        </a:rPr>
+                        <a:t>75,12</a:t>
+                      </a:r>
+                      <a:endParaRPr lang="ru-RU" sz="1700" b="0" i="0" u="none" strike="noStrike" dirty="0">
+                        <a:solidFill>
+                          <a:srgbClr val="FF0000"/>
+                        </a:solidFill>
+                        <a:effectLst/>
+                        <a:latin typeface="Calibri" panose="020F0502020204030204" pitchFamily="34" charset="0"/>
+                      </a:endParaRPr>
+                    </a:p>
+                  </a:txBody>
+                  <a:tcPr marL="15195" marR="15195" marT="15195" marB="0" anchor="ctr"/>
+                </a:tc>
+                <a:tc>
+                  <a:txBody>
+                    <a:bodyPr/>
+                    <a:lstStyle/>
+                    <a:p>
+                      <a:pPr algn="ctr" fontAlgn="b"/>
+                      <a:r>
+                        <a:rPr lang="ru-RU" sz="1700" u="none" strike="noStrike" dirty="0">
+                          <a:effectLst/>
+                        </a:rPr>
+                        <a:t>26</a:t>
+                      </a:r>
+                      <a:endParaRPr lang="ru-RU" sz="1700" b="0" i="0" u="none" strike="noStrike" dirty="0">
+                        <a:solidFill>
+                          <a:srgbClr val="000000"/>
+                        </a:solidFill>
+                        <a:effectLst/>
+                        <a:latin typeface="Calibri" panose="020F0502020204030204" pitchFamily="34" charset="0"/>
+                      </a:endParaRPr>
+                    </a:p>
+                  </a:txBody>
+                  <a:tcPr marL="15195" marR="15195" marT="15195" marB="0" anchor="ctr"/>
+                </a:tc>
+                <a:extLst>
+                  <a:ext uri="{0D108BD9-81ED-4DB2-BD59-A6C34878D82A}">
+                    <a16:rowId xmlns:a16="http://schemas.microsoft.com/office/drawing/2014/main" val="1401367902"/>
+                  </a:ext>
+                </a:extLst>
+              </a:tr>
+              <a:tr h="303915">
+                <a:tc>
+                  <a:txBody>
+                    <a:bodyPr/>
+                    <a:lstStyle/>
+                    <a:p>
+                      <a:pPr algn="ctr" fontAlgn="b"/>
+                      <a:r>
+                        <a:rPr lang="en-US" sz="1700" u="none" strike="noStrike" dirty="0">
+                          <a:effectLst/>
+                        </a:rPr>
+                        <a:t>SRFBN_DN</a:t>
+                      </a:r>
+                      <a:endParaRPr lang="en-US" sz="1700" b="0" i="0" u="none" strike="noStrike" dirty="0">
+                        <a:solidFill>
+                          <a:srgbClr val="000000"/>
+                        </a:solidFill>
+                        <a:effectLst/>
+                        <a:latin typeface="Calibri" panose="020F0502020204030204" pitchFamily="34" charset="0"/>
+                      </a:endParaRPr>
+                    </a:p>
+                  </a:txBody>
+                  <a:tcPr marL="15195" marR="15195" marT="15195" marB="0" anchor="ctr"/>
+                </a:tc>
+                <a:tc>
+                  <a:txBody>
+                    <a:bodyPr/>
+                    <a:lstStyle/>
+                    <a:p>
+                      <a:pPr algn="ctr" fontAlgn="b"/>
+                      <a:r>
+                        <a:rPr lang="ru-RU" sz="1700" u="none" strike="noStrike">
+                          <a:effectLst/>
+                        </a:rPr>
+                        <a:t>3</a:t>
+                      </a:r>
+                      <a:endParaRPr lang="ru-RU" sz="1700" b="0" i="0" u="none" strike="noStrike">
+                        <a:solidFill>
+                          <a:srgbClr val="000000"/>
+                        </a:solidFill>
+                        <a:effectLst/>
+                        <a:latin typeface="Calibri" panose="020F0502020204030204" pitchFamily="34" charset="0"/>
+                      </a:endParaRPr>
+                    </a:p>
+                  </a:txBody>
+                  <a:tcPr marL="15195" marR="15195" marT="15195" marB="0" anchor="ctr"/>
+                </a:tc>
+                <a:tc>
+                  <a:txBody>
+                    <a:bodyPr/>
+                    <a:lstStyle/>
+                    <a:p>
+                      <a:pPr algn="ctr" fontAlgn="b"/>
+                      <a:r>
+                        <a:rPr lang="ru-RU" sz="1700" u="none" strike="noStrike" dirty="0">
+                          <a:solidFill>
+                            <a:srgbClr val="FF0000"/>
+                          </a:solidFill>
+                          <a:effectLst/>
+                        </a:rPr>
+                        <a:t>71,7</a:t>
+                      </a:r>
+                      <a:endParaRPr lang="ru-RU" sz="1700" b="0" i="0" u="none" strike="noStrike" dirty="0">
+                        <a:solidFill>
+                          <a:srgbClr val="FF0000"/>
+                        </a:solidFill>
+                        <a:effectLst/>
+                        <a:latin typeface="Calibri" panose="020F0502020204030204" pitchFamily="34" charset="0"/>
+                      </a:endParaRPr>
+                    </a:p>
+                  </a:txBody>
+                  <a:tcPr marL="15195" marR="15195" marT="15195" marB="0" anchor="ctr"/>
+                </a:tc>
+                <a:tc>
+                  <a:txBody>
+                    <a:bodyPr/>
+                    <a:lstStyle/>
+                    <a:p>
+                      <a:pPr algn="ctr" fontAlgn="b"/>
+                      <a:r>
+                        <a:rPr lang="ru-RU" sz="1700" u="none" strike="noStrike" dirty="0">
+                          <a:solidFill>
+                            <a:srgbClr val="FF0000"/>
+                          </a:solidFill>
+                          <a:effectLst/>
+                        </a:rPr>
+                        <a:t>66,92</a:t>
+                      </a:r>
+                      <a:endParaRPr lang="ru-RU" sz="1700" b="0" i="0" u="none" strike="noStrike" dirty="0">
+                        <a:solidFill>
+                          <a:srgbClr val="FF0000"/>
+                        </a:solidFill>
+                        <a:effectLst/>
+                        <a:latin typeface="Calibri" panose="020F0502020204030204" pitchFamily="34" charset="0"/>
+                      </a:endParaRPr>
+                    </a:p>
+                  </a:txBody>
+                  <a:tcPr marL="15195" marR="15195" marT="15195" marB="0" anchor="ctr"/>
+                </a:tc>
+                <a:tc>
+                  <a:txBody>
+                    <a:bodyPr/>
+                    <a:lstStyle/>
+                    <a:p>
+                      <a:pPr algn="ctr" fontAlgn="b"/>
+                      <a:r>
+                        <a:rPr lang="ru-RU" sz="1700" u="none" strike="noStrike" dirty="0">
+                          <a:solidFill>
+                            <a:srgbClr val="00B050"/>
+                          </a:solidFill>
+                          <a:effectLst/>
+                        </a:rPr>
+                        <a:t>85,85</a:t>
+                      </a:r>
+                      <a:endParaRPr lang="ru-RU" sz="1700" b="0" i="0" u="none" strike="noStrike" dirty="0">
+                        <a:solidFill>
+                          <a:srgbClr val="00B050"/>
+                        </a:solidFill>
+                        <a:effectLst/>
+                        <a:latin typeface="Calibri" panose="020F0502020204030204" pitchFamily="34" charset="0"/>
+                      </a:endParaRPr>
+                    </a:p>
+                  </a:txBody>
+                  <a:tcPr marL="15195" marR="15195" marT="15195" marB="0" anchor="ctr"/>
+                </a:tc>
+                <a:tc>
+                  <a:txBody>
+                    <a:bodyPr/>
+                    <a:lstStyle/>
+                    <a:p>
+                      <a:pPr algn="ctr" fontAlgn="b"/>
+                      <a:r>
+                        <a:rPr lang="ru-RU" sz="1700" u="none" strike="noStrike" dirty="0">
+                          <a:solidFill>
+                            <a:srgbClr val="FF0000"/>
+                          </a:solidFill>
+                          <a:effectLst/>
+                        </a:rPr>
+                        <a:t>75,21</a:t>
+                      </a:r>
+                      <a:endParaRPr lang="ru-RU" sz="1700" b="0" i="0" u="none" strike="noStrike" dirty="0">
+                        <a:solidFill>
+                          <a:srgbClr val="FF0000"/>
+                        </a:solidFill>
+                        <a:effectLst/>
+                        <a:latin typeface="Calibri" panose="020F0502020204030204" pitchFamily="34" charset="0"/>
+                      </a:endParaRPr>
+                    </a:p>
+                  </a:txBody>
+                  <a:tcPr marL="15195" marR="15195" marT="15195" marB="0" anchor="ctr"/>
+                </a:tc>
+                <a:tc>
+                  <a:txBody>
+                    <a:bodyPr/>
+                    <a:lstStyle/>
+                    <a:p>
+                      <a:pPr algn="ctr" fontAlgn="b"/>
+                      <a:r>
+                        <a:rPr lang="ru-RU" sz="1700" u="none" strike="noStrike" dirty="0">
+                          <a:effectLst/>
+                        </a:rPr>
+                        <a:t>26</a:t>
+                      </a:r>
+                      <a:endParaRPr lang="ru-RU" sz="1700" b="0" i="0" u="none" strike="noStrike" dirty="0">
+                        <a:solidFill>
+                          <a:srgbClr val="000000"/>
+                        </a:solidFill>
+                        <a:effectLst/>
+                        <a:latin typeface="Calibri" panose="020F0502020204030204" pitchFamily="34" charset="0"/>
+                      </a:endParaRPr>
+                    </a:p>
+                  </a:txBody>
+                  <a:tcPr marL="15195" marR="15195" marT="15195" marB="0" anchor="ctr"/>
+                </a:tc>
+                <a:extLst>
+                  <a:ext uri="{0D108BD9-81ED-4DB2-BD59-A6C34878D82A}">
+                    <a16:rowId xmlns:a16="http://schemas.microsoft.com/office/drawing/2014/main" val="1509422862"/>
+                  </a:ext>
+                </a:extLst>
+              </a:tr>
+              <a:tr h="303915">
+                <a:tc>
+                  <a:txBody>
+                    <a:bodyPr/>
+                    <a:lstStyle/>
+                    <a:p>
+                      <a:pPr algn="ctr" fontAlgn="b"/>
+                      <a:r>
+                        <a:rPr lang="en-US" sz="1700" u="none" strike="noStrike" dirty="0">
+                          <a:effectLst/>
+                        </a:rPr>
+                        <a:t>DCSCN</a:t>
+                      </a:r>
+                      <a:endParaRPr lang="en-US" sz="1700" b="0" i="0" u="none" strike="noStrike" dirty="0">
+                        <a:solidFill>
+                          <a:srgbClr val="000000"/>
+                        </a:solidFill>
+                        <a:effectLst/>
+                        <a:latin typeface="Calibri" panose="020F0502020204030204" pitchFamily="34" charset="0"/>
+                      </a:endParaRPr>
+                    </a:p>
+                  </a:txBody>
+                  <a:tcPr marL="15195" marR="15195" marT="15195" marB="0" anchor="ctr"/>
+                </a:tc>
+                <a:tc>
+                  <a:txBody>
+                    <a:bodyPr/>
+                    <a:lstStyle/>
+                    <a:p>
+                      <a:pPr algn="ctr" fontAlgn="b"/>
+                      <a:r>
+                        <a:rPr lang="ru-RU" sz="1700" u="none" strike="noStrike">
+                          <a:effectLst/>
+                        </a:rPr>
+                        <a:t>4</a:t>
+                      </a:r>
+                      <a:endParaRPr lang="ru-RU" sz="1700" b="0" i="0" u="none" strike="noStrike">
+                        <a:solidFill>
+                          <a:srgbClr val="000000"/>
+                        </a:solidFill>
+                        <a:effectLst/>
+                        <a:latin typeface="Calibri" panose="020F0502020204030204" pitchFamily="34" charset="0"/>
+                      </a:endParaRPr>
+                    </a:p>
+                  </a:txBody>
+                  <a:tcPr marL="15195" marR="15195" marT="15195" marB="0" anchor="ctr"/>
+                </a:tc>
+                <a:tc>
+                  <a:txBody>
+                    <a:bodyPr/>
+                    <a:lstStyle/>
+                    <a:p>
+                      <a:pPr algn="ctr" fontAlgn="b"/>
+                      <a:r>
+                        <a:rPr lang="ru-RU" sz="1700" u="none" strike="noStrike" dirty="0">
+                          <a:solidFill>
+                            <a:srgbClr val="FF0000"/>
+                          </a:solidFill>
+                          <a:effectLst/>
+                        </a:rPr>
+                        <a:t>71,94</a:t>
+                      </a:r>
+                      <a:endParaRPr lang="ru-RU" sz="1700" b="0" i="0" u="none" strike="noStrike" dirty="0">
+                        <a:solidFill>
+                          <a:srgbClr val="FF0000"/>
+                        </a:solidFill>
+                        <a:effectLst/>
+                        <a:latin typeface="Calibri" panose="020F0502020204030204" pitchFamily="34" charset="0"/>
+                      </a:endParaRPr>
+                    </a:p>
+                  </a:txBody>
+                  <a:tcPr marL="15195" marR="15195" marT="15195" marB="0" anchor="ctr"/>
+                </a:tc>
+                <a:tc>
+                  <a:txBody>
+                    <a:bodyPr/>
+                    <a:lstStyle/>
+                    <a:p>
+                      <a:pPr algn="ctr" fontAlgn="b"/>
+                      <a:r>
+                        <a:rPr lang="ru-RU" sz="1700" u="none" strike="noStrike" dirty="0">
+                          <a:solidFill>
+                            <a:srgbClr val="FF0000"/>
+                          </a:solidFill>
+                          <a:effectLst/>
+                        </a:rPr>
+                        <a:t>67,73</a:t>
+                      </a:r>
+                      <a:endParaRPr lang="ru-RU" sz="1700" b="0" i="0" u="none" strike="noStrike" dirty="0">
+                        <a:solidFill>
+                          <a:srgbClr val="FF0000"/>
+                        </a:solidFill>
+                        <a:effectLst/>
+                        <a:latin typeface="Calibri" panose="020F0502020204030204" pitchFamily="34" charset="0"/>
+                      </a:endParaRPr>
+                    </a:p>
+                  </a:txBody>
+                  <a:tcPr marL="15195" marR="15195" marT="15195" marB="0" anchor="ctr"/>
+                </a:tc>
+                <a:tc>
+                  <a:txBody>
+                    <a:bodyPr/>
+                    <a:lstStyle/>
+                    <a:p>
+                      <a:pPr algn="ctr" fontAlgn="b"/>
+                      <a:r>
+                        <a:rPr lang="ru-RU" sz="1700" u="none" strike="noStrike" dirty="0">
+                          <a:solidFill>
+                            <a:srgbClr val="00B050"/>
+                          </a:solidFill>
+                          <a:effectLst/>
+                        </a:rPr>
+                        <a:t>83,81</a:t>
+                      </a:r>
+                      <a:endParaRPr lang="ru-RU" sz="1700" b="0" i="0" u="none" strike="noStrike" dirty="0">
+                        <a:solidFill>
+                          <a:srgbClr val="00B050"/>
+                        </a:solidFill>
+                        <a:effectLst/>
+                        <a:latin typeface="Calibri" panose="020F0502020204030204" pitchFamily="34" charset="0"/>
+                      </a:endParaRPr>
+                    </a:p>
+                  </a:txBody>
+                  <a:tcPr marL="15195" marR="15195" marT="15195" marB="0" anchor="ctr"/>
+                </a:tc>
+                <a:tc>
+                  <a:txBody>
+                    <a:bodyPr/>
+                    <a:lstStyle/>
+                    <a:p>
+                      <a:pPr algn="ctr" fontAlgn="b"/>
+                      <a:r>
+                        <a:rPr lang="ru-RU" sz="1700" u="none" strike="noStrike" dirty="0">
+                          <a:solidFill>
+                            <a:srgbClr val="FF0000"/>
+                          </a:solidFill>
+                          <a:effectLst/>
+                        </a:rPr>
+                        <a:t>74,92</a:t>
+                      </a:r>
+                      <a:endParaRPr lang="ru-RU" sz="1700" b="0" i="0" u="none" strike="noStrike" dirty="0">
+                        <a:solidFill>
+                          <a:srgbClr val="FF0000"/>
+                        </a:solidFill>
+                        <a:effectLst/>
+                        <a:latin typeface="Calibri" panose="020F0502020204030204" pitchFamily="34" charset="0"/>
+                      </a:endParaRPr>
+                    </a:p>
+                  </a:txBody>
+                  <a:tcPr marL="15195" marR="15195" marT="15195" marB="0" anchor="ctr"/>
+                </a:tc>
+                <a:tc>
+                  <a:txBody>
+                    <a:bodyPr/>
+                    <a:lstStyle/>
+                    <a:p>
+                      <a:pPr algn="ctr" fontAlgn="b"/>
+                      <a:r>
+                        <a:rPr lang="ru-RU" sz="1700" u="none" strike="noStrike" dirty="0">
+                          <a:effectLst/>
+                        </a:rPr>
+                        <a:t>25</a:t>
+                      </a:r>
+                      <a:endParaRPr lang="ru-RU" sz="1700" b="0" i="0" u="none" strike="noStrike" dirty="0">
+                        <a:solidFill>
+                          <a:srgbClr val="000000"/>
+                        </a:solidFill>
+                        <a:effectLst/>
+                        <a:latin typeface="Calibri" panose="020F0502020204030204" pitchFamily="34" charset="0"/>
+                      </a:endParaRPr>
+                    </a:p>
+                  </a:txBody>
+                  <a:tcPr marL="15195" marR="15195" marT="15195" marB="0" anchor="ctr"/>
+                </a:tc>
+                <a:extLst>
+                  <a:ext uri="{0D108BD9-81ED-4DB2-BD59-A6C34878D82A}">
+                    <a16:rowId xmlns:a16="http://schemas.microsoft.com/office/drawing/2014/main" val="24499410"/>
+                  </a:ext>
+                </a:extLst>
+              </a:tr>
+              <a:tr h="303915">
+                <a:tc>
+                  <a:txBody>
+                    <a:bodyPr/>
+                    <a:lstStyle/>
+                    <a:p>
+                      <a:pPr algn="ctr" fontAlgn="b"/>
+                      <a:r>
+                        <a:rPr lang="en-US" sz="1700" u="none" strike="noStrike" dirty="0">
+                          <a:effectLst/>
+                        </a:rPr>
+                        <a:t>SRFBN_BD</a:t>
+                      </a:r>
+                      <a:endParaRPr lang="en-US" sz="1700" b="0" i="0" u="none" strike="noStrike" dirty="0">
+                        <a:solidFill>
+                          <a:srgbClr val="000000"/>
+                        </a:solidFill>
+                        <a:effectLst/>
+                        <a:latin typeface="Calibri" panose="020F0502020204030204" pitchFamily="34" charset="0"/>
+                      </a:endParaRPr>
+                    </a:p>
+                  </a:txBody>
+                  <a:tcPr marL="15195" marR="15195" marT="15195" marB="0" anchor="ctr"/>
+                </a:tc>
+                <a:tc>
+                  <a:txBody>
+                    <a:bodyPr/>
+                    <a:lstStyle/>
+                    <a:p>
+                      <a:pPr algn="ctr" fontAlgn="b"/>
+                      <a:r>
+                        <a:rPr lang="ru-RU" sz="1700" u="none" strike="noStrike">
+                          <a:effectLst/>
+                        </a:rPr>
+                        <a:t>3</a:t>
+                      </a:r>
+                      <a:endParaRPr lang="ru-RU" sz="1700" b="0" i="0" u="none" strike="noStrike">
+                        <a:solidFill>
+                          <a:srgbClr val="000000"/>
+                        </a:solidFill>
+                        <a:effectLst/>
+                        <a:latin typeface="Calibri" panose="020F0502020204030204" pitchFamily="34" charset="0"/>
+                      </a:endParaRPr>
+                    </a:p>
+                  </a:txBody>
+                  <a:tcPr marL="15195" marR="15195" marT="15195" marB="0" anchor="ctr"/>
+                </a:tc>
+                <a:tc>
+                  <a:txBody>
+                    <a:bodyPr/>
+                    <a:lstStyle/>
+                    <a:p>
+                      <a:pPr algn="ctr" fontAlgn="b"/>
+                      <a:r>
+                        <a:rPr lang="ru-RU" sz="1700" u="none" strike="noStrike" dirty="0">
+                          <a:solidFill>
+                            <a:srgbClr val="FF0000"/>
+                          </a:solidFill>
+                          <a:effectLst/>
+                        </a:rPr>
+                        <a:t>70,2</a:t>
+                      </a:r>
+                      <a:endParaRPr lang="ru-RU" sz="1700" b="0" i="0" u="none" strike="noStrike" dirty="0">
+                        <a:solidFill>
+                          <a:srgbClr val="FF0000"/>
+                        </a:solidFill>
+                        <a:effectLst/>
+                        <a:latin typeface="Calibri" panose="020F0502020204030204" pitchFamily="34" charset="0"/>
+                      </a:endParaRPr>
+                    </a:p>
+                  </a:txBody>
+                  <a:tcPr marL="15195" marR="15195" marT="15195" marB="0" anchor="ctr"/>
+                </a:tc>
+                <a:tc>
+                  <a:txBody>
+                    <a:bodyPr/>
+                    <a:lstStyle/>
+                    <a:p>
+                      <a:pPr algn="ctr" fontAlgn="b"/>
+                      <a:r>
+                        <a:rPr lang="ru-RU" sz="1700" u="none" strike="noStrike" dirty="0">
+                          <a:solidFill>
+                            <a:srgbClr val="FF0000"/>
+                          </a:solidFill>
+                          <a:effectLst/>
+                        </a:rPr>
+                        <a:t>65,44</a:t>
+                      </a:r>
+                      <a:endParaRPr lang="ru-RU" sz="1700" b="0" i="0" u="none" strike="noStrike" dirty="0">
+                        <a:solidFill>
+                          <a:srgbClr val="FF0000"/>
+                        </a:solidFill>
+                        <a:effectLst/>
+                        <a:latin typeface="Calibri" panose="020F0502020204030204" pitchFamily="34" charset="0"/>
+                      </a:endParaRPr>
+                    </a:p>
+                  </a:txBody>
+                  <a:tcPr marL="15195" marR="15195" marT="15195" marB="0" anchor="ctr"/>
+                </a:tc>
+                <a:tc>
+                  <a:txBody>
+                    <a:bodyPr/>
+                    <a:lstStyle/>
+                    <a:p>
+                      <a:pPr algn="ctr" fontAlgn="b"/>
+                      <a:r>
+                        <a:rPr lang="ru-RU" sz="1700" u="none" strike="noStrike" dirty="0">
+                          <a:solidFill>
+                            <a:srgbClr val="00B050"/>
+                          </a:solidFill>
+                          <a:effectLst/>
+                        </a:rPr>
+                        <a:t>85,61</a:t>
+                      </a:r>
+                      <a:endParaRPr lang="ru-RU" sz="1700" b="0" i="0" u="none" strike="noStrike" dirty="0">
+                        <a:solidFill>
+                          <a:srgbClr val="00B050"/>
+                        </a:solidFill>
+                        <a:effectLst/>
+                        <a:latin typeface="Calibri" panose="020F0502020204030204" pitchFamily="34" charset="0"/>
+                      </a:endParaRPr>
+                    </a:p>
+                  </a:txBody>
+                  <a:tcPr marL="15195" marR="15195" marT="15195" marB="0" anchor="ctr"/>
+                </a:tc>
+                <a:tc>
+                  <a:txBody>
+                    <a:bodyPr/>
+                    <a:lstStyle/>
+                    <a:p>
+                      <a:pPr algn="ctr" fontAlgn="b"/>
+                      <a:r>
+                        <a:rPr lang="ru-RU" sz="1700" u="none" strike="noStrike" dirty="0">
+                          <a:solidFill>
+                            <a:srgbClr val="FF0000"/>
+                          </a:solidFill>
+                          <a:effectLst/>
+                        </a:rPr>
+                        <a:t>74,18</a:t>
+                      </a:r>
+                      <a:endParaRPr lang="ru-RU" sz="1700" b="0" i="0" u="none" strike="noStrike" dirty="0">
+                        <a:solidFill>
+                          <a:srgbClr val="FF0000"/>
+                        </a:solidFill>
+                        <a:effectLst/>
+                        <a:latin typeface="Calibri" panose="020F0502020204030204" pitchFamily="34" charset="0"/>
+                      </a:endParaRPr>
+                    </a:p>
+                  </a:txBody>
+                  <a:tcPr marL="15195" marR="15195" marT="15195" marB="0" anchor="ctr"/>
+                </a:tc>
+                <a:tc>
+                  <a:txBody>
+                    <a:bodyPr/>
+                    <a:lstStyle/>
+                    <a:p>
+                      <a:pPr algn="ctr" fontAlgn="b"/>
+                      <a:r>
+                        <a:rPr lang="ru-RU" sz="1700" u="none" strike="noStrike" dirty="0">
+                          <a:effectLst/>
+                        </a:rPr>
+                        <a:t>22</a:t>
+                      </a:r>
+                      <a:endParaRPr lang="ru-RU" sz="1700" b="0" i="0" u="none" strike="noStrike" dirty="0">
+                        <a:solidFill>
+                          <a:srgbClr val="000000"/>
+                        </a:solidFill>
+                        <a:effectLst/>
+                        <a:latin typeface="Calibri" panose="020F0502020204030204" pitchFamily="34" charset="0"/>
+                      </a:endParaRPr>
+                    </a:p>
+                  </a:txBody>
+                  <a:tcPr marL="15195" marR="15195" marT="15195" marB="0" anchor="ctr"/>
+                </a:tc>
+                <a:extLst>
+                  <a:ext uri="{0D108BD9-81ED-4DB2-BD59-A6C34878D82A}">
+                    <a16:rowId xmlns:a16="http://schemas.microsoft.com/office/drawing/2014/main" val="3418008732"/>
+                  </a:ext>
+                </a:extLst>
+              </a:tr>
+              <a:tr h="303915">
+                <a:tc>
+                  <a:txBody>
+                    <a:bodyPr/>
+                    <a:lstStyle/>
+                    <a:p>
+                      <a:pPr algn="ctr" fontAlgn="b"/>
+                      <a:r>
+                        <a:rPr lang="en-US" sz="1700" u="none" strike="noStrike" dirty="0">
+                          <a:effectLst/>
+                        </a:rPr>
+                        <a:t>EDSR</a:t>
+                      </a:r>
+                      <a:endParaRPr lang="en-US" sz="1700" b="0" i="0" u="none" strike="noStrike" dirty="0">
+                        <a:solidFill>
+                          <a:srgbClr val="000000"/>
+                        </a:solidFill>
+                        <a:effectLst/>
+                        <a:latin typeface="Calibri" panose="020F0502020204030204" pitchFamily="34" charset="0"/>
+                      </a:endParaRPr>
+                    </a:p>
+                  </a:txBody>
+                  <a:tcPr marL="15195" marR="15195" marT="15195" marB="0" anchor="ctr"/>
+                </a:tc>
+                <a:tc>
+                  <a:txBody>
+                    <a:bodyPr/>
+                    <a:lstStyle/>
+                    <a:p>
+                      <a:pPr algn="ctr" fontAlgn="b"/>
+                      <a:r>
+                        <a:rPr lang="ru-RU" sz="1700" u="none" strike="noStrike">
+                          <a:effectLst/>
+                        </a:rPr>
+                        <a:t>3</a:t>
+                      </a:r>
+                      <a:endParaRPr lang="ru-RU" sz="1700" b="0" i="0" u="none" strike="noStrike">
+                        <a:solidFill>
+                          <a:srgbClr val="000000"/>
+                        </a:solidFill>
+                        <a:effectLst/>
+                        <a:latin typeface="Calibri" panose="020F0502020204030204" pitchFamily="34" charset="0"/>
+                      </a:endParaRPr>
+                    </a:p>
+                  </a:txBody>
+                  <a:tcPr marL="15195" marR="15195" marT="15195" marB="0" anchor="ctr"/>
+                </a:tc>
+                <a:tc>
+                  <a:txBody>
+                    <a:bodyPr/>
+                    <a:lstStyle/>
+                    <a:p>
+                      <a:pPr algn="ctr" fontAlgn="b"/>
+                      <a:r>
+                        <a:rPr lang="ru-RU" sz="1700" u="none" strike="noStrike" dirty="0">
+                          <a:solidFill>
+                            <a:srgbClr val="FF0000"/>
+                          </a:solidFill>
+                          <a:effectLst/>
+                        </a:rPr>
+                        <a:t>71,76</a:t>
+                      </a:r>
+                      <a:endParaRPr lang="ru-RU" sz="1700" b="0" i="0" u="none" strike="noStrike" dirty="0">
+                        <a:solidFill>
+                          <a:srgbClr val="FF0000"/>
+                        </a:solidFill>
+                        <a:effectLst/>
+                        <a:latin typeface="Calibri" panose="020F0502020204030204" pitchFamily="34" charset="0"/>
+                      </a:endParaRPr>
+                    </a:p>
+                  </a:txBody>
+                  <a:tcPr marL="15195" marR="15195" marT="15195" marB="0" anchor="ctr"/>
+                </a:tc>
+                <a:tc>
+                  <a:txBody>
+                    <a:bodyPr/>
+                    <a:lstStyle/>
+                    <a:p>
+                      <a:pPr algn="ctr" fontAlgn="b"/>
+                      <a:r>
+                        <a:rPr lang="ru-RU" sz="1700" u="none" strike="noStrike" dirty="0">
+                          <a:solidFill>
+                            <a:srgbClr val="FF0000"/>
+                          </a:solidFill>
+                          <a:effectLst/>
+                        </a:rPr>
+                        <a:t>67,78</a:t>
+                      </a:r>
+                      <a:endParaRPr lang="ru-RU" sz="1700" b="0" i="0" u="none" strike="noStrike" dirty="0">
+                        <a:solidFill>
+                          <a:srgbClr val="FF0000"/>
+                        </a:solidFill>
+                        <a:effectLst/>
+                        <a:latin typeface="Calibri" panose="020F0502020204030204" pitchFamily="34" charset="0"/>
+                      </a:endParaRPr>
+                    </a:p>
+                  </a:txBody>
+                  <a:tcPr marL="15195" marR="15195" marT="15195" marB="0" anchor="ctr"/>
+                </a:tc>
+                <a:tc>
+                  <a:txBody>
+                    <a:bodyPr/>
+                    <a:lstStyle/>
+                    <a:p>
+                      <a:pPr algn="ctr" fontAlgn="b"/>
+                      <a:r>
+                        <a:rPr lang="ru-RU" sz="1700" u="none" strike="noStrike" dirty="0">
+                          <a:solidFill>
+                            <a:srgbClr val="00B050"/>
+                          </a:solidFill>
+                          <a:effectLst/>
+                        </a:rPr>
+                        <a:t>82,97</a:t>
+                      </a:r>
+                      <a:endParaRPr lang="ru-RU" sz="1700" b="0" i="0" u="none" strike="noStrike" dirty="0">
+                        <a:solidFill>
+                          <a:srgbClr val="00B050"/>
+                        </a:solidFill>
+                        <a:effectLst/>
+                        <a:latin typeface="Calibri" panose="020F0502020204030204" pitchFamily="34" charset="0"/>
+                      </a:endParaRPr>
+                    </a:p>
+                  </a:txBody>
+                  <a:tcPr marL="15195" marR="15195" marT="15195" marB="0" anchor="ctr"/>
+                </a:tc>
+                <a:tc>
+                  <a:txBody>
+                    <a:bodyPr/>
+                    <a:lstStyle/>
+                    <a:p>
+                      <a:pPr algn="ctr" fontAlgn="b"/>
+                      <a:r>
+                        <a:rPr lang="ru-RU" sz="1700" u="none" strike="noStrike" dirty="0">
+                          <a:solidFill>
+                            <a:srgbClr val="FF0000"/>
+                          </a:solidFill>
+                          <a:effectLst/>
+                        </a:rPr>
+                        <a:t>74,61</a:t>
+                      </a:r>
+                      <a:endParaRPr lang="ru-RU" sz="1700" b="0" i="0" u="none" strike="noStrike" dirty="0">
+                        <a:solidFill>
+                          <a:srgbClr val="FF0000"/>
+                        </a:solidFill>
+                        <a:effectLst/>
+                        <a:latin typeface="Calibri" panose="020F0502020204030204" pitchFamily="34" charset="0"/>
+                      </a:endParaRPr>
+                    </a:p>
+                  </a:txBody>
+                  <a:tcPr marL="15195" marR="15195" marT="15195" marB="0" anchor="ctr"/>
+                </a:tc>
+                <a:tc>
+                  <a:txBody>
+                    <a:bodyPr/>
+                    <a:lstStyle/>
+                    <a:p>
+                      <a:pPr algn="ctr" fontAlgn="b"/>
+                      <a:r>
+                        <a:rPr lang="ru-RU" sz="1700" u="none" strike="noStrike" dirty="0">
+                          <a:effectLst/>
+                        </a:rPr>
+                        <a:t>20</a:t>
+                      </a:r>
+                      <a:endParaRPr lang="ru-RU" sz="1700" b="0" i="0" u="none" strike="noStrike" dirty="0">
+                        <a:solidFill>
+                          <a:srgbClr val="000000"/>
+                        </a:solidFill>
+                        <a:effectLst/>
+                        <a:latin typeface="Calibri" panose="020F0502020204030204" pitchFamily="34" charset="0"/>
+                      </a:endParaRPr>
+                    </a:p>
+                  </a:txBody>
+                  <a:tcPr marL="15195" marR="15195" marT="15195" marB="0" anchor="ctr"/>
+                </a:tc>
+                <a:extLst>
+                  <a:ext uri="{0D108BD9-81ED-4DB2-BD59-A6C34878D82A}">
+                    <a16:rowId xmlns:a16="http://schemas.microsoft.com/office/drawing/2014/main" val="2046105349"/>
+                  </a:ext>
+                </a:extLst>
+              </a:tr>
+              <a:tr h="303915">
+                <a:tc>
+                  <a:txBody>
+                    <a:bodyPr/>
+                    <a:lstStyle/>
+                    <a:p>
+                      <a:pPr algn="ctr" fontAlgn="b"/>
+                      <a:r>
+                        <a:rPr lang="en-US" sz="1700" u="none" strike="noStrike" dirty="0">
+                          <a:effectLst/>
+                        </a:rPr>
+                        <a:t>SRFBN</a:t>
+                      </a:r>
+                      <a:endParaRPr lang="en-US" sz="1700" b="0" i="0" u="none" strike="noStrike" dirty="0">
+                        <a:solidFill>
+                          <a:srgbClr val="000000"/>
+                        </a:solidFill>
+                        <a:effectLst/>
+                        <a:latin typeface="Calibri" panose="020F0502020204030204" pitchFamily="34" charset="0"/>
+                      </a:endParaRPr>
+                    </a:p>
+                  </a:txBody>
+                  <a:tcPr marL="15195" marR="15195" marT="15195" marB="0" anchor="ctr"/>
+                </a:tc>
+                <a:tc>
+                  <a:txBody>
+                    <a:bodyPr/>
+                    <a:lstStyle/>
+                    <a:p>
+                      <a:pPr algn="ctr" fontAlgn="b"/>
+                      <a:r>
+                        <a:rPr lang="ru-RU" sz="1700" u="none" strike="noStrike" dirty="0">
+                          <a:effectLst/>
+                        </a:rPr>
+                        <a:t>4</a:t>
+                      </a:r>
+                      <a:endParaRPr lang="ru-RU" sz="1700" b="0" i="0" u="none" strike="noStrike" dirty="0">
+                        <a:solidFill>
+                          <a:srgbClr val="000000"/>
+                        </a:solidFill>
+                        <a:effectLst/>
+                        <a:latin typeface="Calibri" panose="020F0502020204030204" pitchFamily="34" charset="0"/>
+                      </a:endParaRPr>
+                    </a:p>
+                  </a:txBody>
+                  <a:tcPr marL="15195" marR="15195" marT="15195" marB="0" anchor="ctr"/>
+                </a:tc>
+                <a:tc>
+                  <a:txBody>
+                    <a:bodyPr/>
+                    <a:lstStyle/>
+                    <a:p>
+                      <a:pPr algn="ctr" fontAlgn="b"/>
+                      <a:r>
+                        <a:rPr lang="ru-RU" sz="1700" u="none" strike="noStrike" dirty="0">
+                          <a:solidFill>
+                            <a:srgbClr val="FF0000"/>
+                          </a:solidFill>
+                          <a:effectLst/>
+                        </a:rPr>
+                        <a:t>71,52</a:t>
+                      </a:r>
+                      <a:endParaRPr lang="ru-RU" sz="1700" b="0" i="0" u="none" strike="noStrike" dirty="0">
+                        <a:solidFill>
+                          <a:srgbClr val="FF0000"/>
+                        </a:solidFill>
+                        <a:effectLst/>
+                        <a:latin typeface="Calibri" panose="020F0502020204030204" pitchFamily="34" charset="0"/>
+                      </a:endParaRPr>
+                    </a:p>
+                  </a:txBody>
+                  <a:tcPr marL="15195" marR="15195" marT="15195" marB="0" anchor="ctr"/>
+                </a:tc>
+                <a:tc>
+                  <a:txBody>
+                    <a:bodyPr/>
+                    <a:lstStyle/>
+                    <a:p>
+                      <a:pPr algn="ctr" fontAlgn="b"/>
+                      <a:r>
+                        <a:rPr lang="ru-RU" sz="1700" u="none" strike="noStrike" dirty="0">
+                          <a:solidFill>
+                            <a:srgbClr val="FF0000"/>
+                          </a:solidFill>
+                          <a:effectLst/>
+                        </a:rPr>
+                        <a:t>67,34</a:t>
+                      </a:r>
+                      <a:endParaRPr lang="ru-RU" sz="1700" b="0" i="0" u="none" strike="noStrike" dirty="0">
+                        <a:solidFill>
+                          <a:srgbClr val="FF0000"/>
+                        </a:solidFill>
+                        <a:effectLst/>
+                        <a:latin typeface="Calibri" panose="020F0502020204030204" pitchFamily="34" charset="0"/>
+                      </a:endParaRPr>
+                    </a:p>
+                  </a:txBody>
+                  <a:tcPr marL="15195" marR="15195" marT="15195" marB="0" anchor="ctr"/>
+                </a:tc>
+                <a:tc>
+                  <a:txBody>
+                    <a:bodyPr/>
+                    <a:lstStyle/>
+                    <a:p>
+                      <a:pPr algn="ctr" fontAlgn="b"/>
+                      <a:r>
+                        <a:rPr lang="ru-RU" sz="1700" u="none" strike="noStrike" dirty="0">
+                          <a:solidFill>
+                            <a:srgbClr val="00B050"/>
+                          </a:solidFill>
+                          <a:effectLst/>
+                        </a:rPr>
+                        <a:t>83,57</a:t>
+                      </a:r>
+                      <a:endParaRPr lang="ru-RU" sz="1700" b="0" i="0" u="none" strike="noStrike" dirty="0">
+                        <a:solidFill>
+                          <a:srgbClr val="00B050"/>
+                        </a:solidFill>
+                        <a:effectLst/>
+                        <a:latin typeface="Calibri" panose="020F0502020204030204" pitchFamily="34" charset="0"/>
+                      </a:endParaRPr>
+                    </a:p>
+                  </a:txBody>
+                  <a:tcPr marL="15195" marR="15195" marT="15195" marB="0" anchor="ctr"/>
+                </a:tc>
+                <a:tc>
+                  <a:txBody>
+                    <a:bodyPr/>
+                    <a:lstStyle/>
+                    <a:p>
+                      <a:pPr algn="ctr" fontAlgn="b"/>
+                      <a:r>
+                        <a:rPr lang="ru-RU" sz="1700" u="none" strike="noStrike" dirty="0">
+                          <a:solidFill>
+                            <a:srgbClr val="FF0000"/>
+                          </a:solidFill>
+                          <a:effectLst/>
+                        </a:rPr>
+                        <a:t>74,59</a:t>
+                      </a:r>
+                      <a:endParaRPr lang="ru-RU" sz="1700" b="0" i="0" u="none" strike="noStrike" dirty="0">
+                        <a:solidFill>
+                          <a:srgbClr val="FF0000"/>
+                        </a:solidFill>
+                        <a:effectLst/>
+                        <a:latin typeface="Calibri" panose="020F0502020204030204" pitchFamily="34" charset="0"/>
+                      </a:endParaRPr>
+                    </a:p>
+                  </a:txBody>
+                  <a:tcPr marL="15195" marR="15195" marT="15195" marB="0" anchor="ctr"/>
+                </a:tc>
+                <a:tc>
+                  <a:txBody>
+                    <a:bodyPr/>
+                    <a:lstStyle/>
+                    <a:p>
+                      <a:pPr algn="ctr" fontAlgn="b"/>
+                      <a:r>
+                        <a:rPr lang="ru-RU" sz="1700" u="none" strike="noStrike" dirty="0">
+                          <a:effectLst/>
+                        </a:rPr>
+                        <a:t>18</a:t>
+                      </a:r>
+                      <a:endParaRPr lang="ru-RU" sz="1700" b="0" i="0" u="none" strike="noStrike" dirty="0">
+                        <a:solidFill>
+                          <a:srgbClr val="000000"/>
+                        </a:solidFill>
+                        <a:effectLst/>
+                        <a:latin typeface="Calibri" panose="020F0502020204030204" pitchFamily="34" charset="0"/>
+                      </a:endParaRPr>
+                    </a:p>
+                  </a:txBody>
+                  <a:tcPr marL="15195" marR="15195" marT="15195" marB="0" anchor="ctr"/>
+                </a:tc>
+                <a:extLst>
+                  <a:ext uri="{0D108BD9-81ED-4DB2-BD59-A6C34878D82A}">
+                    <a16:rowId xmlns:a16="http://schemas.microsoft.com/office/drawing/2014/main" val="1187834808"/>
+                  </a:ext>
+                </a:extLst>
+              </a:tr>
+            </a:tbl>
+          </a:graphicData>
+        </a:graphic>
+      </p:graphicFrame>
+    </p:spTree>
+    <p:extLst>
+      <p:ext uri="{BB962C8B-B14F-4D97-AF65-F5344CB8AC3E}">
+        <p14:creationId xmlns:p14="http://schemas.microsoft.com/office/powerpoint/2010/main" val="2320527937"/>
+      </p:ext>
+    </p:extLst>
+  </p:cSld>
+  <p:clrMapOvr>
+    <a:masterClrMapping/>
+  </p:clrMapOvr>
+  <mc:AlternateContent xmlns:mc="http://schemas.openxmlformats.org/markup-compatibility/2006" xmlns:p14="http://schemas.microsoft.com/office/powerpoint/2010/main">
+    <mc:Choice Requires="p14">
+      <p:transition spd="med" p14:dur="700">
+        <p:fade/>
+      </p:transition>
+    </mc:Choice>
+    <mc:Fallback xmlns="">
+      <p:transition spd="med">
+        <p:fade/>
+      </p:transition>
+    </mc:Fallback>
+  </mc:AlternateContent>
+</p:sld>
+</file>
+
 <file path=ppt/slides/slide2.xml><?xml version="1.0" encoding="utf-8"?>
 <p:sld xmlns:a="http://schemas.openxmlformats.org/drawingml/2006/main" xmlns:r="http://schemas.openxmlformats.org/officeDocument/2006/relationships" xmlns:p="http://schemas.openxmlformats.org/presentationml/2006/main">
   <p:cSld>
@@ -8224,14 +12671,14 @@
           <p:nvPr>
             <p:extLst>
               <p:ext uri="{D42A27DB-BD31-4B8C-83A1-F6EECF244321}">
-                <p14:modId xmlns:p14="http://schemas.microsoft.com/office/powerpoint/2010/main" val="3851866998"/>
+                <p14:modId xmlns:p14="http://schemas.microsoft.com/office/powerpoint/2010/main" val="2684371899"/>
               </p:ext>
             </p:extLst>
           </p:nvPr>
         </p:nvGraphicFramePr>
         <p:xfrm>
           <a:off x="2031470" y="742539"/>
-          <a:ext cx="8125884" cy="5372922"/>
+          <a:ext cx="8125884" cy="5391835"/>
         </p:xfrm>
         <a:graphic>
           <a:graphicData uri="http://schemas.openxmlformats.org/drawingml/2006/table">
@@ -8465,7 +12912,7 @@
                       <a:pPr algn="ctr"/>
                       <a:r>
                         <a:rPr lang="ru-RU" sz="1800" dirty="0"/>
-                        <a:t>Ответ на вопрос о корректности гипотезы вместе с лучшей моделью</a:t>
+                        <a:t>Добавление результатов других моделей для получения более определённых выводов</a:t>
                       </a:r>
                     </a:p>
                   </a:txBody>
@@ -11506,15 +15953,6 @@
 </file>
 
 <file path=customXml/item1.xml><?xml version="1.0" encoding="utf-8"?>
-<?mso-contentType ?>
-<FormTemplates xmlns="http://schemas.microsoft.com/sharepoint/v3/contenttype/forms">
-  <Display>DocumentLibraryForm</Display>
-  <Edit>AssetEditForm</Edit>
-  <New>DocumentLibraryForm</New>
-</FormTemplates>
-</file>
-
-<file path=customXml/item2.xml><?xml version="1.0" encoding="utf-8"?>
 <p:properties xmlns:p="http://schemas.microsoft.com/office/2006/metadata/properties" xmlns:xsi="http://www.w3.org/2001/XMLSchema-instance" xmlns:pc="http://schemas.microsoft.com/office/infopath/2007/PartnerControls">
   <documentManagement>
     <LocPublishedLinkedAssetsLookup xmlns="4873beb7-5857-4685-be1f-d57550cc96cc" xsi:nil="true"/>
@@ -11648,6 +16086,15 @@
     <LocMarketGroupTiers2 xmlns="4873beb7-5857-4685-be1f-d57550cc96cc" xsi:nil="true"/>
   </documentManagement>
 </p:properties>
+</file>
+
+<file path=customXml/item2.xml><?xml version="1.0" encoding="utf-8"?>
+<?mso-contentType ?>
+<FormTemplates xmlns="http://schemas.microsoft.com/sharepoint/v3/contenttype/forms">
+  <Display>DocumentLibraryForm</Display>
+  <Edit>AssetEditForm</Edit>
+  <New>DocumentLibraryForm</New>
+</FormTemplates>
 </file>
 
 <file path=customXml/item3.xml><?xml version="1.0" encoding="utf-8"?>
@@ -12691,25 +17138,25 @@
 </file>
 
 <file path=customXml/itemProps1.xml><?xml version="1.0" encoding="utf-8"?>
-<ds:datastoreItem xmlns:ds="http://schemas.openxmlformats.org/officeDocument/2006/customXml" ds:itemID="{3836F65B-1B07-41EE-A0E8-BC6EF3855225}">
+<ds:datastoreItem xmlns:ds="http://schemas.openxmlformats.org/officeDocument/2006/customXml" ds:itemID="{60C67BEE-D13F-4BD2-98A5-34D8A0977F68}">
   <ds:schemaRefs>
-    <ds:schemaRef ds:uri="http://schemas.microsoft.com/sharepoint/v3/contenttype/forms"/>
+    <ds:schemaRef ds:uri="http://purl.org/dc/terms/"/>
+    <ds:schemaRef ds:uri="http://schemas.openxmlformats.org/package/2006/metadata/core-properties"/>
+    <ds:schemaRef ds:uri="http://schemas.microsoft.com/office/2006/documentManagement/types"/>
+    <ds:schemaRef ds:uri="http://schemas.microsoft.com/office/infopath/2007/PartnerControls"/>
+    <ds:schemaRef ds:uri="http://schemas.microsoft.com/office/2006/metadata/properties"/>
+    <ds:schemaRef ds:uri="http://purl.org/dc/elements/1.1/"/>
+    <ds:schemaRef ds:uri="4873beb7-5857-4685-be1f-d57550cc96cc"/>
+    <ds:schemaRef ds:uri="http://www.w3.org/XML/1998/namespace"/>
+    <ds:schemaRef ds:uri="http://purl.org/dc/dcmitype/"/>
   </ds:schemaRefs>
 </ds:datastoreItem>
 </file>
 
 <file path=customXml/itemProps2.xml><?xml version="1.0" encoding="utf-8"?>
-<ds:datastoreItem xmlns:ds="http://schemas.openxmlformats.org/officeDocument/2006/customXml" ds:itemID="{60C67BEE-D13F-4BD2-98A5-34D8A0977F68}">
+<ds:datastoreItem xmlns:ds="http://schemas.openxmlformats.org/officeDocument/2006/customXml" ds:itemID="{3836F65B-1B07-41EE-A0E8-BC6EF3855225}">
   <ds:schemaRefs>
-    <ds:schemaRef ds:uri="http://schemas.microsoft.com/office/infopath/2007/PartnerControls"/>
-    <ds:schemaRef ds:uri="http://schemas.microsoft.com/office/2006/documentManagement/types"/>
-    <ds:schemaRef ds:uri="4873beb7-5857-4685-be1f-d57550cc96cc"/>
-    <ds:schemaRef ds:uri="http://purl.org/dc/dcmitype/"/>
-    <ds:schemaRef ds:uri="http://www.w3.org/XML/1998/namespace"/>
-    <ds:schemaRef ds:uri="http://schemas.openxmlformats.org/package/2006/metadata/core-properties"/>
-    <ds:schemaRef ds:uri="http://purl.org/dc/elements/1.1/"/>
-    <ds:schemaRef ds:uri="http://schemas.microsoft.com/office/2006/metadata/properties"/>
-    <ds:schemaRef ds:uri="http://purl.org/dc/terms/"/>
+    <ds:schemaRef ds:uri="http://schemas.microsoft.com/sharepoint/v3/contenttype/forms"/>
   </ds:schemaRefs>
 </ds:datastoreItem>
 </file>

</xml_diff>